<commit_message>
updated skip-gram, cbow, and sisg slides
</commit_message>
<xml_diff>
--- a/Presentation_Subword.pptx
+++ b/Presentation_Subword.pptx
@@ -191,34 +191,6 @@
 
 <file path=ppt/comments/comment4.xml><?xml version="1.0" encoding="utf-8"?>
 <p:cmLst xmlns:a="http://schemas.openxmlformats.org/drawingml/2006/main" xmlns:r="http://schemas.openxmlformats.org/officeDocument/2006/relationships" xmlns:p="http://schemas.openxmlformats.org/presentationml/2006/main">
-  <p:cm authorId="1" dt="2020-06-29T09:57:35.797" idx="1">
-    <p:pos x="10" y="10"/>
-    <p:text>Split up CBOW and Skip-gram and give them their own slides, add Skip-gram equation to its slide.</p:text>
-    <p:extLst>
-      <p:ext uri="{C676402C-5697-4E1C-873F-D02D1690AC5C}">
-        <p15:threadingInfo xmlns:p15="http://schemas.microsoft.com/office/powerpoint/2012/main" timeZoneBias="-120"/>
-      </p:ext>
-    </p:extLst>
-  </p:cm>
-</p:cmLst>
-</file>
-
-<file path=ppt/comments/comment5.xml><?xml version="1.0" encoding="utf-8"?>
-<p:cmLst xmlns:a="http://schemas.openxmlformats.org/drawingml/2006/main" xmlns:r="http://schemas.openxmlformats.org/officeDocument/2006/relationships" xmlns:p="http://schemas.openxmlformats.org/presentationml/2006/main">
-  <p:cm authorId="1" dt="2020-06-29T10:24:06.196" idx="4">
-    <p:pos x="10" y="10"/>
-    <p:text>Make our own diagram that makes sense with the n-grams and its word.</p:text>
-    <p:extLst>
-      <p:ext uri="{C676402C-5697-4E1C-873F-D02D1690AC5C}">
-        <p15:threadingInfo xmlns:p15="http://schemas.microsoft.com/office/powerpoint/2012/main" timeZoneBias="-120"/>
-      </p:ext>
-    </p:extLst>
-  </p:cm>
-</p:cmLst>
-</file>
-
-<file path=ppt/comments/comment6.xml><?xml version="1.0" encoding="utf-8"?>
-<p:cmLst xmlns:a="http://schemas.openxmlformats.org/drawingml/2006/main" xmlns:r="http://schemas.openxmlformats.org/officeDocument/2006/relationships" xmlns:p="http://schemas.openxmlformats.org/presentationml/2006/main">
   <p:cm authorId="1" dt="2020-06-29T10:19:38.586" idx="2">
     <p:pos x="10" y="10"/>
     <p:text>Need to add either discussion of Spearman Rank to notes, or put eqn on slide?</p:text>
@@ -240,7 +212,7 @@
 </p:cmLst>
 </file>
 
-<file path=ppt/comments/comment7.xml><?xml version="1.0" encoding="utf-8"?>
+<file path=ppt/comments/comment5.xml><?xml version="1.0" encoding="utf-8"?>
 <p:cmLst xmlns:a="http://schemas.openxmlformats.org/drawingml/2006/main" xmlns:r="http://schemas.openxmlformats.org/officeDocument/2006/relationships" xmlns:p="http://schemas.openxmlformats.org/presentationml/2006/main">
   <p:cm authorId="1" dt="2020-06-29T10:24:53.529" idx="5">
     <p:pos x="10" y="10"/>
@@ -254,7 +226,7 @@
 </p:cmLst>
 </file>
 
-<file path=ppt/comments/comment8.xml><?xml version="1.0" encoding="utf-8"?>
+<file path=ppt/comments/comment6.xml><?xml version="1.0" encoding="utf-8"?>
 <p:cmLst xmlns:a="http://schemas.openxmlformats.org/drawingml/2006/main" xmlns:r="http://schemas.openxmlformats.org/officeDocument/2006/relationships" xmlns:p="http://schemas.openxmlformats.org/presentationml/2006/main">
   <p:cm authorId="1" dt="2020-06-29T10:24:53.529" idx="5">
     <p:pos x="10" y="10"/>
@@ -784,6 +756,282 @@
               <a:rPr lang="en-US" dirty="0"/>
               <a:t> code and show the results]</a:t>
             </a:r>
+          </a:p>
+          <a:p>
+            <a:endParaRPr lang="en-US" dirty="0"/>
+          </a:p>
+          <a:p>
+            <a:r>
+              <a:rPr lang="en-US" sz="1200" b="0" i="0" kern="1200" dirty="0">
+                <a:solidFill>
+                  <a:schemeClr val="tx1"/>
+                </a:solidFill>
+                <a:effectLst/>
+                <a:latin typeface="+mn-lt"/>
+                <a:ea typeface="+mn-ea"/>
+                <a:cs typeface="+mn-cs"/>
+              </a:rPr>
+              <a:t>The </a:t>
+            </a:r>
+            <a:r>
+              <a:rPr lang="en-US" dirty="0" err="1"/>
+              <a:t>window_size</a:t>
+            </a:r>
+            <a:r>
+              <a:rPr lang="en-US" sz="1200" b="0" i="0" kern="1200" dirty="0">
+                <a:solidFill>
+                  <a:schemeClr val="tx1"/>
+                </a:solidFill>
+                <a:effectLst/>
+                <a:latin typeface="+mn-lt"/>
+                <a:ea typeface="+mn-ea"/>
+                <a:cs typeface="+mn-cs"/>
+              </a:rPr>
+              <a:t> is the size of the number of words occurring before and after the word based on which the word representations will be learned for the word. </a:t>
+            </a:r>
+          </a:p>
+          <a:p>
+            <a:endParaRPr lang="en-US" sz="1200" b="0" i="0" kern="1200" dirty="0">
+              <a:solidFill>
+                <a:schemeClr val="tx1"/>
+              </a:solidFill>
+              <a:effectLst/>
+              <a:latin typeface="+mn-lt"/>
+              <a:ea typeface="+mn-ea"/>
+              <a:cs typeface="+mn-cs"/>
+            </a:endParaRPr>
+          </a:p>
+          <a:p>
+            <a:r>
+              <a:rPr lang="en-US" sz="1200" b="0" i="0" kern="1200" dirty="0">
+                <a:solidFill>
+                  <a:schemeClr val="tx1"/>
+                </a:solidFill>
+                <a:effectLst/>
+                <a:latin typeface="+mn-lt"/>
+                <a:ea typeface="+mn-ea"/>
+                <a:cs typeface="+mn-cs"/>
+              </a:rPr>
+              <a:t>The next hyper-parameter is the </a:t>
+            </a:r>
+            <a:r>
+              <a:rPr lang="en-US" dirty="0" err="1"/>
+              <a:t>min_word</a:t>
+            </a:r>
+            <a:r>
+              <a:rPr lang="en-US" sz="1200" b="0" i="0" kern="1200" dirty="0">
+                <a:solidFill>
+                  <a:schemeClr val="tx1"/>
+                </a:solidFill>
+                <a:effectLst/>
+                <a:latin typeface="+mn-lt"/>
+                <a:ea typeface="+mn-ea"/>
+                <a:cs typeface="+mn-cs"/>
+              </a:rPr>
+              <a:t>, which specifies the minimum frequency of a word in the corpus for which the word representations will be generated. Finally, the most frequently occurring word will be down-sampled by a number specified by the </a:t>
+            </a:r>
+            <a:r>
+              <a:rPr lang="en-US" dirty="0" err="1"/>
+              <a:t>down_sampling</a:t>
+            </a:r>
+            <a:r>
+              <a:rPr lang="en-US" sz="1200" b="0" i="0" kern="1200" dirty="0">
+                <a:solidFill>
+                  <a:schemeClr val="tx1"/>
+                </a:solidFill>
+                <a:effectLst/>
+                <a:latin typeface="+mn-lt"/>
+                <a:ea typeface="+mn-ea"/>
+                <a:cs typeface="+mn-cs"/>
+              </a:rPr>
+              <a:t> attribute.</a:t>
+            </a:r>
+          </a:p>
+          <a:p>
+            <a:endParaRPr lang="en-US" sz="1200" b="0" i="0" kern="1200" dirty="0">
+              <a:solidFill>
+                <a:schemeClr val="tx1"/>
+              </a:solidFill>
+              <a:effectLst/>
+              <a:latin typeface="+mn-lt"/>
+              <a:ea typeface="+mn-ea"/>
+              <a:cs typeface="+mn-cs"/>
+            </a:endParaRPr>
+          </a:p>
+          <a:p>
+            <a:r>
+              <a:rPr lang="en-US" dirty="0"/>
+              <a:t>Preprocessing:</a:t>
+            </a:r>
+          </a:p>
+          <a:p>
+            <a:pPr marL="285750" indent="-285750">
+              <a:buFontTx/>
+              <a:buChar char="-"/>
+            </a:pPr>
+            <a:r>
+              <a:rPr lang="en-US" dirty="0"/>
+              <a:t>All to lower case</a:t>
+            </a:r>
+          </a:p>
+          <a:p>
+            <a:pPr marL="285750" indent="-285750">
+              <a:buFontTx/>
+              <a:buChar char="-"/>
+            </a:pPr>
+            <a:r>
+              <a:rPr lang="en-US" dirty="0"/>
+              <a:t>All to root form</a:t>
+            </a:r>
+          </a:p>
+          <a:p>
+            <a:pPr marL="285750" indent="-285750">
+              <a:buFontTx/>
+              <a:buChar char="-"/>
+            </a:pPr>
+            <a:r>
+              <a:rPr lang="en-US" dirty="0"/>
+              <a:t>Remove stop words</a:t>
+            </a:r>
+          </a:p>
+          <a:p>
+            <a:endParaRPr lang="en-US" dirty="0"/>
+          </a:p>
+          <a:p>
+            <a:endParaRPr lang="en-US" dirty="0"/>
+          </a:p>
+          <a:p>
+            <a:r>
+              <a:rPr lang="en-US" dirty="0" err="1"/>
+              <a:t>Embedding_size</a:t>
+            </a:r>
+            <a:r>
+              <a:rPr lang="en-US" dirty="0"/>
+              <a:t> is the size of the embedding vector.</a:t>
+            </a:r>
+          </a:p>
+          <a:p>
+            <a:endParaRPr lang="en-US" dirty="0"/>
+          </a:p>
+          <a:p>
+            <a:r>
+              <a:rPr lang="en-US" dirty="0"/>
+              <a:t>In other words, each word in our corpus will be represented as a 60-dimensional vector.</a:t>
+            </a:r>
+          </a:p>
+          <a:p>
+            <a:endParaRPr lang="en-CO" dirty="0"/>
+          </a:p>
+          <a:p>
+            <a:endParaRPr lang="en-CO" dirty="0"/>
+          </a:p>
+        </p:txBody>
+      </p:sp>
+      <p:sp>
+        <p:nvSpPr>
+          <p:cNvPr id="4" name="Slide Number Placeholder 3"/>
+          <p:cNvSpPr>
+            <a:spLocks noGrp="1"/>
+          </p:cNvSpPr>
+          <p:nvPr>
+            <p:ph type="sldNum"/>
+          </p:nvPr>
+        </p:nvSpPr>
+        <p:spPr/>
+        <p:txBody>
+          <a:bodyPr/>
+          <a:lstStyle/>
+          <a:p>
+            <a:pPr algn="r"/>
+            <a:fld id="{D10B2105-225F-4FE3-849A-7975E719A850}" type="slidenum">
+              <a:rPr lang="en-GB" sz="1400" b="0" strike="noStrike" spc="-1" smtClean="0">
+                <a:latin typeface="Times New Roman"/>
+              </a:rPr>
+              <a:t>17</a:t>
+            </a:fld>
+            <a:endParaRPr lang="en-GB" sz="1400" b="0" strike="noStrike" spc="-1">
+              <a:latin typeface="Times New Roman"/>
+            </a:endParaRPr>
+          </a:p>
+        </p:txBody>
+      </p:sp>
+    </p:spTree>
+    <p:extLst>
+      <p:ext uri="{BB962C8B-B14F-4D97-AF65-F5344CB8AC3E}">
+        <p14:creationId xmlns:p14="http://schemas.microsoft.com/office/powerpoint/2010/main" val="2738393251"/>
+      </p:ext>
+    </p:extLst>
+  </p:cSld>
+  <p:clrMapOvr>
+    <a:masterClrMapping/>
+  </p:clrMapOvr>
+</p:notes>
+</file>
+
+<file path=ppt/notesSlides/notesSlide11.xml><?xml version="1.0" encoding="utf-8"?>
+<p:notes xmlns:a="http://schemas.openxmlformats.org/drawingml/2006/main" xmlns:r="http://schemas.openxmlformats.org/officeDocument/2006/relationships" xmlns:p="http://schemas.openxmlformats.org/presentationml/2006/main">
+  <p:cSld>
+    <p:spTree>
+      <p:nvGrpSpPr>
+        <p:cNvPr id="1" name=""/>
+        <p:cNvGrpSpPr/>
+        <p:nvPr/>
+      </p:nvGrpSpPr>
+      <p:grpSpPr>
+        <a:xfrm>
+          <a:off x="0" y="0"/>
+          <a:ext cx="0" cy="0"/>
+          <a:chOff x="0" y="0"/>
+          <a:chExt cx="0" cy="0"/>
+        </a:xfrm>
+      </p:grpSpPr>
+      <p:sp>
+        <p:nvSpPr>
+          <p:cNvPr id="2" name="Slide Image Placeholder 1"/>
+          <p:cNvSpPr>
+            <a:spLocks noGrp="1" noRot="1" noChangeAspect="1"/>
+          </p:cNvSpPr>
+          <p:nvPr>
+            <p:ph type="sldImg"/>
+          </p:nvPr>
+        </p:nvSpPr>
+        <p:spPr>
+          <a:xfrm>
+            <a:off x="1370013" y="763588"/>
+            <a:ext cx="5030787" cy="3771900"/>
+          </a:xfrm>
+        </p:spPr>
+      </p:sp>
+      <p:sp>
+        <p:nvSpPr>
+          <p:cNvPr id="3" name="Notes Placeholder 2"/>
+          <p:cNvSpPr>
+            <a:spLocks noGrp="1"/>
+          </p:cNvSpPr>
+          <p:nvPr>
+            <p:ph type="body" idx="1"/>
+          </p:nvPr>
+        </p:nvSpPr>
+        <p:spPr/>
+        <p:txBody>
+          <a:bodyPr/>
+          <a:lstStyle/>
+          <a:p>
+            <a:endParaRPr lang="en-US" dirty="0"/>
+          </a:p>
+          <a:p>
+            <a:r>
+              <a:rPr lang="en-US" dirty="0"/>
+              <a:t>[Potentially download and run some simple </a:t>
+            </a:r>
+            <a:r>
+              <a:rPr lang="en-US" dirty="0" err="1"/>
+              <a:t>fasttext</a:t>
+            </a:r>
+            <a:r>
+              <a:rPr lang="en-US" dirty="0"/>
+              <a:t> code and show the results]</a:t>
+            </a:r>
             <a:endParaRPr lang="en-CO" dirty="0"/>
           </a:p>
           <a:p>
@@ -832,7 +1080,7 @@
 </p:notes>
 </file>
 
-<file path=ppt/notesSlides/notesSlide11.xml><?xml version="1.0" encoding="utf-8"?>
+<file path=ppt/notesSlides/notesSlide12.xml><?xml version="1.0" encoding="utf-8"?>
 <p:notes xmlns:a="http://schemas.openxmlformats.org/drawingml/2006/main" xmlns:r="http://schemas.openxmlformats.org/officeDocument/2006/relationships" xmlns:p="http://schemas.openxmlformats.org/presentationml/2006/main">
   <p:cSld>
     <p:spTree>
@@ -1238,22 +1486,7 @@
               <a:tabLst/>
               <a:defRPr/>
             </a:pPr>
-            <a:r>
-              <a:rPr lang="en-US" sz="1200" b="1" kern="1200" dirty="0">
-                <a:solidFill>
-                  <a:schemeClr val="tx1"/>
-                </a:solidFill>
-                <a:effectLst/>
-                <a:latin typeface="+mn-lt"/>
-                <a:ea typeface="+mn-ea"/>
-                <a:cs typeface="+mn-cs"/>
-              </a:rPr>
-              <a:t>Skip-gram</a:t>
-            </a:r>
-            <a:r>
-              <a:rPr lang="en-US" dirty="0"/>
-              <a:t> model the context is predicted based on the source word</a:t>
-            </a:r>
+            <a:endParaRPr lang="en-US" dirty="0"/>
           </a:p>
           <a:p>
             <a:pPr marL="0" marR="0" lvl="0" indent="0" algn="l" defTabSz="914400" rtl="0" eaLnBrk="1" fontAlgn="auto" latinLnBrk="0" hangingPunct="1">
@@ -1273,180 +1506,10 @@
               <a:tabLst/>
               <a:defRPr/>
             </a:pPr>
-            <a:endParaRPr lang="en-US" dirty="0"/>
-          </a:p>
-          <a:p>
-            <a:pPr marL="0" marR="0" lvl="0" indent="0" algn="l" defTabSz="914400" rtl="0" eaLnBrk="1" fontAlgn="auto" latinLnBrk="0" hangingPunct="1">
-              <a:lnSpc>
-                <a:spcPct val="100000"/>
-              </a:lnSpc>
-              <a:spcBef>
-                <a:spcPts val="0"/>
-              </a:spcBef>
-              <a:spcAft>
-                <a:spcPts val="0"/>
-              </a:spcAft>
-              <a:buClrTx/>
-              <a:buSzTx/>
-              <a:buFontTx/>
-              <a:buNone/>
-              <a:tabLst/>
-              <a:defRPr/>
-            </a:pPr>
-            <a:endParaRPr lang="en-US" dirty="0"/>
-          </a:p>
-          <a:p>
-            <a:pPr marL="0" marR="0" lvl="0" indent="0" algn="l" defTabSz="914400" rtl="0" eaLnBrk="1" fontAlgn="auto" latinLnBrk="0" hangingPunct="1">
-              <a:lnSpc>
-                <a:spcPct val="100000"/>
-              </a:lnSpc>
-              <a:spcBef>
-                <a:spcPts val="0"/>
-              </a:spcBef>
-              <a:spcAft>
-                <a:spcPts val="0"/>
-              </a:spcAft>
-              <a:buClrTx/>
-              <a:buSzTx/>
-              <a:buFontTx/>
-              <a:buNone/>
-              <a:tabLst/>
-              <a:defRPr/>
-            </a:pPr>
             <a:r>
               <a:rPr lang="en-US" dirty="0"/>
               <a:t>In both architectures, after training, the output layer is “thrown away” and the hidden layer is used as the vector representation of the words.</a:t>
             </a:r>
-          </a:p>
-          <a:p>
-            <a:pPr marL="0" marR="0" lvl="0" indent="0" algn="l" defTabSz="914400" rtl="0" eaLnBrk="1" fontAlgn="auto" latinLnBrk="0" hangingPunct="1">
-              <a:lnSpc>
-                <a:spcPct val="100000"/>
-              </a:lnSpc>
-              <a:spcBef>
-                <a:spcPts val="0"/>
-              </a:spcBef>
-              <a:spcAft>
-                <a:spcPts val="0"/>
-              </a:spcAft>
-              <a:buClrTx/>
-              <a:buSzTx/>
-              <a:buFontTx/>
-              <a:buNone/>
-              <a:tabLst/>
-              <a:defRPr/>
-            </a:pPr>
-            <a:endParaRPr lang="en-US" dirty="0"/>
-          </a:p>
-          <a:p>
-            <a:pPr marL="0" marR="0" lvl="0" indent="0" algn="l" defTabSz="914400" rtl="0" eaLnBrk="1" fontAlgn="auto" latinLnBrk="0" hangingPunct="1">
-              <a:lnSpc>
-                <a:spcPct val="100000"/>
-              </a:lnSpc>
-              <a:spcBef>
-                <a:spcPts val="0"/>
-              </a:spcBef>
-              <a:spcAft>
-                <a:spcPts val="0"/>
-              </a:spcAft>
-              <a:buClrTx/>
-              <a:buSzTx/>
-              <a:buFontTx/>
-              <a:buNone/>
-              <a:tabLst/>
-              <a:defRPr/>
-            </a:pPr>
-            <a:r>
-              <a:rPr lang="en-US" dirty="0"/>
-              <a:t>Additional Note: Later this same year, “Distributed Representations of Words and Phrases and their Compositionality” was published which introduced improvements to the Skip-gram model such as Negative Sampling and Subsampling of Frequent Words.</a:t>
-            </a:r>
-          </a:p>
-          <a:p>
-            <a:pPr marL="0" marR="0" lvl="0" indent="0" algn="l" defTabSz="914400" rtl="0" eaLnBrk="1" fontAlgn="auto" latinLnBrk="0" hangingPunct="1">
-              <a:lnSpc>
-                <a:spcPct val="100000"/>
-              </a:lnSpc>
-              <a:spcBef>
-                <a:spcPts val="0"/>
-              </a:spcBef>
-              <a:spcAft>
-                <a:spcPts val="0"/>
-              </a:spcAft>
-              <a:buClrTx/>
-              <a:buSzTx/>
-              <a:buFontTx/>
-              <a:buNone/>
-              <a:tabLst/>
-              <a:defRPr/>
-            </a:pPr>
-            <a:r>
-              <a:rPr lang="en-US" dirty="0"/>
-              <a:t>[</a:t>
-            </a:r>
-            <a:r>
-              <a:rPr lang="en-US" dirty="0" err="1"/>
-              <a:t>Mikolov</a:t>
-            </a:r>
-            <a:r>
-              <a:rPr lang="en-US" dirty="0"/>
-              <a:t> et al., Distributed Representations of Words and Phrases and their Compositionality: https://arxiv.org/abs/1310.4546]</a:t>
-            </a:r>
-          </a:p>
-          <a:p>
-            <a:pPr marL="0" marR="0" lvl="0" indent="0" algn="l" defTabSz="914400" rtl="0" eaLnBrk="1" fontAlgn="auto" latinLnBrk="0" hangingPunct="1">
-              <a:lnSpc>
-                <a:spcPct val="100000"/>
-              </a:lnSpc>
-              <a:spcBef>
-                <a:spcPts val="0"/>
-              </a:spcBef>
-              <a:spcAft>
-                <a:spcPts val="0"/>
-              </a:spcAft>
-              <a:buClrTx/>
-              <a:buSzTx/>
-              <a:buFontTx/>
-              <a:buNone/>
-              <a:tabLst/>
-              <a:defRPr/>
-            </a:pPr>
-            <a:endParaRPr lang="en-US" sz="1200" b="0" i="0" kern="1200" dirty="0">
-              <a:solidFill>
-                <a:schemeClr val="tx1"/>
-              </a:solidFill>
-              <a:effectLst/>
-              <a:latin typeface="+mn-lt"/>
-              <a:ea typeface="+mn-ea"/>
-              <a:cs typeface="+mn-cs"/>
-            </a:endParaRPr>
-          </a:p>
-          <a:p>
-            <a:pPr marL="0" marR="0" lvl="0" indent="0" algn="l" defTabSz="914400" rtl="0" eaLnBrk="1" fontAlgn="auto" latinLnBrk="0" hangingPunct="1">
-              <a:lnSpc>
-                <a:spcPct val="100000"/>
-              </a:lnSpc>
-              <a:spcBef>
-                <a:spcPts val="0"/>
-              </a:spcBef>
-              <a:spcAft>
-                <a:spcPts val="0"/>
-              </a:spcAft>
-              <a:buClrTx/>
-              <a:buSzTx/>
-              <a:buFontTx/>
-              <a:buNone/>
-              <a:tabLst/>
-              <a:defRPr/>
-            </a:pPr>
-            <a:endParaRPr lang="en-US" sz="1200" b="0" i="0" kern="1200" dirty="0">
-              <a:solidFill>
-                <a:schemeClr val="tx1"/>
-              </a:solidFill>
-              <a:effectLst/>
-              <a:latin typeface="+mn-lt"/>
-              <a:ea typeface="+mn-ea"/>
-              <a:cs typeface="+mn-cs"/>
-            </a:endParaRPr>
           </a:p>
           <a:p>
             <a:pPr marL="0" marR="0" lvl="0" indent="0" algn="l" defTabSz="914400" rtl="0" eaLnBrk="1" fontAlgn="auto" latinLnBrk="0" hangingPunct="1">
@@ -1611,18 +1674,15 @@
               <a:tabLst/>
               <a:defRPr/>
             </a:pPr>
-            <a:r>
-              <a:rPr lang="en-US" sz="1200" b="0" i="0" kern="1200" dirty="0">
-                <a:solidFill>
-                  <a:schemeClr val="tx1"/>
-                </a:solidFill>
-                <a:effectLst/>
-                <a:latin typeface="+mn-lt"/>
-                <a:ea typeface="+mn-ea"/>
-                <a:cs typeface="+mn-cs"/>
-              </a:rPr>
-              <a:t>The CBOW model architecture predict the target word (the center word) based on the source context words (surrounding words).</a:t>
-            </a:r>
+            <a:endParaRPr lang="en-US" sz="1200" b="0" i="0" kern="1200" dirty="0">
+              <a:solidFill>
+                <a:schemeClr val="tx1"/>
+              </a:solidFill>
+              <a:effectLst/>
+              <a:latin typeface="+mn-lt"/>
+              <a:ea typeface="+mn-ea"/>
+              <a:cs typeface="+mn-cs"/>
+            </a:endParaRPr>
           </a:p>
           <a:p>
             <a:pPr marL="0" marR="0" lvl="0" indent="0" algn="l" defTabSz="914400" rtl="0" eaLnBrk="1" fontAlgn="auto" latinLnBrk="0" hangingPunct="1">
@@ -1762,7 +1822,7 @@
             </a:pPr>
             <a:r>
               <a:rPr lang="en-US" dirty="0"/>
-              <a:t>Additional Note: Later this same year, “Distributed Representations of Words and Phrases and their Compositionality” was published which introduced improvements to the Skip-gram model such as Negative Sampling and Subsampling of Frequent Words.</a:t>
+              <a:t>Additional Note: Later this same year, “Distributed Representations of Words and Phrases and their Compositionality” was published which introduced improvements to the Skip-gram model such as Negative Sampling and Subsampling of Frequent Words and </a:t>
             </a:r>
           </a:p>
           <a:p>
@@ -2495,102 +2555,80 @@
           <a:bodyPr/>
           <a:lstStyle/>
           <a:p>
+            <a:r>
+              <a:rPr lang="en-US" dirty="0"/>
+              <a:t>"The task consists of analogies such as "Germany" : "Berlin" :: "France" : ?, which are solved by finding a vector x such that </a:t>
+            </a:r>
+            <a:r>
+              <a:rPr lang="en-US" dirty="0" err="1"/>
+              <a:t>vec</a:t>
+            </a:r>
+            <a:r>
+              <a:rPr lang="en-US" dirty="0"/>
+              <a:t>(x) is closest to </a:t>
+            </a:r>
+            <a:r>
+              <a:rPr lang="en-US" dirty="0" err="1"/>
+              <a:t>vec</a:t>
+            </a:r>
+            <a:r>
+              <a:rPr lang="en-US" dirty="0"/>
+              <a:t>("Berlin") - </a:t>
+            </a:r>
+            <a:r>
+              <a:rPr lang="en-US" dirty="0" err="1"/>
+              <a:t>vec</a:t>
+            </a:r>
+            <a:r>
+              <a:rPr lang="en-US" dirty="0"/>
+              <a:t>("Germany") + </a:t>
+            </a:r>
+            <a:r>
+              <a:rPr lang="en-US" dirty="0" err="1"/>
+              <a:t>vec</a:t>
+            </a:r>
+            <a:r>
+              <a:rPr lang="en-US" dirty="0"/>
+              <a:t>("France") according to the cosine distance (we discard the input words from the search). This specific example is considered to have been answered correctly if x is "Paris". The task has two broad categories: the syntactic analogies (such as "quick" : "quickly" :: "slow" : "slowly") and the semantic analogies, such as the country to capital city relationship.“</a:t>
+            </a:r>
+          </a:p>
+          <a:p>
             <a:endParaRPr lang="en-US" dirty="0"/>
           </a:p>
           <a:p>
             <a:r>
               <a:rPr lang="en-US" dirty="0"/>
-              <a:t>[Potentially download and run some simple </a:t>
+              <a:t>[</a:t>
             </a:r>
             <a:r>
               <a:rPr lang="en-US" dirty="0" err="1"/>
-              <a:t>fasttext</a:t>
+              <a:t>Mikolov</a:t>
             </a:r>
             <a:r>
               <a:rPr lang="en-US" dirty="0"/>
-              <a:t> code and show the results]</a:t>
+              <a:t> et al., Distributed Representations of Words and Phrases and their Compositionality: https://arxiv.org/abs/1310.4546]</a:t>
             </a:r>
           </a:p>
           <a:p>
             <a:endParaRPr lang="en-US" dirty="0"/>
           </a:p>
           <a:p>
-            <a:r>
+            <a:endParaRPr lang="en-US" dirty="0"/>
+          </a:p>
+          <a:p>
+            <a:endParaRPr lang="en-US" dirty="0"/>
+          </a:p>
+          <a:p>
+            <a:endParaRPr lang="en-US" dirty="0"/>
+          </a:p>
+          <a:p>
+            <a:br>
               <a:rPr lang="en-US" dirty="0"/>
-              <a:t>G</a:t>
-            </a:r>
-            <a:r>
-              <a:rPr lang="en-CO" dirty="0"/>
-              <a:t>ensim.models.fastext </a:t>
-            </a:r>
-          </a:p>
-          <a:p>
-            <a:r>
-              <a:rPr lang="en-US" dirty="0"/>
-              <a:t>N</a:t>
-            </a:r>
-            <a:r>
-              <a:rPr lang="en-CO" dirty="0"/>
-              <a:t>ltk </a:t>
-            </a:r>
-            <a:r>
-              <a:rPr lang="en-CO" dirty="0">
-                <a:sym typeface="Wingdings" pitchFamily="2" charset="2"/>
-              </a:rPr>
-              <a:t> natural language toolkit</a:t>
-            </a:r>
-          </a:p>
-          <a:p>
-            <a:r>
-              <a:rPr lang="en-US" dirty="0"/>
-              <a:t>W</a:t>
-            </a:r>
-            <a:r>
-              <a:rPr lang="en-CO" dirty="0"/>
-              <a:t>ikipedia</a:t>
-            </a:r>
-          </a:p>
-          <a:p>
+            </a:br>
             <a:endParaRPr lang="en-US" dirty="0"/>
           </a:p>
           <a:p>
             <a:endParaRPr lang="en-US" dirty="0"/>
-          </a:p>
-          <a:p>
-            <a:pPr marL="285750" indent="-285750">
-              <a:lnSpc>
-                <a:spcPct val="90000"/>
-              </a:lnSpc>
-              <a:spcBef>
-                <a:spcPts val="1000"/>
-              </a:spcBef>
-              <a:buFont typeface="Arial" panose="020B0604020202020204" pitchFamily="34" charset="0"/>
-              <a:buChar char="•"/>
-            </a:pPr>
-            <a:r>
-              <a:rPr lang="en-US" dirty="0"/>
-              <a:t>Text Classification (hate speech detection, etc.)</a:t>
-            </a:r>
-          </a:p>
-          <a:p>
-            <a:pPr marL="0" lvl="1">
-              <a:lnSpc>
-                <a:spcPct val="90000"/>
-              </a:lnSpc>
-              <a:spcBef>
-                <a:spcPts val="1000"/>
-              </a:spcBef>
-            </a:pPr>
-            <a:r>
-              <a:rPr lang="en-US" dirty="0"/>
-              <a:t>	Assigning a set of predefined categories to free-text. Text classifiers can 	be used to organize, structure, and categorize</a:t>
-            </a:r>
-          </a:p>
-          <a:p>
-            <a:endParaRPr lang="en-CO" dirty="0"/>
-          </a:p>
-          <a:p>
-            <a:endParaRPr lang="en-CO" dirty="0"/>
           </a:p>
         </p:txBody>
       </p:sp>
@@ -2614,7 +2652,7 @@
               <a:rPr lang="en-GB" sz="1400" b="0" strike="noStrike" spc="-1" smtClean="0">
                 <a:latin typeface="Times New Roman"/>
               </a:rPr>
-              <a:t>16</a:t>
+              <a:t>11</a:t>
             </a:fld>
             <a:endParaRPr lang="en-GB" sz="1400" b="0" strike="noStrike" spc="-1">
               <a:latin typeface="Times New Roman"/>
@@ -2625,7 +2663,7 @@
     </p:spTree>
     <p:extLst>
       <p:ext uri="{BB962C8B-B14F-4D97-AF65-F5344CB8AC3E}">
-        <p14:creationId xmlns:p14="http://schemas.microsoft.com/office/powerpoint/2010/main" val="970338645"/>
+        <p14:creationId xmlns:p14="http://schemas.microsoft.com/office/powerpoint/2010/main" val="2411557342"/>
       </p:ext>
     </p:extLst>
   </p:cSld>
@@ -2705,161 +2743,74 @@
           </a:p>
           <a:p>
             <a:r>
-              <a:rPr lang="en-US" sz="1200" b="0" i="0" kern="1200" dirty="0">
-                <a:solidFill>
-                  <a:schemeClr val="tx1"/>
-                </a:solidFill>
-                <a:effectLst/>
-                <a:latin typeface="+mn-lt"/>
-                <a:ea typeface="+mn-ea"/>
-                <a:cs typeface="+mn-cs"/>
+              <a:rPr lang="en-US" dirty="0"/>
+              <a:t>G</a:t>
+            </a:r>
+            <a:r>
+              <a:rPr lang="en-CO" dirty="0"/>
+              <a:t>ensim.models.fastext </a:t>
+            </a:r>
+          </a:p>
+          <a:p>
+            <a:r>
+              <a:rPr lang="en-US" dirty="0"/>
+              <a:t>N</a:t>
+            </a:r>
+            <a:r>
+              <a:rPr lang="en-CO" dirty="0"/>
+              <a:t>ltk </a:t>
+            </a:r>
+            <a:r>
+              <a:rPr lang="en-CO" dirty="0">
+                <a:sym typeface="Wingdings" pitchFamily="2" charset="2"/>
               </a:rPr>
-              <a:t>The </a:t>
-            </a:r>
-            <a:r>
-              <a:rPr lang="en-US" dirty="0" err="1"/>
-              <a:t>window_size</a:t>
-            </a:r>
-            <a:r>
-              <a:rPr lang="en-US" sz="1200" b="0" i="0" kern="1200" dirty="0">
-                <a:solidFill>
-                  <a:schemeClr val="tx1"/>
-                </a:solidFill>
-                <a:effectLst/>
-                <a:latin typeface="+mn-lt"/>
-                <a:ea typeface="+mn-ea"/>
-                <a:cs typeface="+mn-cs"/>
-              </a:rPr>
-              <a:t> is the size of the number of words occurring before and after the word based on which the word representations will be learned for the word. </a:t>
-            </a:r>
-          </a:p>
-          <a:p>
-            <a:endParaRPr lang="en-US" sz="1200" b="0" i="0" kern="1200" dirty="0">
-              <a:solidFill>
-                <a:schemeClr val="tx1"/>
-              </a:solidFill>
-              <a:effectLst/>
-              <a:latin typeface="+mn-lt"/>
-              <a:ea typeface="+mn-ea"/>
-              <a:cs typeface="+mn-cs"/>
-            </a:endParaRPr>
-          </a:p>
-          <a:p>
-            <a:r>
-              <a:rPr lang="en-US" sz="1200" b="0" i="0" kern="1200" dirty="0">
-                <a:solidFill>
-                  <a:schemeClr val="tx1"/>
-                </a:solidFill>
-                <a:effectLst/>
-                <a:latin typeface="+mn-lt"/>
-                <a:ea typeface="+mn-ea"/>
-                <a:cs typeface="+mn-cs"/>
-              </a:rPr>
-              <a:t>The next hyper-parameter is the </a:t>
-            </a:r>
-            <a:r>
-              <a:rPr lang="en-US" dirty="0" err="1"/>
-              <a:t>min_word</a:t>
-            </a:r>
-            <a:r>
-              <a:rPr lang="en-US" sz="1200" b="0" i="0" kern="1200" dirty="0">
-                <a:solidFill>
-                  <a:schemeClr val="tx1"/>
-                </a:solidFill>
-                <a:effectLst/>
-                <a:latin typeface="+mn-lt"/>
-                <a:ea typeface="+mn-ea"/>
-                <a:cs typeface="+mn-cs"/>
-              </a:rPr>
-              <a:t>, which specifies the minimum frequency of a word in the corpus for which the word representations will be generated. Finally, the most frequently occurring word will be down-sampled by a number specified by the </a:t>
-            </a:r>
-            <a:r>
-              <a:rPr lang="en-US" dirty="0" err="1"/>
-              <a:t>down_sampling</a:t>
-            </a:r>
-            <a:r>
-              <a:rPr lang="en-US" sz="1200" b="0" i="0" kern="1200" dirty="0">
-                <a:solidFill>
-                  <a:schemeClr val="tx1"/>
-                </a:solidFill>
-                <a:effectLst/>
-                <a:latin typeface="+mn-lt"/>
-                <a:ea typeface="+mn-ea"/>
-                <a:cs typeface="+mn-cs"/>
-              </a:rPr>
-              <a:t> attribute.</a:t>
-            </a:r>
-          </a:p>
-          <a:p>
-            <a:endParaRPr lang="en-US" sz="1200" b="0" i="0" kern="1200" dirty="0">
-              <a:solidFill>
-                <a:schemeClr val="tx1"/>
-              </a:solidFill>
-              <a:effectLst/>
-              <a:latin typeface="+mn-lt"/>
-              <a:ea typeface="+mn-ea"/>
-              <a:cs typeface="+mn-cs"/>
-            </a:endParaRPr>
+              <a:t> natural language toolkit</a:t>
+            </a:r>
           </a:p>
           <a:p>
             <a:r>
               <a:rPr lang="en-US" dirty="0"/>
-              <a:t>Preprocessing:</a:t>
-            </a:r>
+              <a:t>W</a:t>
+            </a:r>
+            <a:r>
+              <a:rPr lang="en-CO" dirty="0"/>
+              <a:t>ikipedia</a:t>
+            </a:r>
+          </a:p>
+          <a:p>
+            <a:endParaRPr lang="en-US" dirty="0"/>
+          </a:p>
+          <a:p>
+            <a:endParaRPr lang="en-US" dirty="0"/>
           </a:p>
           <a:p>
             <a:pPr marL="285750" indent="-285750">
-              <a:buFontTx/>
-              <a:buChar char="-"/>
+              <a:lnSpc>
+                <a:spcPct val="90000"/>
+              </a:lnSpc>
+              <a:spcBef>
+                <a:spcPts val="1000"/>
+              </a:spcBef>
+              <a:buFont typeface="Arial" panose="020B0604020202020204" pitchFamily="34" charset="0"/>
+              <a:buChar char="•"/>
             </a:pPr>
             <a:r>
               <a:rPr lang="en-US" dirty="0"/>
-              <a:t>All to lower case</a:t>
-            </a:r>
-          </a:p>
-          <a:p>
-            <a:pPr marL="285750" indent="-285750">
-              <a:buFontTx/>
-              <a:buChar char="-"/>
+              <a:t>Text Classification (hate speech detection, etc.)</a:t>
+            </a:r>
+          </a:p>
+          <a:p>
+            <a:pPr marL="0" lvl="1">
+              <a:lnSpc>
+                <a:spcPct val="90000"/>
+              </a:lnSpc>
+              <a:spcBef>
+                <a:spcPts val="1000"/>
+              </a:spcBef>
             </a:pPr>
             <a:r>
               <a:rPr lang="en-US" dirty="0"/>
-              <a:t>All to root form</a:t>
-            </a:r>
-          </a:p>
-          <a:p>
-            <a:pPr marL="285750" indent="-285750">
-              <a:buFontTx/>
-              <a:buChar char="-"/>
-            </a:pPr>
-            <a:r>
-              <a:rPr lang="en-US" dirty="0"/>
-              <a:t>Remove stop words</a:t>
-            </a:r>
-          </a:p>
-          <a:p>
-            <a:endParaRPr lang="en-US" dirty="0"/>
-          </a:p>
-          <a:p>
-            <a:endParaRPr lang="en-US" dirty="0"/>
-          </a:p>
-          <a:p>
-            <a:r>
-              <a:rPr lang="en-US" dirty="0" err="1"/>
-              <a:t>Embedding_size</a:t>
-            </a:r>
-            <a:r>
-              <a:rPr lang="en-US" dirty="0"/>
-              <a:t> is the size of the embedding vector.</a:t>
-            </a:r>
-          </a:p>
-          <a:p>
-            <a:endParaRPr lang="en-US" dirty="0"/>
-          </a:p>
-          <a:p>
-            <a:r>
-              <a:rPr lang="en-US" dirty="0"/>
-              <a:t>In other words, each word in our corpus will be represented as a 60-dimensional vector.</a:t>
+              <a:t>	Assigning a set of predefined categories to free-text. Text classifiers can 	be used to organize, structure, and categorize</a:t>
             </a:r>
           </a:p>
           <a:p>
@@ -2890,7 +2841,7 @@
               <a:rPr lang="en-GB" sz="1400" b="0" strike="noStrike" spc="-1" smtClean="0">
                 <a:latin typeface="Times New Roman"/>
               </a:rPr>
-              <a:t>17</a:t>
+              <a:t>16</a:t>
             </a:fld>
             <a:endParaRPr lang="en-GB" sz="1400" b="0" strike="noStrike" spc="-1">
               <a:latin typeface="Times New Roman"/>
@@ -2901,7 +2852,7 @@
     </p:spTree>
     <p:extLst>
       <p:ext uri="{BB962C8B-B14F-4D97-AF65-F5344CB8AC3E}">
-        <p14:creationId xmlns:p14="http://schemas.microsoft.com/office/powerpoint/2010/main" val="2738393251"/>
+        <p14:creationId xmlns:p14="http://schemas.microsoft.com/office/powerpoint/2010/main" val="970338645"/>
       </p:ext>
     </p:extLst>
   </p:cSld>
@@ -9251,7 +9202,7 @@
           <p:nvPr/>
         </p:nvPicPr>
         <p:blipFill>
-          <a:blip r:embed="rId2"/>
+          <a:blip r:embed="rId3"/>
           <a:stretch>
             <a:fillRect/>
           </a:stretch>
@@ -9623,7 +9574,7 @@
                 </a:solidFill>
                 <a:latin typeface="Arial"/>
               </a:rPr>
-              <a:t>Main Contribution</a:t>
+              <a:t>Main Contributions</a:t>
             </a:r>
           </a:p>
         </p:txBody>
@@ -9643,7 +9594,7 @@
         <p:spPr>
           <a:xfrm>
             <a:off x="338664" y="1666369"/>
-            <a:ext cx="8466671" cy="2308324"/>
+            <a:ext cx="8466671" cy="2585323"/>
           </a:xfrm>
           <a:prstGeom prst="rect">
             <a:avLst/>
@@ -9675,7 +9626,7 @@
             </a:pPr>
             <a:r>
               <a:rPr lang="en-US" dirty="0"/>
-              <a:t>Works well for syntactic analogies and does not degrade semantic much.</a:t>
+              <a:t>Works well for syntactic analogies and does not degrade semantic analogies much.</a:t>
             </a:r>
           </a:p>
           <a:p>
@@ -13086,15 +13037,15 @@
         </p:nvSpPr>
         <p:spPr>
           <a:xfrm>
-            <a:off x="2450297" y="1035553"/>
-            <a:ext cx="4243406" cy="430887"/>
-          </a:xfrm>
-          <a:prstGeom prst="rect">
-            <a:avLst/>
-          </a:prstGeom>
-        </p:spPr>
-        <p:txBody>
-          <a:bodyPr wrap="none">
+            <a:off x="1513905" y="1005643"/>
+            <a:ext cx="6116187" cy="430887"/>
+          </a:xfrm>
+          <a:prstGeom prst="rect">
+            <a:avLst/>
+          </a:prstGeom>
+        </p:spPr>
+        <p:txBody>
+          <a:bodyPr wrap="square">
             <a:spAutoFit/>
           </a:bodyPr>
           <a:lstStyle/>
@@ -13111,7 +13062,7 @@
                 </a:solidFill>
                 <a:latin typeface="Arial"/>
               </a:rPr>
-              <a:t>Background (Word2Vec, 2013)</a:t>
+              <a:t>Background (Word2Vec, 2013) - CBOW</a:t>
             </a:r>
             <a:endParaRPr lang="en-CO" sz="2200" b="1" spc="-1" dirty="0">
               <a:solidFill>
@@ -13122,12 +13073,67 @@
           </a:p>
         </p:txBody>
       </p:sp>
+      <p:sp>
+        <p:nvSpPr>
+          <p:cNvPr id="7" name="TextBox 6">
+            <a:extLst>
+              <a:ext uri="{FF2B5EF4-FFF2-40B4-BE49-F238E27FC236}">
+                <a16:creationId xmlns:a16="http://schemas.microsoft.com/office/drawing/2014/main" id="{78A0EA90-EDED-4D14-A2DC-5A8023193046}"/>
+              </a:ext>
+            </a:extLst>
+          </p:cNvPr>
+          <p:cNvSpPr txBox="1"/>
+          <p:nvPr/>
+        </p:nvSpPr>
+        <p:spPr>
+          <a:xfrm>
+            <a:off x="264694" y="6279230"/>
+            <a:ext cx="8614611" cy="261610"/>
+          </a:xfrm>
+          <a:prstGeom prst="rect">
+            <a:avLst/>
+          </a:prstGeom>
+          <a:noFill/>
+        </p:spPr>
+        <p:txBody>
+          <a:bodyPr wrap="square" rtlCol="0">
+            <a:spAutoFit/>
+          </a:bodyPr>
+          <a:lstStyle/>
+          <a:p>
+            <a:pPr algn="l"/>
+            <a:r>
+              <a:rPr lang="en-US" sz="1050" b="0" i="0" u="none" strike="noStrike" baseline="0" dirty="0" err="1">
+                <a:solidFill>
+                  <a:srgbClr val="FF0000"/>
+                </a:solidFill>
+                <a:latin typeface="ArialNarrow"/>
+              </a:rPr>
+              <a:t>Mikolov</a:t>
+            </a:r>
+            <a:r>
+              <a:rPr lang="en-US" sz="1050" b="0" i="0" u="none" strike="noStrike" baseline="0" dirty="0">
+                <a:solidFill>
+                  <a:srgbClr val="FF0000"/>
+                </a:solidFill>
+                <a:latin typeface="ArialNarrow"/>
+              </a:rPr>
+              <a:t> et al., Word2Vec: Efficient Estimation of Word Representations in Vector Space: https://arxiv.org/pdf/1301.3781.pdf</a:t>
+            </a:r>
+            <a:endParaRPr lang="en-US" sz="1050" dirty="0">
+              <a:solidFill>
+                <a:srgbClr val="FF0000"/>
+              </a:solidFill>
+            </a:endParaRPr>
+          </a:p>
+        </p:txBody>
+      </p:sp>
       <p:pic>
         <p:nvPicPr>
-          <p:cNvPr id="6" name="Picture 5">
+          <p:cNvPr id="4" name="Picture 3">
             <a:extLst>
               <a:ext uri="{FF2B5EF4-FFF2-40B4-BE49-F238E27FC236}">
-                <a16:creationId xmlns:a16="http://schemas.microsoft.com/office/drawing/2014/main" id="{AF6E55E1-DF8B-429B-845C-89C3796F5BFE}"/>
+                <a16:creationId xmlns:a16="http://schemas.microsoft.com/office/drawing/2014/main" id="{69C30D97-9A2C-4046-9C44-29177467BE08}"/>
               </a:ext>
             </a:extLst>
           </p:cNvPr>
@@ -13144,20 +13150,50 @@
         </p:blipFill>
         <p:spPr>
           <a:xfrm>
-            <a:off x="643007" y="1466440"/>
-            <a:ext cx="7857985" cy="4573750"/>
+            <a:off x="2702690" y="1516973"/>
+            <a:ext cx="3038828" cy="3503252"/>
           </a:xfrm>
           <a:prstGeom prst="rect">
             <a:avLst/>
           </a:prstGeom>
         </p:spPr>
       </p:pic>
-      <p:sp>
-        <p:nvSpPr>
-          <p:cNvPr id="7" name="TextBox 6">
+      <p:pic>
+        <p:nvPicPr>
+          <p:cNvPr id="8" name="Picture 7">
             <a:extLst>
               <a:ext uri="{FF2B5EF4-FFF2-40B4-BE49-F238E27FC236}">
-                <a16:creationId xmlns:a16="http://schemas.microsoft.com/office/drawing/2014/main" id="{78A0EA90-EDED-4D14-A2DC-5A8023193046}"/>
+                <a16:creationId xmlns:a16="http://schemas.microsoft.com/office/drawing/2014/main" id="{3F0FBC75-15E7-427F-8BB8-C1BFC5AD630C}"/>
+              </a:ext>
+            </a:extLst>
+          </p:cNvPr>
+          <p:cNvPicPr>
+            <a:picLocks noChangeAspect="1"/>
+          </p:cNvPicPr>
+          <p:nvPr/>
+        </p:nvPicPr>
+        <p:blipFill>
+          <a:blip r:embed="rId4"/>
+          <a:stretch>
+            <a:fillRect/>
+          </a:stretch>
+        </p:blipFill>
+        <p:spPr>
+          <a:xfrm>
+            <a:off x="3557288" y="5736396"/>
+            <a:ext cx="251861" cy="195506"/>
+          </a:xfrm>
+          <a:prstGeom prst="rect">
+            <a:avLst/>
+          </a:prstGeom>
+        </p:spPr>
+      </p:pic>
+      <p:sp>
+        <p:nvSpPr>
+          <p:cNvPr id="10" name="TextBox 9">
+            <a:extLst>
+              <a:ext uri="{FF2B5EF4-FFF2-40B4-BE49-F238E27FC236}">
+                <a16:creationId xmlns:a16="http://schemas.microsoft.com/office/drawing/2014/main" id="{17305CC4-C7D4-4F2E-95C5-9C20BC933C06}"/>
               </a:ext>
             </a:extLst>
           </p:cNvPr>
@@ -13166,8 +13202,8 @@
         </p:nvSpPr>
         <p:spPr>
           <a:xfrm>
-            <a:off x="264694" y="6279230"/>
-            <a:ext cx="8614611" cy="261610"/>
+            <a:off x="1370619" y="5237548"/>
+            <a:ext cx="651140" cy="461665"/>
           </a:xfrm>
           <a:prstGeom prst="rect">
             <a:avLst/>
@@ -13175,38 +13211,437 @@
           <a:noFill/>
         </p:spPr>
         <p:txBody>
-          <a:bodyPr wrap="square" rtlCol="0">
+          <a:bodyPr wrap="none" rtlCol="0">
             <a:spAutoFit/>
           </a:bodyPr>
           <a:lstStyle/>
           <a:p>
-            <a:pPr algn="l"/>
-            <a:r>
-              <a:rPr lang="en-US" sz="1050" b="0" i="0" u="none" strike="noStrike" baseline="0" dirty="0" err="1">
+            <a:r>
+              <a:rPr lang="en-US" sz="2400" dirty="0"/>
+              <a:t>The</a:t>
+            </a:r>
+          </a:p>
+        </p:txBody>
+      </p:sp>
+      <p:sp>
+        <p:nvSpPr>
+          <p:cNvPr id="12" name="TextBox 11">
+            <a:extLst>
+              <a:ext uri="{FF2B5EF4-FFF2-40B4-BE49-F238E27FC236}">
+                <a16:creationId xmlns:a16="http://schemas.microsoft.com/office/drawing/2014/main" id="{6EA7F764-DA90-4E07-B2AD-35B409295A71}"/>
+              </a:ext>
+            </a:extLst>
+          </p:cNvPr>
+          <p:cNvSpPr txBox="1"/>
+          <p:nvPr/>
+        </p:nvSpPr>
+        <p:spPr>
+          <a:xfrm>
+            <a:off x="2085708" y="5237548"/>
+            <a:ext cx="1045927" cy="461665"/>
+          </a:xfrm>
+          <a:prstGeom prst="rect">
+            <a:avLst/>
+          </a:prstGeom>
+          <a:noFill/>
+        </p:spPr>
+        <p:txBody>
+          <a:bodyPr wrap="none" rtlCol="0">
+            <a:spAutoFit/>
+          </a:bodyPr>
+          <a:lstStyle/>
+          <a:p>
+            <a:r>
+              <a:rPr lang="en-US" sz="2400" dirty="0"/>
+              <a:t>mighty</a:t>
+            </a:r>
+          </a:p>
+        </p:txBody>
+      </p:sp>
+      <p:sp>
+        <p:nvSpPr>
+          <p:cNvPr id="14" name="TextBox 13">
+            <a:extLst>
+              <a:ext uri="{FF2B5EF4-FFF2-40B4-BE49-F238E27FC236}">
+                <a16:creationId xmlns:a16="http://schemas.microsoft.com/office/drawing/2014/main" id="{29D3AFB2-71BE-4BC3-AB62-034F8525986E}"/>
+              </a:ext>
+            </a:extLst>
+          </p:cNvPr>
+          <p:cNvSpPr txBox="1"/>
+          <p:nvPr/>
+        </p:nvSpPr>
+        <p:spPr>
+          <a:xfrm>
+            <a:off x="3195584" y="5237548"/>
+            <a:ext cx="962571" cy="461665"/>
+          </a:xfrm>
+          <a:prstGeom prst="rect">
+            <a:avLst/>
+          </a:prstGeom>
+          <a:noFill/>
+        </p:spPr>
+        <p:txBody>
+          <a:bodyPr wrap="none" rtlCol="0">
+            <a:spAutoFit/>
+          </a:bodyPr>
+          <a:lstStyle/>
+          <a:p>
+            <a:r>
+              <a:rPr lang="en-US" sz="2400" dirty="0">
                 <a:solidFill>
-                  <a:srgbClr val="FF0000"/>
+                  <a:srgbClr val="6D84B4"/>
                 </a:solidFill>
-                <a:latin typeface="ArialNarrow"/>
               </a:rPr>
-              <a:t>Mikolov</a:t>
-            </a:r>
-            <a:r>
-              <a:rPr lang="en-US" sz="1050" b="0" i="0" u="none" strike="noStrike" baseline="0" dirty="0">
-                <a:solidFill>
-                  <a:srgbClr val="FF0000"/>
-                </a:solidFill>
-                <a:latin typeface="ArialNarrow"/>
-              </a:rPr>
-              <a:t> et al., Word2Vec: Efficient Estimation of Word Representations in Vector Space: https://arxiv.org/pdf/1301.3781.pdf</a:t>
-            </a:r>
-            <a:endParaRPr lang="en-US" sz="1050" dirty="0">
-              <a:solidFill>
-                <a:srgbClr val="FF0000"/>
-              </a:solidFill>
-            </a:endParaRPr>
-          </a:p>
-        </p:txBody>
-      </p:sp>
+              <a:t>knight</a:t>
+            </a:r>
+          </a:p>
+        </p:txBody>
+      </p:sp>
+      <p:sp>
+        <p:nvSpPr>
+          <p:cNvPr id="16" name="TextBox 15">
+            <a:extLst>
+              <a:ext uri="{FF2B5EF4-FFF2-40B4-BE49-F238E27FC236}">
+                <a16:creationId xmlns:a16="http://schemas.microsoft.com/office/drawing/2014/main" id="{724597A0-5F0D-4C62-8142-1C4D73577337}"/>
+              </a:ext>
+            </a:extLst>
+          </p:cNvPr>
+          <p:cNvSpPr txBox="1"/>
+          <p:nvPr/>
+        </p:nvSpPr>
+        <p:spPr>
+          <a:xfrm>
+            <a:off x="4222104" y="5237548"/>
+            <a:ext cx="1242648" cy="461665"/>
+          </a:xfrm>
+          <a:prstGeom prst="rect">
+            <a:avLst/>
+          </a:prstGeom>
+          <a:noFill/>
+        </p:spPr>
+        <p:txBody>
+          <a:bodyPr wrap="none" rtlCol="0">
+            <a:spAutoFit/>
+          </a:bodyPr>
+          <a:lstStyle/>
+          <a:p>
+            <a:r>
+              <a:rPr lang="en-US" sz="2400" dirty="0"/>
+              <a:t>Lancelot</a:t>
+            </a:r>
+          </a:p>
+        </p:txBody>
+      </p:sp>
+      <p:sp>
+        <p:nvSpPr>
+          <p:cNvPr id="18" name="TextBox 17">
+            <a:extLst>
+              <a:ext uri="{FF2B5EF4-FFF2-40B4-BE49-F238E27FC236}">
+                <a16:creationId xmlns:a16="http://schemas.microsoft.com/office/drawing/2014/main" id="{0C05CC24-4C69-4FB5-85D6-20193295BBE3}"/>
+              </a:ext>
+            </a:extLst>
+          </p:cNvPr>
+          <p:cNvSpPr txBox="1"/>
+          <p:nvPr/>
+        </p:nvSpPr>
+        <p:spPr>
+          <a:xfrm>
+            <a:off x="5528701" y="5237548"/>
+            <a:ext cx="1002903" cy="461665"/>
+          </a:xfrm>
+          <a:prstGeom prst="rect">
+            <a:avLst/>
+          </a:prstGeom>
+          <a:noFill/>
+        </p:spPr>
+        <p:txBody>
+          <a:bodyPr wrap="none" rtlCol="0">
+            <a:spAutoFit/>
+          </a:bodyPr>
+          <a:lstStyle/>
+          <a:p>
+            <a:r>
+              <a:rPr lang="en-US" sz="2400" dirty="0"/>
+              <a:t>fought</a:t>
+            </a:r>
+          </a:p>
+        </p:txBody>
+      </p:sp>
+      <p:sp>
+        <p:nvSpPr>
+          <p:cNvPr id="20" name="TextBox 19">
+            <a:extLst>
+              <a:ext uri="{FF2B5EF4-FFF2-40B4-BE49-F238E27FC236}">
+                <a16:creationId xmlns:a16="http://schemas.microsoft.com/office/drawing/2014/main" id="{ECBD03D8-AF44-430F-BAA4-70248B0EF27B}"/>
+              </a:ext>
+            </a:extLst>
+          </p:cNvPr>
+          <p:cNvSpPr txBox="1"/>
+          <p:nvPr/>
+        </p:nvSpPr>
+        <p:spPr>
+          <a:xfrm>
+            <a:off x="6595555" y="5237548"/>
+            <a:ext cx="1147878" cy="461665"/>
+          </a:xfrm>
+          <a:prstGeom prst="rect">
+            <a:avLst/>
+          </a:prstGeom>
+          <a:noFill/>
+        </p:spPr>
+        <p:txBody>
+          <a:bodyPr wrap="none" rtlCol="0">
+            <a:spAutoFit/>
+          </a:bodyPr>
+          <a:lstStyle/>
+          <a:p>
+            <a:r>
+              <a:rPr lang="en-US" sz="2400" dirty="0"/>
+              <a:t>bravely.</a:t>
+            </a:r>
+          </a:p>
+        </p:txBody>
+      </p:sp>
+      <p:cxnSp>
+        <p:nvCxnSpPr>
+          <p:cNvPr id="22" name="Curved Connector 27">
+            <a:extLst>
+              <a:ext uri="{FF2B5EF4-FFF2-40B4-BE49-F238E27FC236}">
+                <a16:creationId xmlns:a16="http://schemas.microsoft.com/office/drawing/2014/main" id="{0E6240A0-2193-48F6-A4E8-A32115722DB3}"/>
+              </a:ext>
+            </a:extLst>
+          </p:cNvPr>
+          <p:cNvCxnSpPr>
+            <a:cxnSpLocks/>
+            <a:stCxn id="10" idx="0"/>
+            <a:endCxn id="14" idx="0"/>
+          </p:cNvCxnSpPr>
+          <p:nvPr/>
+        </p:nvCxnSpPr>
+        <p:spPr>
+          <a:xfrm rot="5400000" flipH="1" flipV="1">
+            <a:off x="2686529" y="4247208"/>
+            <a:ext cx="12700" cy="1980681"/>
+          </a:xfrm>
+          <a:prstGeom prst="curvedConnector3">
+            <a:avLst>
+              <a:gd name="adj1" fmla="val 1800000"/>
+            </a:avLst>
+          </a:prstGeom>
+          <a:ln w="12700">
+            <a:solidFill>
+              <a:srgbClr val="6D84B4"/>
+            </a:solidFill>
+            <a:tailEnd type="triangle"/>
+          </a:ln>
+        </p:spPr>
+        <p:style>
+          <a:lnRef idx="1">
+            <a:schemeClr val="accent1"/>
+          </a:lnRef>
+          <a:fillRef idx="0">
+            <a:schemeClr val="accent1"/>
+          </a:fillRef>
+          <a:effectRef idx="0">
+            <a:schemeClr val="accent1"/>
+          </a:effectRef>
+          <a:fontRef idx="minor">
+            <a:schemeClr val="tx1"/>
+          </a:fontRef>
+        </p:style>
+      </p:cxnSp>
+      <p:cxnSp>
+        <p:nvCxnSpPr>
+          <p:cNvPr id="24" name="Curved Connector 28">
+            <a:extLst>
+              <a:ext uri="{FF2B5EF4-FFF2-40B4-BE49-F238E27FC236}">
+                <a16:creationId xmlns:a16="http://schemas.microsoft.com/office/drawing/2014/main" id="{06538F7F-73D1-41C8-9B54-19E185E3A29C}"/>
+              </a:ext>
+            </a:extLst>
+          </p:cNvPr>
+          <p:cNvCxnSpPr>
+            <a:cxnSpLocks/>
+            <a:stCxn id="12" idx="0"/>
+            <a:endCxn id="14" idx="0"/>
+          </p:cNvCxnSpPr>
+          <p:nvPr/>
+        </p:nvCxnSpPr>
+        <p:spPr>
+          <a:xfrm rot="5400000" flipH="1" flipV="1">
+            <a:off x="3142771" y="4703449"/>
+            <a:ext cx="12700" cy="1068198"/>
+          </a:xfrm>
+          <a:prstGeom prst="curvedConnector3">
+            <a:avLst>
+              <a:gd name="adj1" fmla="val 1800000"/>
+            </a:avLst>
+          </a:prstGeom>
+          <a:ln w="12700">
+            <a:solidFill>
+              <a:srgbClr val="6D84B4"/>
+            </a:solidFill>
+            <a:tailEnd type="triangle"/>
+          </a:ln>
+        </p:spPr>
+        <p:style>
+          <a:lnRef idx="1">
+            <a:schemeClr val="accent1"/>
+          </a:lnRef>
+          <a:fillRef idx="0">
+            <a:schemeClr val="accent1"/>
+          </a:fillRef>
+          <a:effectRef idx="0">
+            <a:schemeClr val="accent1"/>
+          </a:effectRef>
+          <a:fontRef idx="minor">
+            <a:schemeClr val="tx1"/>
+          </a:fontRef>
+        </p:style>
+      </p:cxnSp>
+      <p:cxnSp>
+        <p:nvCxnSpPr>
+          <p:cNvPr id="26" name="Curved Connector 29">
+            <a:extLst>
+              <a:ext uri="{FF2B5EF4-FFF2-40B4-BE49-F238E27FC236}">
+                <a16:creationId xmlns:a16="http://schemas.microsoft.com/office/drawing/2014/main" id="{D6676576-5465-49B8-88A9-B3D63A7A7337}"/>
+              </a:ext>
+            </a:extLst>
+          </p:cNvPr>
+          <p:cNvCxnSpPr>
+            <a:cxnSpLocks/>
+            <a:stCxn id="16" idx="0"/>
+            <a:endCxn id="14" idx="0"/>
+          </p:cNvCxnSpPr>
+          <p:nvPr/>
+        </p:nvCxnSpPr>
+        <p:spPr>
+          <a:xfrm rot="16200000" flipV="1">
+            <a:off x="4260149" y="4654269"/>
+            <a:ext cx="12700" cy="1166558"/>
+          </a:xfrm>
+          <a:prstGeom prst="curvedConnector3">
+            <a:avLst>
+              <a:gd name="adj1" fmla="val 1800000"/>
+            </a:avLst>
+          </a:prstGeom>
+          <a:ln w="12700">
+            <a:solidFill>
+              <a:srgbClr val="6D84B4"/>
+            </a:solidFill>
+            <a:tailEnd type="triangle"/>
+          </a:ln>
+        </p:spPr>
+        <p:style>
+          <a:lnRef idx="1">
+            <a:schemeClr val="accent1"/>
+          </a:lnRef>
+          <a:fillRef idx="0">
+            <a:schemeClr val="accent1"/>
+          </a:fillRef>
+          <a:effectRef idx="0">
+            <a:schemeClr val="accent1"/>
+          </a:effectRef>
+          <a:fontRef idx="minor">
+            <a:schemeClr val="tx1"/>
+          </a:fontRef>
+        </p:style>
+      </p:cxnSp>
+      <p:cxnSp>
+        <p:nvCxnSpPr>
+          <p:cNvPr id="28" name="Curved Connector 30">
+            <a:extLst>
+              <a:ext uri="{FF2B5EF4-FFF2-40B4-BE49-F238E27FC236}">
+                <a16:creationId xmlns:a16="http://schemas.microsoft.com/office/drawing/2014/main" id="{DEE80D01-36CE-4ABE-B1E3-CEFB862FFF58}"/>
+              </a:ext>
+            </a:extLst>
+          </p:cNvPr>
+          <p:cNvCxnSpPr>
+            <a:cxnSpLocks/>
+            <a:stCxn id="18" idx="0"/>
+            <a:endCxn id="14" idx="0"/>
+          </p:cNvCxnSpPr>
+          <p:nvPr/>
+        </p:nvCxnSpPr>
+        <p:spPr>
+          <a:xfrm rot="16200000" flipV="1">
+            <a:off x="4853512" y="4060906"/>
+            <a:ext cx="12700" cy="2353283"/>
+          </a:xfrm>
+          <a:prstGeom prst="curvedConnector3">
+            <a:avLst>
+              <a:gd name="adj1" fmla="val 1800000"/>
+            </a:avLst>
+          </a:prstGeom>
+          <a:ln w="12700">
+            <a:solidFill>
+              <a:srgbClr val="6D84B4"/>
+            </a:solidFill>
+            <a:tailEnd type="triangle"/>
+          </a:ln>
+        </p:spPr>
+        <p:style>
+          <a:lnRef idx="1">
+            <a:schemeClr val="accent1"/>
+          </a:lnRef>
+          <a:fillRef idx="0">
+            <a:schemeClr val="accent1"/>
+          </a:fillRef>
+          <a:effectRef idx="0">
+            <a:schemeClr val="accent1"/>
+          </a:effectRef>
+          <a:fontRef idx="minor">
+            <a:schemeClr val="tx1"/>
+          </a:fontRef>
+        </p:style>
+      </p:cxnSp>
+      <p:cxnSp>
+        <p:nvCxnSpPr>
+          <p:cNvPr id="30" name="Curved Connector 31">
+            <a:extLst>
+              <a:ext uri="{FF2B5EF4-FFF2-40B4-BE49-F238E27FC236}">
+                <a16:creationId xmlns:a16="http://schemas.microsoft.com/office/drawing/2014/main" id="{BC27F54A-3E8F-452D-A222-D6BBF72E82C1}"/>
+              </a:ext>
+            </a:extLst>
+          </p:cNvPr>
+          <p:cNvCxnSpPr>
+            <a:cxnSpLocks/>
+            <a:stCxn id="20" idx="0"/>
+            <a:endCxn id="14" idx="0"/>
+          </p:cNvCxnSpPr>
+          <p:nvPr/>
+        </p:nvCxnSpPr>
+        <p:spPr>
+          <a:xfrm rot="16200000" flipV="1">
+            <a:off x="5423182" y="3491236"/>
+            <a:ext cx="12700" cy="3492624"/>
+          </a:xfrm>
+          <a:prstGeom prst="curvedConnector3">
+            <a:avLst>
+              <a:gd name="adj1" fmla="val 1800000"/>
+            </a:avLst>
+          </a:prstGeom>
+          <a:ln w="12700">
+            <a:solidFill>
+              <a:srgbClr val="6D84B4"/>
+            </a:solidFill>
+            <a:tailEnd type="triangle"/>
+          </a:ln>
+        </p:spPr>
+        <p:style>
+          <a:lnRef idx="1">
+            <a:schemeClr val="accent1"/>
+          </a:lnRef>
+          <a:fillRef idx="0">
+            <a:schemeClr val="accent1"/>
+          </a:fillRef>
+          <a:effectRef idx="0">
+            <a:schemeClr val="accent1"/>
+          </a:effectRef>
+          <a:fontRef idx="minor">
+            <a:schemeClr val="tx1"/>
+          </a:fontRef>
+        </p:style>
+      </p:cxnSp>
     </p:spTree>
     <p:extLst>
       <p:ext uri="{BB962C8B-B14F-4D97-AF65-F5344CB8AC3E}">
@@ -13312,56 +13747,6 @@
       </p:grpSp>
       <p:sp>
         <p:nvSpPr>
-          <p:cNvPr id="2" name="Rectangle 1">
-            <a:extLst>
-              <a:ext uri="{FF2B5EF4-FFF2-40B4-BE49-F238E27FC236}">
-                <a16:creationId xmlns:a16="http://schemas.microsoft.com/office/drawing/2014/main" id="{A898D070-DA9C-694C-A643-84E7053EFB42}"/>
-              </a:ext>
-            </a:extLst>
-          </p:cNvPr>
-          <p:cNvSpPr/>
-          <p:nvPr/>
-        </p:nvSpPr>
-        <p:spPr>
-          <a:xfrm>
-            <a:off x="3633924" y="1035553"/>
-            <a:ext cx="1876155" cy="430887"/>
-          </a:xfrm>
-          <a:prstGeom prst="rect">
-            <a:avLst/>
-          </a:prstGeom>
-        </p:spPr>
-        <p:txBody>
-          <a:bodyPr wrap="none">
-            <a:spAutoFit/>
-          </a:bodyPr>
-          <a:lstStyle/>
-          <a:p>
-            <a:pPr algn="ctr">
-              <a:spcBef>
-                <a:spcPts val="660"/>
-              </a:spcBef>
-            </a:pPr>
-            <a:r>
-              <a:rPr lang="en-US" sz="2200" b="1" spc="-1" dirty="0">
-                <a:solidFill>
-                  <a:srgbClr val="EF181E"/>
-                </a:solidFill>
-                <a:latin typeface="Arial"/>
-              </a:rPr>
-              <a:t>SKIP-GRAM </a:t>
-            </a:r>
-            <a:endParaRPr lang="en-CO" sz="2200" b="1" spc="-1" dirty="0">
-              <a:solidFill>
-                <a:srgbClr val="EF181E"/>
-              </a:solidFill>
-              <a:latin typeface="Arial"/>
-            </a:endParaRPr>
-          </a:p>
-        </p:txBody>
-      </p:sp>
-      <p:sp>
-        <p:nvSpPr>
           <p:cNvPr id="7" name="TextBox 6">
             <a:extLst>
               <a:ext uri="{FF2B5EF4-FFF2-40B4-BE49-F238E27FC236}">
@@ -13437,7 +13822,7 @@
         </p:blipFill>
         <p:spPr>
           <a:xfrm>
-            <a:off x="3329146" y="3064509"/>
+            <a:off x="3507993" y="6040190"/>
             <a:ext cx="251861" cy="195506"/>
           </a:xfrm>
           <a:prstGeom prst="rect">
@@ -13459,7 +13844,7 @@
         </p:nvSpPr>
         <p:spPr>
           <a:xfrm>
-            <a:off x="1142477" y="2565661"/>
+            <a:off x="1321324" y="5541342"/>
             <a:ext cx="651140" cy="461665"/>
           </a:xfrm>
           <a:prstGeom prst="rect">
@@ -13494,7 +13879,7 @@
         </p:nvSpPr>
         <p:spPr>
           <a:xfrm>
-            <a:off x="1857566" y="2565661"/>
+            <a:off x="2036413" y="5541342"/>
             <a:ext cx="1045927" cy="461665"/>
           </a:xfrm>
           <a:prstGeom prst="rect">
@@ -13529,7 +13914,7 @@
         </p:nvSpPr>
         <p:spPr>
           <a:xfrm>
-            <a:off x="2967442" y="2565661"/>
+            <a:off x="3146289" y="5541342"/>
             <a:ext cx="962571" cy="461665"/>
           </a:xfrm>
           <a:prstGeom prst="rect">
@@ -13568,7 +13953,7 @@
         </p:nvSpPr>
         <p:spPr>
           <a:xfrm>
-            <a:off x="3993962" y="2565661"/>
+            <a:off x="4172809" y="5541342"/>
             <a:ext cx="1242648" cy="461665"/>
           </a:xfrm>
           <a:prstGeom prst="rect">
@@ -13603,7 +13988,7 @@
         </p:nvSpPr>
         <p:spPr>
           <a:xfrm>
-            <a:off x="5300559" y="2565661"/>
+            <a:off x="5479406" y="5541342"/>
             <a:ext cx="1002903" cy="461665"/>
           </a:xfrm>
           <a:prstGeom prst="rect">
@@ -13638,7 +14023,7 @@
         </p:nvSpPr>
         <p:spPr>
           <a:xfrm>
-            <a:off x="6367413" y="2565661"/>
+            <a:off x="6546260" y="5541342"/>
             <a:ext cx="1147878" cy="461665"/>
           </a:xfrm>
           <a:prstGeom prst="rect">
@@ -13676,7 +14061,7 @@
         </p:nvCxnSpPr>
         <p:spPr>
           <a:xfrm rot="5400000" flipH="1" flipV="1">
-            <a:off x="4032007" y="1982382"/>
+            <a:off x="4210854" y="4958063"/>
             <a:ext cx="12700" cy="1166558"/>
           </a:xfrm>
           <a:prstGeom prst="curvedConnector3">
@@ -13723,7 +14108,7 @@
         </p:nvCxnSpPr>
         <p:spPr>
           <a:xfrm rot="5400000" flipH="1" flipV="1">
-            <a:off x="4625369" y="1389020"/>
+            <a:off x="4804216" y="4364701"/>
             <a:ext cx="12700" cy="2353283"/>
           </a:xfrm>
           <a:prstGeom prst="curvedConnector3">
@@ -13770,7 +14155,7 @@
         </p:nvCxnSpPr>
         <p:spPr>
           <a:xfrm rot="5400000" flipH="1" flipV="1">
-            <a:off x="5195040" y="819349"/>
+            <a:off x="5373887" y="3795030"/>
             <a:ext cx="12700" cy="3492624"/>
           </a:xfrm>
           <a:prstGeom prst="curvedConnector3">
@@ -13817,7 +14202,7 @@
         </p:nvCxnSpPr>
         <p:spPr>
           <a:xfrm rot="16200000" flipV="1">
-            <a:off x="2914629" y="2031562"/>
+            <a:off x="3093476" y="5007243"/>
             <a:ext cx="12700" cy="1068198"/>
           </a:xfrm>
           <a:prstGeom prst="curvedConnector3">
@@ -13864,7 +14249,7 @@
         </p:nvCxnSpPr>
         <p:spPr>
           <a:xfrm rot="16200000" flipV="1">
-            <a:off x="2458388" y="1575320"/>
+            <a:off x="2637235" y="4551001"/>
             <a:ext cx="12700" cy="1980681"/>
           </a:xfrm>
           <a:prstGeom prst="curvedConnector3">
@@ -13894,62 +14279,12 @@
           </a:fontRef>
         </p:style>
       </p:cxnSp>
-      <p:sp>
-        <p:nvSpPr>
-          <p:cNvPr id="20" name="Rectangle 19">
+      <p:pic>
+        <p:nvPicPr>
+          <p:cNvPr id="36" name="Picture 35">
             <a:extLst>
               <a:ext uri="{FF2B5EF4-FFF2-40B4-BE49-F238E27FC236}">
-                <a16:creationId xmlns:a16="http://schemas.microsoft.com/office/drawing/2014/main" id="{E29F6C4D-1DC3-EE4D-A771-759EF6C80BC6}"/>
-              </a:ext>
-            </a:extLst>
-          </p:cNvPr>
-          <p:cNvSpPr/>
-          <p:nvPr/>
-        </p:nvSpPr>
-        <p:spPr>
-          <a:xfrm>
-            <a:off x="4093206" y="3551632"/>
-            <a:ext cx="1077026" cy="430887"/>
-          </a:xfrm>
-          <a:prstGeom prst="rect">
-            <a:avLst/>
-          </a:prstGeom>
-        </p:spPr>
-        <p:txBody>
-          <a:bodyPr wrap="none">
-            <a:spAutoFit/>
-          </a:bodyPr>
-          <a:lstStyle/>
-          <a:p>
-            <a:pPr algn="ctr">
-              <a:spcBef>
-                <a:spcPts val="660"/>
-              </a:spcBef>
-            </a:pPr>
-            <a:r>
-              <a:rPr lang="en-US" sz="2200" b="1" spc="-1" dirty="0">
-                <a:solidFill>
-                  <a:srgbClr val="EF181E"/>
-                </a:solidFill>
-                <a:latin typeface="Arial"/>
-              </a:rPr>
-              <a:t>CBOW</a:t>
-            </a:r>
-            <a:endParaRPr lang="en-CO" sz="2200" b="1" spc="-1" dirty="0">
-              <a:solidFill>
-                <a:srgbClr val="EF181E"/>
-              </a:solidFill>
-              <a:latin typeface="Arial"/>
-            </a:endParaRPr>
-          </a:p>
-        </p:txBody>
-      </p:sp>
-      <p:pic>
-        <p:nvPicPr>
-          <p:cNvPr id="21" name="Picture 20">
-            <a:extLst>
-              <a:ext uri="{FF2B5EF4-FFF2-40B4-BE49-F238E27FC236}">
-                <a16:creationId xmlns:a16="http://schemas.microsoft.com/office/drawing/2014/main" id="{C6775865-5D14-9049-85B5-7BBD16DFA235}"/>
+                <a16:creationId xmlns:a16="http://schemas.microsoft.com/office/drawing/2014/main" id="{EC1ACE83-1F5D-47AD-B0F2-7E6610EEC6EB}"/>
               </a:ext>
             </a:extLst>
           </p:cNvPr>
@@ -13959,15 +14294,15 @@
           <p:nvPr/>
         </p:nvPicPr>
         <p:blipFill>
-          <a:blip r:embed="rId3"/>
+          <a:blip r:embed="rId4"/>
           <a:stretch>
             <a:fillRect/>
           </a:stretch>
         </p:blipFill>
         <p:spPr>
           <a:xfrm>
-            <a:off x="3661066" y="5367570"/>
-            <a:ext cx="251861" cy="195506"/>
+            <a:off x="3263531" y="1450724"/>
+            <a:ext cx="2616936" cy="3126930"/>
           </a:xfrm>
           <a:prstGeom prst="rect">
             <a:avLst/>
@@ -13976,453 +14311,54 @@
       </p:pic>
       <p:sp>
         <p:nvSpPr>
-          <p:cNvPr id="22" name="TextBox 21">
+          <p:cNvPr id="37" name="Rectangle 36">
             <a:extLst>
               <a:ext uri="{FF2B5EF4-FFF2-40B4-BE49-F238E27FC236}">
-                <a16:creationId xmlns:a16="http://schemas.microsoft.com/office/drawing/2014/main" id="{63C2B589-CCF4-7747-9FAA-F4DE1DEF247A}"/>
+                <a16:creationId xmlns:a16="http://schemas.microsoft.com/office/drawing/2014/main" id="{E8E3B3C9-AACA-45C7-A339-17970D2261FF}"/>
               </a:ext>
             </a:extLst>
           </p:cNvPr>
-          <p:cNvSpPr txBox="1"/>
+          <p:cNvSpPr/>
           <p:nvPr/>
         </p:nvSpPr>
         <p:spPr>
           <a:xfrm>
-            <a:off x="1474397" y="4868722"/>
-            <a:ext cx="651140" cy="461665"/>
-          </a:xfrm>
-          <a:prstGeom prst="rect">
-            <a:avLst/>
-          </a:prstGeom>
-          <a:noFill/>
-        </p:spPr>
-        <p:txBody>
-          <a:bodyPr wrap="none" rtlCol="0">
+            <a:off x="1513905" y="1005643"/>
+            <a:ext cx="6116187" cy="430887"/>
+          </a:xfrm>
+          <a:prstGeom prst="rect">
+            <a:avLst/>
+          </a:prstGeom>
+        </p:spPr>
+        <p:txBody>
+          <a:bodyPr wrap="square">
             <a:spAutoFit/>
           </a:bodyPr>
           <a:lstStyle/>
           <a:p>
-            <a:r>
-              <a:rPr lang="en-US" sz="2400" dirty="0"/>
-              <a:t>The</a:t>
-            </a:r>
-          </a:p>
-        </p:txBody>
-      </p:sp>
-      <p:sp>
-        <p:nvSpPr>
-          <p:cNvPr id="23" name="TextBox 22">
-            <a:extLst>
-              <a:ext uri="{FF2B5EF4-FFF2-40B4-BE49-F238E27FC236}">
-                <a16:creationId xmlns:a16="http://schemas.microsoft.com/office/drawing/2014/main" id="{F3762CA8-6AF1-244A-A984-8377AA8765BF}"/>
-              </a:ext>
-            </a:extLst>
-          </p:cNvPr>
-          <p:cNvSpPr txBox="1"/>
-          <p:nvPr/>
-        </p:nvSpPr>
-        <p:spPr>
-          <a:xfrm>
-            <a:off x="2189486" y="4868722"/>
-            <a:ext cx="1045927" cy="461665"/>
-          </a:xfrm>
-          <a:prstGeom prst="rect">
-            <a:avLst/>
-          </a:prstGeom>
-          <a:noFill/>
-        </p:spPr>
-        <p:txBody>
-          <a:bodyPr wrap="none" rtlCol="0">
-            <a:spAutoFit/>
-          </a:bodyPr>
-          <a:lstStyle/>
-          <a:p>
-            <a:r>
-              <a:rPr lang="en-US" sz="2400" dirty="0"/>
-              <a:t>mighty</a:t>
-            </a:r>
-          </a:p>
-        </p:txBody>
-      </p:sp>
-      <p:sp>
-        <p:nvSpPr>
-          <p:cNvPr id="24" name="TextBox 23">
-            <a:extLst>
-              <a:ext uri="{FF2B5EF4-FFF2-40B4-BE49-F238E27FC236}">
-                <a16:creationId xmlns:a16="http://schemas.microsoft.com/office/drawing/2014/main" id="{8DA58A78-82DD-3247-AB5B-78AED463B74D}"/>
-              </a:ext>
-            </a:extLst>
-          </p:cNvPr>
-          <p:cNvSpPr txBox="1"/>
-          <p:nvPr/>
-        </p:nvSpPr>
-        <p:spPr>
-          <a:xfrm>
-            <a:off x="3299362" y="4868722"/>
-            <a:ext cx="962571" cy="461665"/>
-          </a:xfrm>
-          <a:prstGeom prst="rect">
-            <a:avLst/>
-          </a:prstGeom>
-          <a:noFill/>
-        </p:spPr>
-        <p:txBody>
-          <a:bodyPr wrap="none" rtlCol="0">
-            <a:spAutoFit/>
-          </a:bodyPr>
-          <a:lstStyle/>
-          <a:p>
-            <a:r>
-              <a:rPr lang="en-US" sz="2400" dirty="0">
+            <a:pPr algn="ctr">
+              <a:spcBef>
+                <a:spcPts val="660"/>
+              </a:spcBef>
+            </a:pPr>
+            <a:r>
+              <a:rPr lang="en-US" sz="2200" b="1" spc="-1" dirty="0">
                 <a:solidFill>
-                  <a:srgbClr val="6D84B4"/>
+                  <a:srgbClr val="EF181E"/>
                 </a:solidFill>
+                <a:latin typeface="Arial"/>
               </a:rPr>
-              <a:t>knight</a:t>
-            </a:r>
-          </a:p>
-        </p:txBody>
-      </p:sp>
-      <p:sp>
-        <p:nvSpPr>
-          <p:cNvPr id="25" name="TextBox 24">
-            <a:extLst>
-              <a:ext uri="{FF2B5EF4-FFF2-40B4-BE49-F238E27FC236}">
-                <a16:creationId xmlns:a16="http://schemas.microsoft.com/office/drawing/2014/main" id="{F673FBB8-0D31-D34E-8784-A09F9D42DCE3}"/>
-              </a:ext>
-            </a:extLst>
-          </p:cNvPr>
-          <p:cNvSpPr txBox="1"/>
-          <p:nvPr/>
-        </p:nvSpPr>
-        <p:spPr>
-          <a:xfrm>
-            <a:off x="4325882" y="4868722"/>
-            <a:ext cx="1242648" cy="461665"/>
-          </a:xfrm>
-          <a:prstGeom prst="rect">
-            <a:avLst/>
-          </a:prstGeom>
-          <a:noFill/>
-        </p:spPr>
-        <p:txBody>
-          <a:bodyPr wrap="none" rtlCol="0">
-            <a:spAutoFit/>
-          </a:bodyPr>
-          <a:lstStyle/>
-          <a:p>
-            <a:r>
-              <a:rPr lang="en-US" sz="2400" dirty="0"/>
-              <a:t>Lancelot</a:t>
-            </a:r>
-          </a:p>
-        </p:txBody>
-      </p:sp>
-      <p:sp>
-        <p:nvSpPr>
-          <p:cNvPr id="26" name="TextBox 25">
-            <a:extLst>
-              <a:ext uri="{FF2B5EF4-FFF2-40B4-BE49-F238E27FC236}">
-                <a16:creationId xmlns:a16="http://schemas.microsoft.com/office/drawing/2014/main" id="{2BD1FFCE-73FE-0247-AB50-C9C7D0B77849}"/>
-              </a:ext>
-            </a:extLst>
-          </p:cNvPr>
-          <p:cNvSpPr txBox="1"/>
-          <p:nvPr/>
-        </p:nvSpPr>
-        <p:spPr>
-          <a:xfrm>
-            <a:off x="5632479" y="4868722"/>
-            <a:ext cx="1002903" cy="461665"/>
-          </a:xfrm>
-          <a:prstGeom prst="rect">
-            <a:avLst/>
-          </a:prstGeom>
-          <a:noFill/>
-        </p:spPr>
-        <p:txBody>
-          <a:bodyPr wrap="none" rtlCol="0">
-            <a:spAutoFit/>
-          </a:bodyPr>
-          <a:lstStyle/>
-          <a:p>
-            <a:r>
-              <a:rPr lang="en-US" sz="2400" dirty="0"/>
-              <a:t>fought</a:t>
-            </a:r>
-          </a:p>
-        </p:txBody>
-      </p:sp>
-      <p:sp>
-        <p:nvSpPr>
-          <p:cNvPr id="27" name="TextBox 26">
-            <a:extLst>
-              <a:ext uri="{FF2B5EF4-FFF2-40B4-BE49-F238E27FC236}">
-                <a16:creationId xmlns:a16="http://schemas.microsoft.com/office/drawing/2014/main" id="{D947DD49-3429-D445-AD96-CD2AC15E6C78}"/>
-              </a:ext>
-            </a:extLst>
-          </p:cNvPr>
-          <p:cNvSpPr txBox="1"/>
-          <p:nvPr/>
-        </p:nvSpPr>
-        <p:spPr>
-          <a:xfrm>
-            <a:off x="6699333" y="4868722"/>
-            <a:ext cx="1147878" cy="461665"/>
-          </a:xfrm>
-          <a:prstGeom prst="rect">
-            <a:avLst/>
-          </a:prstGeom>
-          <a:noFill/>
-        </p:spPr>
-        <p:txBody>
-          <a:bodyPr wrap="none" rtlCol="0">
-            <a:spAutoFit/>
-          </a:bodyPr>
-          <a:lstStyle/>
-          <a:p>
-            <a:r>
-              <a:rPr lang="en-US" sz="2400" dirty="0"/>
-              <a:t>bravely.</a:t>
-            </a:r>
-          </a:p>
-        </p:txBody>
-      </p:sp>
-      <p:cxnSp>
-        <p:nvCxnSpPr>
-          <p:cNvPr id="28" name="Curved Connector 27">
-            <a:extLst>
-              <a:ext uri="{FF2B5EF4-FFF2-40B4-BE49-F238E27FC236}">
-                <a16:creationId xmlns:a16="http://schemas.microsoft.com/office/drawing/2014/main" id="{602BD45B-FE50-CC4A-80DD-C22067A66450}"/>
-              </a:ext>
-            </a:extLst>
-          </p:cNvPr>
-          <p:cNvCxnSpPr>
-            <a:stCxn id="22" idx="0"/>
-            <a:endCxn id="24" idx="0"/>
-          </p:cNvCxnSpPr>
-          <p:nvPr/>
-        </p:nvCxnSpPr>
-        <p:spPr>
-          <a:xfrm rot="5400000" flipH="1" flipV="1">
-            <a:off x="2790307" y="3878382"/>
-            <a:ext cx="12700" cy="1980681"/>
-          </a:xfrm>
-          <a:prstGeom prst="curvedConnector3">
-            <a:avLst>
-              <a:gd name="adj1" fmla="val 4499984"/>
-            </a:avLst>
-          </a:prstGeom>
-          <a:ln w="12700">
-            <a:solidFill>
-              <a:srgbClr val="6D84B4"/>
-            </a:solidFill>
-            <a:tailEnd type="triangle"/>
-          </a:ln>
-        </p:spPr>
-        <p:style>
-          <a:lnRef idx="1">
-            <a:schemeClr val="accent1"/>
-          </a:lnRef>
-          <a:fillRef idx="0">
-            <a:schemeClr val="accent1"/>
-          </a:fillRef>
-          <a:effectRef idx="0">
-            <a:schemeClr val="accent1"/>
-          </a:effectRef>
-          <a:fontRef idx="minor">
-            <a:schemeClr val="tx1"/>
-          </a:fontRef>
-        </p:style>
-      </p:cxnSp>
-      <p:cxnSp>
-        <p:nvCxnSpPr>
-          <p:cNvPr id="29" name="Curved Connector 28">
-            <a:extLst>
-              <a:ext uri="{FF2B5EF4-FFF2-40B4-BE49-F238E27FC236}">
-                <a16:creationId xmlns:a16="http://schemas.microsoft.com/office/drawing/2014/main" id="{1ED1D1C7-DD43-E543-AE33-0DCEFB293026}"/>
-              </a:ext>
-            </a:extLst>
-          </p:cNvPr>
-          <p:cNvCxnSpPr>
-            <a:stCxn id="23" idx="0"/>
-            <a:endCxn id="24" idx="0"/>
-          </p:cNvCxnSpPr>
-          <p:nvPr/>
-        </p:nvCxnSpPr>
-        <p:spPr>
-          <a:xfrm rot="5400000" flipH="1" flipV="1">
-            <a:off x="3246549" y="4334623"/>
-            <a:ext cx="12700" cy="1068198"/>
-          </a:xfrm>
-          <a:prstGeom prst="curvedConnector3">
-            <a:avLst>
-              <a:gd name="adj1" fmla="val 2430000"/>
-            </a:avLst>
-          </a:prstGeom>
-          <a:ln w="12700">
-            <a:solidFill>
-              <a:srgbClr val="6D84B4"/>
-            </a:solidFill>
-            <a:tailEnd type="triangle"/>
-          </a:ln>
-        </p:spPr>
-        <p:style>
-          <a:lnRef idx="1">
-            <a:schemeClr val="accent1"/>
-          </a:lnRef>
-          <a:fillRef idx="0">
-            <a:schemeClr val="accent1"/>
-          </a:fillRef>
-          <a:effectRef idx="0">
-            <a:schemeClr val="accent1"/>
-          </a:effectRef>
-          <a:fontRef idx="minor">
-            <a:schemeClr val="tx1"/>
-          </a:fontRef>
-        </p:style>
-      </p:cxnSp>
-      <p:cxnSp>
-        <p:nvCxnSpPr>
-          <p:cNvPr id="30" name="Curved Connector 29">
-            <a:extLst>
-              <a:ext uri="{FF2B5EF4-FFF2-40B4-BE49-F238E27FC236}">
-                <a16:creationId xmlns:a16="http://schemas.microsoft.com/office/drawing/2014/main" id="{F38F1A95-C1D1-1747-88A0-545A0B959AAF}"/>
-              </a:ext>
-            </a:extLst>
-          </p:cNvPr>
-          <p:cNvCxnSpPr>
-            <a:stCxn id="25" idx="0"/>
-            <a:endCxn id="24" idx="0"/>
-          </p:cNvCxnSpPr>
-          <p:nvPr/>
-        </p:nvCxnSpPr>
-        <p:spPr>
-          <a:xfrm rot="16200000" flipV="1">
-            <a:off x="4363927" y="4285443"/>
-            <a:ext cx="12700" cy="1166558"/>
-          </a:xfrm>
-          <a:prstGeom prst="curvedConnector3">
-            <a:avLst>
-              <a:gd name="adj1" fmla="val 2700000"/>
-            </a:avLst>
-          </a:prstGeom>
-          <a:ln w="12700">
-            <a:solidFill>
-              <a:srgbClr val="6D84B4"/>
-            </a:solidFill>
-            <a:tailEnd type="triangle"/>
-          </a:ln>
-        </p:spPr>
-        <p:style>
-          <a:lnRef idx="1">
-            <a:schemeClr val="accent1"/>
-          </a:lnRef>
-          <a:fillRef idx="0">
-            <a:schemeClr val="accent1"/>
-          </a:fillRef>
-          <a:effectRef idx="0">
-            <a:schemeClr val="accent1"/>
-          </a:effectRef>
-          <a:fontRef idx="minor">
-            <a:schemeClr val="tx1"/>
-          </a:fontRef>
-        </p:style>
-      </p:cxnSp>
-      <p:cxnSp>
-        <p:nvCxnSpPr>
-          <p:cNvPr id="31" name="Curved Connector 30">
-            <a:extLst>
-              <a:ext uri="{FF2B5EF4-FFF2-40B4-BE49-F238E27FC236}">
-                <a16:creationId xmlns:a16="http://schemas.microsoft.com/office/drawing/2014/main" id="{882A1D6C-8E83-474D-B1C0-41659FFF6897}"/>
-              </a:ext>
-            </a:extLst>
-          </p:cNvPr>
-          <p:cNvCxnSpPr>
-            <a:stCxn id="26" idx="0"/>
-            <a:endCxn id="24" idx="0"/>
-          </p:cNvCxnSpPr>
-          <p:nvPr/>
-        </p:nvCxnSpPr>
-        <p:spPr>
-          <a:xfrm rot="16200000" flipV="1">
-            <a:off x="4957290" y="3692080"/>
-            <a:ext cx="12700" cy="2353283"/>
-          </a:xfrm>
-          <a:prstGeom prst="curvedConnector3">
-            <a:avLst>
-              <a:gd name="adj1" fmla="val 4409984"/>
-            </a:avLst>
-          </a:prstGeom>
-          <a:ln w="12700">
-            <a:solidFill>
-              <a:srgbClr val="6D84B4"/>
-            </a:solidFill>
-            <a:tailEnd type="triangle"/>
-          </a:ln>
-        </p:spPr>
-        <p:style>
-          <a:lnRef idx="1">
-            <a:schemeClr val="accent1"/>
-          </a:lnRef>
-          <a:fillRef idx="0">
-            <a:schemeClr val="accent1"/>
-          </a:fillRef>
-          <a:effectRef idx="0">
-            <a:schemeClr val="accent1"/>
-          </a:effectRef>
-          <a:fontRef idx="minor">
-            <a:schemeClr val="tx1"/>
-          </a:fontRef>
-        </p:style>
-      </p:cxnSp>
-      <p:cxnSp>
-        <p:nvCxnSpPr>
-          <p:cNvPr id="32" name="Curved Connector 31">
-            <a:extLst>
-              <a:ext uri="{FF2B5EF4-FFF2-40B4-BE49-F238E27FC236}">
-                <a16:creationId xmlns:a16="http://schemas.microsoft.com/office/drawing/2014/main" id="{657F5B9D-FADC-754B-9896-EDEADDA11970}"/>
-              </a:ext>
-            </a:extLst>
-          </p:cNvPr>
-          <p:cNvCxnSpPr>
-            <a:stCxn id="27" idx="0"/>
-            <a:endCxn id="24" idx="0"/>
-          </p:cNvCxnSpPr>
-          <p:nvPr/>
-        </p:nvCxnSpPr>
-        <p:spPr>
-          <a:xfrm rot="16200000" flipV="1">
-            <a:off x="5526960" y="3122410"/>
-            <a:ext cx="12700" cy="3492624"/>
-          </a:xfrm>
-          <a:prstGeom prst="curvedConnector3">
-            <a:avLst>
-              <a:gd name="adj1" fmla="val 6570000"/>
-            </a:avLst>
-          </a:prstGeom>
-          <a:ln w="12700">
-            <a:solidFill>
-              <a:srgbClr val="6D84B4"/>
-            </a:solidFill>
-            <a:tailEnd type="triangle"/>
-          </a:ln>
-        </p:spPr>
-        <p:style>
-          <a:lnRef idx="1">
-            <a:schemeClr val="accent1"/>
-          </a:lnRef>
-          <a:fillRef idx="0">
-            <a:schemeClr val="accent1"/>
-          </a:fillRef>
-          <a:effectRef idx="0">
-            <a:schemeClr val="accent1"/>
-          </a:effectRef>
-          <a:fontRef idx="minor">
-            <a:schemeClr val="tx1"/>
-          </a:fontRef>
-        </p:style>
-      </p:cxnSp>
+              <a:t>Background (Word2Vec, 2013) – Skip-gram</a:t>
+            </a:r>
+            <a:endParaRPr lang="en-CO" sz="2200" b="1" spc="-1" dirty="0">
+              <a:solidFill>
+                <a:srgbClr val="EF181E"/>
+              </a:solidFill>
+              <a:latin typeface="Arial"/>
+            </a:endParaRPr>
+          </a:p>
+        </p:txBody>
+      </p:sp>
     </p:spTree>
     <p:extLst>
       <p:ext uri="{BB962C8B-B14F-4D97-AF65-F5344CB8AC3E}">
@@ -14594,36 +14530,6 @@
           </a:p>
         </p:txBody>
       </p:sp>
-      <p:pic>
-        <p:nvPicPr>
-          <p:cNvPr id="4" name="Picture 3">
-            <a:extLst>
-              <a:ext uri="{FF2B5EF4-FFF2-40B4-BE49-F238E27FC236}">
-                <a16:creationId xmlns:a16="http://schemas.microsoft.com/office/drawing/2014/main" id="{BFD4A4DA-B4CE-AF40-9368-E8899CCE9216}"/>
-              </a:ext>
-            </a:extLst>
-          </p:cNvPr>
-          <p:cNvPicPr>
-            <a:picLocks noChangeAspect="1"/>
-          </p:cNvPicPr>
-          <p:nvPr/>
-        </p:nvPicPr>
-        <p:blipFill>
-          <a:blip r:embed="rId3"/>
-          <a:stretch>
-            <a:fillRect/>
-          </a:stretch>
-        </p:blipFill>
-        <p:spPr>
-          <a:xfrm>
-            <a:off x="2101456" y="1490581"/>
-            <a:ext cx="4933201" cy="3042141"/>
-          </a:xfrm>
-          <a:prstGeom prst="rect">
-            <a:avLst/>
-          </a:prstGeom>
-        </p:spPr>
-      </p:pic>
       <p:sp>
         <p:nvSpPr>
           <p:cNvPr id="3" name="TextBox 2">
@@ -14697,658 +14603,1584 @@
           </a:p>
         </p:txBody>
       </p:sp>
-      <p:grpSp>
-        <p:nvGrpSpPr>
-          <p:cNvPr id="8" name="Group 7">
+      <p:sp>
+        <p:nvSpPr>
+          <p:cNvPr id="5" name="Rectangle 4">
             <a:extLst>
               <a:ext uri="{FF2B5EF4-FFF2-40B4-BE49-F238E27FC236}">
-                <a16:creationId xmlns:a16="http://schemas.microsoft.com/office/drawing/2014/main" id="{0B6D9066-9288-42BE-BC92-88FD4E697D3E}"/>
+                <a16:creationId xmlns:a16="http://schemas.microsoft.com/office/drawing/2014/main" id="{7A067BB0-B744-4AB9-8198-C821F1D61C89}"/>
               </a:ext>
             </a:extLst>
           </p:cNvPr>
-          <p:cNvGrpSpPr/>
+          <p:cNvSpPr/>
           <p:nvPr/>
-        </p:nvGrpSpPr>
-        <p:grpSpPr>
-          <a:xfrm>
-            <a:off x="2470321" y="4634326"/>
-            <a:ext cx="3816455" cy="1297149"/>
-            <a:chOff x="5994696" y="5012173"/>
-            <a:chExt cx="5169685" cy="1757089"/>
-          </a:xfrm>
-        </p:grpSpPr>
-        <p:sp>
-          <p:nvSpPr>
-            <p:cNvPr id="9" name="TextBox 8">
-              <a:extLst>
-                <a:ext uri="{FF2B5EF4-FFF2-40B4-BE49-F238E27FC236}">
-                  <a16:creationId xmlns:a16="http://schemas.microsoft.com/office/drawing/2014/main" id="{00DE3A4E-5E4C-436B-B4BB-BD34A818CE65}"/>
-                </a:ext>
-              </a:extLst>
-            </p:cNvPr>
-            <p:cNvSpPr txBox="1"/>
-            <p:nvPr/>
-          </p:nvSpPr>
-          <p:spPr>
-            <a:xfrm>
-              <a:off x="5994696" y="5433386"/>
-              <a:ext cx="553357" cy="338554"/>
-            </a:xfrm>
-            <a:prstGeom prst="rect">
-              <a:avLst/>
-            </a:prstGeom>
-            <a:noFill/>
-          </p:spPr>
-          <p:txBody>
-            <a:bodyPr wrap="none" rtlCol="0">
-              <a:spAutoFit/>
-            </a:bodyPr>
-            <a:lstStyle/>
-            <a:p>
-              <a:r>
-                <a:rPr lang="en-US" sz="1600" dirty="0">
-                  <a:solidFill>
-                    <a:srgbClr val="6D84B4"/>
-                  </a:solidFill>
-                </a:rPr>
-                <a:t>man</a:t>
-              </a:r>
-            </a:p>
-          </p:txBody>
-        </p:sp>
-        <p:sp>
-          <p:nvSpPr>
-            <p:cNvPr id="10" name="TextBox 9">
-              <a:extLst>
-                <a:ext uri="{FF2B5EF4-FFF2-40B4-BE49-F238E27FC236}">
-                  <a16:creationId xmlns:a16="http://schemas.microsoft.com/office/drawing/2014/main" id="{5DDDE5A3-BA5D-4CBF-87AB-D5352BFBB3D3}"/>
-                </a:ext>
-              </a:extLst>
-            </p:cNvPr>
-            <p:cNvSpPr txBox="1"/>
-            <p:nvPr/>
-          </p:nvSpPr>
-          <p:spPr>
-            <a:xfrm>
-              <a:off x="6554070" y="5382540"/>
-              <a:ext cx="486030" cy="338554"/>
-            </a:xfrm>
-            <a:prstGeom prst="rect">
-              <a:avLst/>
-            </a:prstGeom>
-            <a:noFill/>
-          </p:spPr>
-          <p:txBody>
-            <a:bodyPr wrap="none" rtlCol="0">
-              <a:spAutoFit/>
-            </a:bodyPr>
-            <a:lstStyle/>
-            <a:p>
-              <a:r>
-                <a:rPr lang="en-US" sz="1600" dirty="0" err="1">
-                  <a:solidFill>
-                    <a:srgbClr val="6D84B4"/>
-                  </a:solidFill>
-                </a:rPr>
-                <a:t>ang</a:t>
-              </a:r>
-              <a:endParaRPr lang="en-US" sz="1600" dirty="0">
-                <a:solidFill>
-                  <a:srgbClr val="6D84B4"/>
-                </a:solidFill>
-              </a:endParaRPr>
-            </a:p>
-          </p:txBody>
-        </p:sp>
-        <p:sp>
-          <p:nvSpPr>
-            <p:cNvPr id="11" name="TextBox 10">
-              <a:extLst>
-                <a:ext uri="{FF2B5EF4-FFF2-40B4-BE49-F238E27FC236}">
-                  <a16:creationId xmlns:a16="http://schemas.microsoft.com/office/drawing/2014/main" id="{C900EA39-76E5-41A9-95F0-8293C311A2EA}"/>
-                </a:ext>
-              </a:extLst>
-            </p:cNvPr>
-            <p:cNvSpPr txBox="1"/>
-            <p:nvPr/>
-          </p:nvSpPr>
-          <p:spPr>
-            <a:xfrm>
-              <a:off x="6261693" y="5876153"/>
-              <a:ext cx="489173" cy="338554"/>
-            </a:xfrm>
-            <a:prstGeom prst="rect">
-              <a:avLst/>
-            </a:prstGeom>
-            <a:noFill/>
-          </p:spPr>
-          <p:txBody>
-            <a:bodyPr wrap="none" rtlCol="0">
-              <a:spAutoFit/>
-            </a:bodyPr>
-            <a:lstStyle/>
-            <a:p>
-              <a:r>
-                <a:rPr lang="en-US" sz="1600" dirty="0" err="1">
-                  <a:solidFill>
-                    <a:srgbClr val="6D84B4"/>
-                  </a:solidFill>
-                </a:rPr>
-                <a:t>nge</a:t>
-              </a:r>
-              <a:endParaRPr lang="en-US" sz="1600" dirty="0">
-                <a:solidFill>
-                  <a:srgbClr val="6D84B4"/>
-                </a:solidFill>
-              </a:endParaRPr>
-            </a:p>
-          </p:txBody>
-        </p:sp>
-        <p:sp>
-          <p:nvSpPr>
-            <p:cNvPr id="12" name="TextBox 11">
-              <a:extLst>
-                <a:ext uri="{FF2B5EF4-FFF2-40B4-BE49-F238E27FC236}">
-                  <a16:creationId xmlns:a16="http://schemas.microsoft.com/office/drawing/2014/main" id="{18F4ABA8-18EA-45C2-AB00-4D4A759E39C7}"/>
-                </a:ext>
-              </a:extLst>
-            </p:cNvPr>
-            <p:cNvSpPr txBox="1"/>
-            <p:nvPr/>
-          </p:nvSpPr>
-          <p:spPr>
-            <a:xfrm>
-              <a:off x="6871842" y="5855407"/>
-              <a:ext cx="453907" cy="338554"/>
-            </a:xfrm>
-            <a:prstGeom prst="rect">
-              <a:avLst/>
-            </a:prstGeom>
-            <a:noFill/>
-          </p:spPr>
-          <p:txBody>
-            <a:bodyPr wrap="none" rtlCol="0">
-              <a:spAutoFit/>
-            </a:bodyPr>
-            <a:lstStyle/>
-            <a:p>
-              <a:r>
-                <a:rPr lang="en-US" sz="1600" dirty="0" err="1">
-                  <a:solidFill>
-                    <a:srgbClr val="6D84B4"/>
-                  </a:solidFill>
-                </a:rPr>
-                <a:t>ger</a:t>
-              </a:r>
-              <a:endParaRPr lang="en-US" sz="1600" dirty="0">
-                <a:solidFill>
-                  <a:srgbClr val="6D84B4"/>
-                </a:solidFill>
-              </a:endParaRPr>
-            </a:p>
-          </p:txBody>
-        </p:sp>
-        <p:sp>
-          <p:nvSpPr>
-            <p:cNvPr id="13" name="TextBox 12">
-              <a:extLst>
-                <a:ext uri="{FF2B5EF4-FFF2-40B4-BE49-F238E27FC236}">
-                  <a16:creationId xmlns:a16="http://schemas.microsoft.com/office/drawing/2014/main" id="{A95DACAA-539E-44A5-95EF-FD30CAF6E8FE}"/>
-                </a:ext>
-              </a:extLst>
-            </p:cNvPr>
-            <p:cNvSpPr txBox="1"/>
-            <p:nvPr/>
-          </p:nvSpPr>
-          <p:spPr>
-            <a:xfrm>
-              <a:off x="7210298" y="5603745"/>
-              <a:ext cx="453073" cy="338554"/>
-            </a:xfrm>
-            <a:prstGeom prst="rect">
-              <a:avLst/>
-            </a:prstGeom>
-            <a:noFill/>
-          </p:spPr>
-          <p:txBody>
-            <a:bodyPr wrap="none" rtlCol="0">
-              <a:spAutoFit/>
-            </a:bodyPr>
-            <a:lstStyle/>
-            <a:p>
-              <a:r>
-                <a:rPr lang="en-US" sz="1600" dirty="0">
-                  <a:solidFill>
-                    <a:srgbClr val="6D84B4"/>
-                  </a:solidFill>
-                </a:rPr>
-                <a:t>era</a:t>
-              </a:r>
-            </a:p>
-          </p:txBody>
-        </p:sp>
-        <p:sp>
-          <p:nvSpPr>
-            <p:cNvPr id="14" name="TextBox 13">
-              <a:extLst>
-                <a:ext uri="{FF2B5EF4-FFF2-40B4-BE49-F238E27FC236}">
-                  <a16:creationId xmlns:a16="http://schemas.microsoft.com/office/drawing/2014/main" id="{414B26F5-165D-4D46-B4EB-6E9A585BA4F1}"/>
-                </a:ext>
-              </a:extLst>
-            </p:cNvPr>
-            <p:cNvSpPr txBox="1"/>
-            <p:nvPr/>
-          </p:nvSpPr>
-          <p:spPr>
-            <a:xfrm>
-              <a:off x="7547919" y="5906692"/>
-              <a:ext cx="396968" cy="338554"/>
-            </a:xfrm>
-            <a:prstGeom prst="rect">
-              <a:avLst/>
-            </a:prstGeom>
-            <a:noFill/>
-          </p:spPr>
-          <p:txBody>
-            <a:bodyPr wrap="none" rtlCol="0">
-              <a:spAutoFit/>
-            </a:bodyPr>
-            <a:lstStyle/>
-            <a:p>
-              <a:r>
-                <a:rPr lang="en-US" sz="1600" dirty="0">
-                  <a:solidFill>
-                    <a:srgbClr val="6D84B4"/>
-                  </a:solidFill>
-                </a:rPr>
-                <a:t>rai</a:t>
-              </a:r>
-            </a:p>
-          </p:txBody>
-        </p:sp>
-        <p:sp>
-          <p:nvSpPr>
-            <p:cNvPr id="15" name="TextBox 14">
-              <a:extLst>
-                <a:ext uri="{FF2B5EF4-FFF2-40B4-BE49-F238E27FC236}">
-                  <a16:creationId xmlns:a16="http://schemas.microsoft.com/office/drawing/2014/main" id="{DC506F7E-FA8D-4EBA-BB0B-AB9A867C9570}"/>
-                </a:ext>
-              </a:extLst>
-            </p:cNvPr>
-            <p:cNvSpPr txBox="1"/>
-            <p:nvPr/>
-          </p:nvSpPr>
-          <p:spPr>
-            <a:xfrm>
-              <a:off x="6350145" y="5012173"/>
-              <a:ext cx="649537" cy="338554"/>
-            </a:xfrm>
-            <a:prstGeom prst="rect">
-              <a:avLst/>
-            </a:prstGeom>
-            <a:noFill/>
-          </p:spPr>
-          <p:txBody>
-            <a:bodyPr wrap="none" rtlCol="0">
-              <a:spAutoFit/>
-            </a:bodyPr>
-            <a:lstStyle/>
-            <a:p>
-              <a:r>
-                <a:rPr lang="en-US" sz="1600" dirty="0" err="1">
-                  <a:solidFill>
-                    <a:srgbClr val="6D84B4"/>
-                  </a:solidFill>
-                </a:rPr>
-                <a:t>mang</a:t>
-              </a:r>
-              <a:endParaRPr lang="en-US" sz="1600" dirty="0">
-                <a:solidFill>
-                  <a:srgbClr val="6D84B4"/>
-                </a:solidFill>
-              </a:endParaRPr>
-            </a:p>
-          </p:txBody>
-        </p:sp>
-        <p:sp>
-          <p:nvSpPr>
-            <p:cNvPr id="16" name="TextBox 15">
-              <a:extLst>
-                <a:ext uri="{FF2B5EF4-FFF2-40B4-BE49-F238E27FC236}">
-                  <a16:creationId xmlns:a16="http://schemas.microsoft.com/office/drawing/2014/main" id="{E2B506E5-F83C-44B6-9C73-B0605C340B6C}"/>
-                </a:ext>
-              </a:extLst>
-            </p:cNvPr>
-            <p:cNvSpPr txBox="1"/>
-            <p:nvPr/>
-          </p:nvSpPr>
-          <p:spPr>
-            <a:xfrm>
-              <a:off x="7746403" y="5033658"/>
-              <a:ext cx="586956" cy="338554"/>
-            </a:xfrm>
-            <a:prstGeom prst="rect">
-              <a:avLst/>
-            </a:prstGeom>
-            <a:noFill/>
-          </p:spPr>
-          <p:txBody>
-            <a:bodyPr wrap="none" rtlCol="0">
-              <a:spAutoFit/>
-            </a:bodyPr>
-            <a:lstStyle/>
-            <a:p>
-              <a:r>
-                <a:rPr lang="en-US" sz="1600" dirty="0" err="1">
-                  <a:solidFill>
-                    <a:srgbClr val="6D84B4"/>
-                  </a:solidFill>
-                </a:rPr>
-                <a:t>ange</a:t>
-              </a:r>
-              <a:endParaRPr lang="en-US" sz="1600" dirty="0">
-                <a:solidFill>
-                  <a:srgbClr val="6D84B4"/>
-                </a:solidFill>
-              </a:endParaRPr>
-            </a:p>
-          </p:txBody>
-        </p:sp>
-        <p:sp>
-          <p:nvSpPr>
-            <p:cNvPr id="17" name="TextBox 16">
-              <a:extLst>
-                <a:ext uri="{FF2B5EF4-FFF2-40B4-BE49-F238E27FC236}">
-                  <a16:creationId xmlns:a16="http://schemas.microsoft.com/office/drawing/2014/main" id="{9878041C-4AED-4847-84C4-3A3D1D929044}"/>
-                </a:ext>
-              </a:extLst>
-            </p:cNvPr>
-            <p:cNvSpPr txBox="1"/>
-            <p:nvPr/>
-          </p:nvSpPr>
-          <p:spPr>
-            <a:xfrm>
-              <a:off x="8020911" y="5906692"/>
-              <a:ext cx="561308" cy="338554"/>
-            </a:xfrm>
-            <a:prstGeom prst="rect">
-              <a:avLst/>
-            </a:prstGeom>
-            <a:noFill/>
-          </p:spPr>
-          <p:txBody>
-            <a:bodyPr wrap="none" rtlCol="0">
-              <a:spAutoFit/>
-            </a:bodyPr>
-            <a:lstStyle/>
-            <a:p>
-              <a:r>
-                <a:rPr lang="en-US" sz="1600" dirty="0" err="1">
-                  <a:solidFill>
-                    <a:srgbClr val="6D84B4"/>
-                  </a:solidFill>
-                </a:rPr>
-                <a:t>nger</a:t>
-              </a:r>
-              <a:endParaRPr lang="en-US" sz="1600" dirty="0">
-                <a:solidFill>
-                  <a:srgbClr val="6D84B4"/>
-                </a:solidFill>
-              </a:endParaRPr>
-            </a:p>
-          </p:txBody>
-        </p:sp>
-        <p:sp>
-          <p:nvSpPr>
-            <p:cNvPr id="18" name="TextBox 17">
-              <a:extLst>
-                <a:ext uri="{FF2B5EF4-FFF2-40B4-BE49-F238E27FC236}">
-                  <a16:creationId xmlns:a16="http://schemas.microsoft.com/office/drawing/2014/main" id="{68640461-C624-44CF-9292-C58EAF990A1C}"/>
-                </a:ext>
-              </a:extLst>
-            </p:cNvPr>
-            <p:cNvSpPr txBox="1"/>
-            <p:nvPr/>
-          </p:nvSpPr>
-          <p:spPr>
-            <a:xfrm>
-              <a:off x="7707879" y="5439680"/>
-              <a:ext cx="547586" cy="338554"/>
-            </a:xfrm>
-            <a:prstGeom prst="rect">
-              <a:avLst/>
-            </a:prstGeom>
-            <a:noFill/>
-          </p:spPr>
-          <p:txBody>
-            <a:bodyPr wrap="none" rtlCol="0">
-              <a:spAutoFit/>
-            </a:bodyPr>
-            <a:lstStyle/>
-            <a:p>
-              <a:r>
-                <a:rPr lang="en-US" sz="1600" dirty="0" err="1">
-                  <a:solidFill>
-                    <a:srgbClr val="6D84B4"/>
-                  </a:solidFill>
-                </a:rPr>
-                <a:t>gera</a:t>
-              </a:r>
-              <a:endParaRPr lang="en-US" sz="1600" dirty="0">
-                <a:solidFill>
-                  <a:srgbClr val="6D84B4"/>
-                </a:solidFill>
-              </a:endParaRPr>
-            </a:p>
-          </p:txBody>
-        </p:sp>
-        <p:sp>
-          <p:nvSpPr>
-            <p:cNvPr id="19" name="TextBox 18">
-              <a:extLst>
-                <a:ext uri="{FF2B5EF4-FFF2-40B4-BE49-F238E27FC236}">
-                  <a16:creationId xmlns:a16="http://schemas.microsoft.com/office/drawing/2014/main" id="{AA48B034-F355-4BBD-8921-20A93FA68549}"/>
-                </a:ext>
-              </a:extLst>
-            </p:cNvPr>
-            <p:cNvSpPr txBox="1"/>
-            <p:nvPr/>
-          </p:nvSpPr>
-          <p:spPr>
-            <a:xfrm>
-              <a:off x="7082069" y="5163334"/>
-              <a:ext cx="499560" cy="338554"/>
-            </a:xfrm>
-            <a:prstGeom prst="rect">
-              <a:avLst/>
-            </a:prstGeom>
-            <a:noFill/>
-          </p:spPr>
-          <p:txBody>
-            <a:bodyPr wrap="none" rtlCol="0">
-              <a:spAutoFit/>
-            </a:bodyPr>
-            <a:lstStyle/>
-            <a:p>
-              <a:r>
-                <a:rPr lang="en-US" sz="1600" dirty="0" err="1">
-                  <a:solidFill>
-                    <a:srgbClr val="6D84B4"/>
-                  </a:solidFill>
-                </a:rPr>
-                <a:t>erai</a:t>
-              </a:r>
-              <a:endParaRPr lang="en-US" sz="1600" dirty="0">
-                <a:solidFill>
-                  <a:srgbClr val="6D84B4"/>
-                </a:solidFill>
-              </a:endParaRPr>
-            </a:p>
-          </p:txBody>
-        </p:sp>
-        <p:sp>
-          <p:nvSpPr>
-            <p:cNvPr id="20" name="TextBox 19">
-              <a:extLst>
-                <a:ext uri="{FF2B5EF4-FFF2-40B4-BE49-F238E27FC236}">
-                  <a16:creationId xmlns:a16="http://schemas.microsoft.com/office/drawing/2014/main" id="{BEF3F869-149D-47AF-AECB-B02DE35834EC}"/>
-                </a:ext>
-              </a:extLst>
-            </p:cNvPr>
-            <p:cNvSpPr txBox="1"/>
-            <p:nvPr/>
-          </p:nvSpPr>
-          <p:spPr>
-            <a:xfrm>
-              <a:off x="10026601" y="5587274"/>
-              <a:ext cx="1063048" cy="369332"/>
-            </a:xfrm>
-            <a:prstGeom prst="rect">
-              <a:avLst/>
-            </a:prstGeom>
-            <a:noFill/>
-          </p:spPr>
-          <p:txBody>
-            <a:bodyPr wrap="none" rtlCol="0">
-              <a:spAutoFit/>
-            </a:bodyPr>
-            <a:lstStyle/>
-            <a:p>
-              <a:r>
-                <a:rPr lang="en-US" dirty="0" err="1">
-                  <a:solidFill>
-                    <a:srgbClr val="6D84B4"/>
-                  </a:solidFill>
-                </a:rPr>
-                <a:t>mangerai</a:t>
-              </a:r>
-              <a:endParaRPr lang="en-US" dirty="0">
-                <a:solidFill>
-                  <a:srgbClr val="6D84B4"/>
-                </a:solidFill>
-              </a:endParaRPr>
-            </a:p>
-          </p:txBody>
-        </p:sp>
-        <p:sp>
-          <p:nvSpPr>
-            <p:cNvPr id="21" name="TextBox 20">
-              <a:extLst>
-                <a:ext uri="{FF2B5EF4-FFF2-40B4-BE49-F238E27FC236}">
-                  <a16:creationId xmlns:a16="http://schemas.microsoft.com/office/drawing/2014/main" id="{D7A6F303-12D5-4CE3-A04A-D646CDEA3CF5}"/>
-                </a:ext>
-              </a:extLst>
-            </p:cNvPr>
-            <p:cNvSpPr txBox="1"/>
-            <p:nvPr/>
-          </p:nvSpPr>
-          <p:spPr>
-            <a:xfrm>
-              <a:off x="6424182" y="6399930"/>
-              <a:ext cx="1909177" cy="369332"/>
-            </a:xfrm>
-            <a:prstGeom prst="rect">
-              <a:avLst/>
-            </a:prstGeom>
-            <a:noFill/>
-          </p:spPr>
-          <p:txBody>
-            <a:bodyPr wrap="none" rtlCol="0">
-              <a:spAutoFit/>
-            </a:bodyPr>
-            <a:lstStyle/>
-            <a:p>
-              <a:r>
-                <a:rPr lang="en-US" dirty="0"/>
-                <a:t>Character n-grams</a:t>
-              </a:r>
-            </a:p>
-          </p:txBody>
-        </p:sp>
-        <p:sp>
-          <p:nvSpPr>
-            <p:cNvPr id="22" name="TextBox 21">
-              <a:extLst>
-                <a:ext uri="{FF2B5EF4-FFF2-40B4-BE49-F238E27FC236}">
-                  <a16:creationId xmlns:a16="http://schemas.microsoft.com/office/drawing/2014/main" id="{305E722F-D78D-4241-BC73-EB8310979E64}"/>
-                </a:ext>
-              </a:extLst>
-            </p:cNvPr>
-            <p:cNvSpPr txBox="1"/>
-            <p:nvPr/>
-          </p:nvSpPr>
-          <p:spPr>
-            <a:xfrm>
-              <a:off x="9951870" y="6399930"/>
-              <a:ext cx="1212511" cy="369332"/>
-            </a:xfrm>
-            <a:prstGeom prst="rect">
-              <a:avLst/>
-            </a:prstGeom>
-            <a:noFill/>
-          </p:spPr>
-          <p:txBody>
-            <a:bodyPr wrap="none" rtlCol="0">
-              <a:spAutoFit/>
-            </a:bodyPr>
-            <a:lstStyle/>
-            <a:p>
-              <a:r>
-                <a:rPr lang="en-US"/>
-                <a:t>Word itself</a:t>
-              </a:r>
-            </a:p>
-          </p:txBody>
-        </p:sp>
-        <p:sp>
-          <p:nvSpPr>
-            <p:cNvPr id="23" name="Cross 22">
-              <a:extLst>
-                <a:ext uri="{FF2B5EF4-FFF2-40B4-BE49-F238E27FC236}">
-                  <a16:creationId xmlns:a16="http://schemas.microsoft.com/office/drawing/2014/main" id="{FF046467-D3B7-4A55-B063-C1503B130BE9}"/>
-                </a:ext>
-              </a:extLst>
-            </p:cNvPr>
-            <p:cNvSpPr/>
-            <p:nvPr/>
-          </p:nvSpPr>
-          <p:spPr>
-            <a:xfrm>
-              <a:off x="9056597" y="5501888"/>
-              <a:ext cx="465850" cy="465850"/>
-            </a:xfrm>
-            <a:prstGeom prst="plus">
-              <a:avLst>
-                <a:gd name="adj" fmla="val 42793"/>
-              </a:avLst>
-            </a:prstGeom>
-          </p:spPr>
-          <p:style>
-            <a:lnRef idx="2">
-              <a:schemeClr val="accent1">
-                <a:shade val="50000"/>
-              </a:schemeClr>
-            </a:lnRef>
-            <a:fillRef idx="1">
-              <a:schemeClr val="accent1"/>
-            </a:fillRef>
-            <a:effectRef idx="0">
-              <a:schemeClr val="accent1"/>
-            </a:effectRef>
-            <a:fontRef idx="minor">
-              <a:schemeClr val="lt1"/>
-            </a:fontRef>
-          </p:style>
-          <p:txBody>
-            <a:bodyPr rtlCol="0" anchor="ctr"/>
-            <a:lstStyle/>
-            <a:p>
-              <a:pPr algn="ctr"/>
-              <a:endParaRPr lang="en-US"/>
-            </a:p>
-          </p:txBody>
-        </p:sp>
-      </p:grpSp>
+        </p:nvSpPr>
+        <p:spPr>
+          <a:xfrm>
+            <a:off x="2167355" y="2948566"/>
+            <a:ext cx="628240" cy="249933"/>
+          </a:xfrm>
+          <a:prstGeom prst="rect">
+            <a:avLst/>
+          </a:prstGeom>
+        </p:spPr>
+        <p:style>
+          <a:lnRef idx="2">
+            <a:schemeClr val="accent1">
+              <a:shade val="50000"/>
+            </a:schemeClr>
+          </a:lnRef>
+          <a:fillRef idx="1">
+            <a:schemeClr val="accent1"/>
+          </a:fillRef>
+          <a:effectRef idx="0">
+            <a:schemeClr val="accent1"/>
+          </a:effectRef>
+          <a:fontRef idx="minor">
+            <a:schemeClr val="lt1"/>
+          </a:fontRef>
+        </p:style>
+        <p:txBody>
+          <a:bodyPr rtlCol="0" anchor="ctr"/>
+          <a:lstStyle/>
+          <a:p>
+            <a:pPr algn="ctr"/>
+            <a:r>
+              <a:rPr lang="en-US" dirty="0"/>
+              <a:t>&lt;vi</a:t>
+            </a:r>
+          </a:p>
+        </p:txBody>
+      </p:sp>
+      <p:sp>
+        <p:nvSpPr>
+          <p:cNvPr id="6" name="Rectangle 5">
+            <a:extLst>
+              <a:ext uri="{FF2B5EF4-FFF2-40B4-BE49-F238E27FC236}">
+                <a16:creationId xmlns:a16="http://schemas.microsoft.com/office/drawing/2014/main" id="{C64E57EB-B527-4686-89FC-B093B001214D}"/>
+              </a:ext>
+            </a:extLst>
+          </p:cNvPr>
+          <p:cNvSpPr/>
+          <p:nvPr/>
+        </p:nvSpPr>
+        <p:spPr>
+          <a:xfrm>
+            <a:off x="3003565" y="2948565"/>
+            <a:ext cx="628240" cy="249933"/>
+          </a:xfrm>
+          <a:prstGeom prst="rect">
+            <a:avLst/>
+          </a:prstGeom>
+        </p:spPr>
+        <p:style>
+          <a:lnRef idx="2">
+            <a:schemeClr val="accent1">
+              <a:shade val="50000"/>
+            </a:schemeClr>
+          </a:lnRef>
+          <a:fillRef idx="1">
+            <a:schemeClr val="accent1"/>
+          </a:fillRef>
+          <a:effectRef idx="0">
+            <a:schemeClr val="accent1"/>
+          </a:effectRef>
+          <a:fontRef idx="minor">
+            <a:schemeClr val="lt1"/>
+          </a:fontRef>
+        </p:style>
+        <p:txBody>
+          <a:bodyPr rtlCol="0" anchor="ctr"/>
+          <a:lstStyle/>
+          <a:p>
+            <a:pPr algn="ctr"/>
+            <a:r>
+              <a:rPr lang="en-US" dirty="0"/>
+              <a:t>vis</a:t>
+            </a:r>
+          </a:p>
+        </p:txBody>
+      </p:sp>
+      <p:sp>
+        <p:nvSpPr>
+          <p:cNvPr id="7" name="Rectangle 6">
+            <a:extLst>
+              <a:ext uri="{FF2B5EF4-FFF2-40B4-BE49-F238E27FC236}">
+                <a16:creationId xmlns:a16="http://schemas.microsoft.com/office/drawing/2014/main" id="{2C9EEB89-CBC2-4A2C-8455-0DE42AE9D60C}"/>
+              </a:ext>
+            </a:extLst>
+          </p:cNvPr>
+          <p:cNvSpPr/>
+          <p:nvPr/>
+        </p:nvSpPr>
+        <p:spPr>
+          <a:xfrm>
+            <a:off x="3839775" y="2948564"/>
+            <a:ext cx="628240" cy="249933"/>
+          </a:xfrm>
+          <a:prstGeom prst="rect">
+            <a:avLst/>
+          </a:prstGeom>
+        </p:spPr>
+        <p:style>
+          <a:lnRef idx="2">
+            <a:schemeClr val="accent1">
+              <a:shade val="50000"/>
+            </a:schemeClr>
+          </a:lnRef>
+          <a:fillRef idx="1">
+            <a:schemeClr val="accent1"/>
+          </a:fillRef>
+          <a:effectRef idx="0">
+            <a:schemeClr val="accent1"/>
+          </a:effectRef>
+          <a:fontRef idx="minor">
+            <a:schemeClr val="lt1"/>
+          </a:fontRef>
+        </p:style>
+        <p:txBody>
+          <a:bodyPr rtlCol="0" anchor="ctr"/>
+          <a:lstStyle/>
+          <a:p>
+            <a:pPr algn="ctr"/>
+            <a:r>
+              <a:rPr lang="en-US" dirty="0" err="1"/>
+              <a:t>isu</a:t>
+            </a:r>
+            <a:endParaRPr lang="en-US" dirty="0"/>
+          </a:p>
+        </p:txBody>
+      </p:sp>
+      <p:sp>
+        <p:nvSpPr>
+          <p:cNvPr id="25" name="Rectangle 24">
+            <a:extLst>
+              <a:ext uri="{FF2B5EF4-FFF2-40B4-BE49-F238E27FC236}">
+                <a16:creationId xmlns:a16="http://schemas.microsoft.com/office/drawing/2014/main" id="{9D23D18D-7233-41ED-9604-726D4FE658B3}"/>
+              </a:ext>
+            </a:extLst>
+          </p:cNvPr>
+          <p:cNvSpPr/>
+          <p:nvPr/>
+        </p:nvSpPr>
+        <p:spPr>
+          <a:xfrm>
+            <a:off x="4675985" y="2948563"/>
+            <a:ext cx="628240" cy="249933"/>
+          </a:xfrm>
+          <a:prstGeom prst="rect">
+            <a:avLst/>
+          </a:prstGeom>
+        </p:spPr>
+        <p:style>
+          <a:lnRef idx="2">
+            <a:schemeClr val="accent1">
+              <a:shade val="50000"/>
+            </a:schemeClr>
+          </a:lnRef>
+          <a:fillRef idx="1">
+            <a:schemeClr val="accent1"/>
+          </a:fillRef>
+          <a:effectRef idx="0">
+            <a:schemeClr val="accent1"/>
+          </a:effectRef>
+          <a:fontRef idx="minor">
+            <a:schemeClr val="lt1"/>
+          </a:fontRef>
+        </p:style>
+        <p:txBody>
+          <a:bodyPr rtlCol="0" anchor="ctr"/>
+          <a:lstStyle/>
+          <a:p>
+            <a:pPr algn="ctr"/>
+            <a:r>
+              <a:rPr lang="en-US" dirty="0" err="1"/>
+              <a:t>sua</a:t>
+            </a:r>
+            <a:endParaRPr lang="en-US" dirty="0"/>
+          </a:p>
+        </p:txBody>
+      </p:sp>
+      <p:sp>
+        <p:nvSpPr>
+          <p:cNvPr id="27" name="Rectangle 26">
+            <a:extLst>
+              <a:ext uri="{FF2B5EF4-FFF2-40B4-BE49-F238E27FC236}">
+                <a16:creationId xmlns:a16="http://schemas.microsoft.com/office/drawing/2014/main" id="{1C31E376-20C9-4C87-8123-BB1A6A34E49C}"/>
+              </a:ext>
+            </a:extLst>
+          </p:cNvPr>
+          <p:cNvSpPr/>
+          <p:nvPr/>
+        </p:nvSpPr>
+        <p:spPr>
+          <a:xfrm>
+            <a:off x="5512195" y="2948017"/>
+            <a:ext cx="628240" cy="249933"/>
+          </a:xfrm>
+          <a:prstGeom prst="rect">
+            <a:avLst/>
+          </a:prstGeom>
+          <a:effectLst>
+            <a:outerShdw blurRad="50800" dist="38100" dir="5400000" algn="t" rotWithShape="0">
+              <a:prstClr val="black">
+                <a:alpha val="40000"/>
+              </a:prstClr>
+            </a:outerShdw>
+          </a:effectLst>
+        </p:spPr>
+        <p:style>
+          <a:lnRef idx="2">
+            <a:schemeClr val="accent1">
+              <a:shade val="50000"/>
+            </a:schemeClr>
+          </a:lnRef>
+          <a:fillRef idx="1">
+            <a:schemeClr val="accent1"/>
+          </a:fillRef>
+          <a:effectRef idx="0">
+            <a:schemeClr val="accent1"/>
+          </a:effectRef>
+          <a:fontRef idx="minor">
+            <a:schemeClr val="lt1"/>
+          </a:fontRef>
+        </p:style>
+        <p:txBody>
+          <a:bodyPr rtlCol="0" anchor="ctr"/>
+          <a:lstStyle/>
+          <a:p>
+            <a:pPr algn="ctr"/>
+            <a:r>
+              <a:rPr lang="en-US" dirty="0" err="1"/>
+              <a:t>ual</a:t>
+            </a:r>
+            <a:endParaRPr lang="en-US" dirty="0"/>
+          </a:p>
+        </p:txBody>
+      </p:sp>
+      <p:sp>
+        <p:nvSpPr>
+          <p:cNvPr id="29" name="Rectangle 28">
+            <a:extLst>
+              <a:ext uri="{FF2B5EF4-FFF2-40B4-BE49-F238E27FC236}">
+                <a16:creationId xmlns:a16="http://schemas.microsoft.com/office/drawing/2014/main" id="{5E6EABB2-A5FA-4328-8176-8812FC388F41}"/>
+              </a:ext>
+            </a:extLst>
+          </p:cNvPr>
+          <p:cNvSpPr/>
+          <p:nvPr/>
+        </p:nvSpPr>
+        <p:spPr>
+          <a:xfrm>
+            <a:off x="6348405" y="2947144"/>
+            <a:ext cx="628240" cy="249933"/>
+          </a:xfrm>
+          <a:prstGeom prst="rect">
+            <a:avLst/>
+          </a:prstGeom>
+          <a:effectLst>
+            <a:outerShdw blurRad="50800" dist="38100" dir="5400000" algn="t" rotWithShape="0">
+              <a:prstClr val="black">
+                <a:alpha val="40000"/>
+              </a:prstClr>
+            </a:outerShdw>
+          </a:effectLst>
+        </p:spPr>
+        <p:style>
+          <a:lnRef idx="2">
+            <a:schemeClr val="accent1">
+              <a:shade val="50000"/>
+            </a:schemeClr>
+          </a:lnRef>
+          <a:fillRef idx="1">
+            <a:schemeClr val="accent1"/>
+          </a:fillRef>
+          <a:effectRef idx="0">
+            <a:schemeClr val="accent1"/>
+          </a:effectRef>
+          <a:fontRef idx="minor">
+            <a:schemeClr val="lt1"/>
+          </a:fontRef>
+        </p:style>
+        <p:txBody>
+          <a:bodyPr rtlCol="0" anchor="ctr"/>
+          <a:lstStyle/>
+          <a:p>
+            <a:pPr algn="ctr"/>
+            <a:r>
+              <a:rPr lang="en-US" dirty="0"/>
+              <a:t>al&gt;</a:t>
+            </a:r>
+          </a:p>
+        </p:txBody>
+      </p:sp>
+      <p:sp>
+        <p:nvSpPr>
+          <p:cNvPr id="35" name="Rectangle 34">
+            <a:extLst>
+              <a:ext uri="{FF2B5EF4-FFF2-40B4-BE49-F238E27FC236}">
+                <a16:creationId xmlns:a16="http://schemas.microsoft.com/office/drawing/2014/main" id="{F69EC6E1-F712-4082-A846-61F84FED67A0}"/>
+              </a:ext>
+            </a:extLst>
+          </p:cNvPr>
+          <p:cNvSpPr/>
+          <p:nvPr/>
+        </p:nvSpPr>
+        <p:spPr>
+          <a:xfrm>
+            <a:off x="2167355" y="2947147"/>
+            <a:ext cx="628240" cy="249933"/>
+          </a:xfrm>
+          <a:prstGeom prst="rect">
+            <a:avLst/>
+          </a:prstGeom>
+          <a:effectLst>
+            <a:outerShdw blurRad="50800" dist="38100" dir="5400000" algn="t" rotWithShape="0">
+              <a:prstClr val="black">
+                <a:alpha val="40000"/>
+              </a:prstClr>
+            </a:outerShdw>
+          </a:effectLst>
+        </p:spPr>
+        <p:style>
+          <a:lnRef idx="2">
+            <a:schemeClr val="accent1">
+              <a:shade val="50000"/>
+            </a:schemeClr>
+          </a:lnRef>
+          <a:fillRef idx="1">
+            <a:schemeClr val="accent1"/>
+          </a:fillRef>
+          <a:effectRef idx="0">
+            <a:schemeClr val="accent1"/>
+          </a:effectRef>
+          <a:fontRef idx="minor">
+            <a:schemeClr val="lt1"/>
+          </a:fontRef>
+        </p:style>
+        <p:txBody>
+          <a:bodyPr rtlCol="0" anchor="ctr"/>
+          <a:lstStyle/>
+          <a:p>
+            <a:pPr algn="ctr"/>
+            <a:r>
+              <a:rPr lang="en-US" dirty="0"/>
+              <a:t>&lt;vi</a:t>
+            </a:r>
+          </a:p>
+        </p:txBody>
+      </p:sp>
+      <p:sp>
+        <p:nvSpPr>
+          <p:cNvPr id="36" name="Rectangle 35">
+            <a:extLst>
+              <a:ext uri="{FF2B5EF4-FFF2-40B4-BE49-F238E27FC236}">
+                <a16:creationId xmlns:a16="http://schemas.microsoft.com/office/drawing/2014/main" id="{2E2C133C-3DB4-482C-972B-D6CCBA5CC84B}"/>
+              </a:ext>
+            </a:extLst>
+          </p:cNvPr>
+          <p:cNvSpPr/>
+          <p:nvPr/>
+        </p:nvSpPr>
+        <p:spPr>
+          <a:xfrm>
+            <a:off x="3003565" y="2947146"/>
+            <a:ext cx="628240" cy="249933"/>
+          </a:xfrm>
+          <a:prstGeom prst="rect">
+            <a:avLst/>
+          </a:prstGeom>
+          <a:effectLst>
+            <a:outerShdw blurRad="50800" dist="38100" dir="5400000" algn="t" rotWithShape="0">
+              <a:prstClr val="black">
+                <a:alpha val="40000"/>
+              </a:prstClr>
+            </a:outerShdw>
+          </a:effectLst>
+        </p:spPr>
+        <p:style>
+          <a:lnRef idx="2">
+            <a:schemeClr val="accent1">
+              <a:shade val="50000"/>
+            </a:schemeClr>
+          </a:lnRef>
+          <a:fillRef idx="1">
+            <a:schemeClr val="accent1"/>
+          </a:fillRef>
+          <a:effectRef idx="0">
+            <a:schemeClr val="accent1"/>
+          </a:effectRef>
+          <a:fontRef idx="minor">
+            <a:schemeClr val="lt1"/>
+          </a:fontRef>
+        </p:style>
+        <p:txBody>
+          <a:bodyPr rtlCol="0" anchor="ctr"/>
+          <a:lstStyle/>
+          <a:p>
+            <a:pPr algn="ctr"/>
+            <a:r>
+              <a:rPr lang="en-US" dirty="0"/>
+              <a:t>vis</a:t>
+            </a:r>
+          </a:p>
+        </p:txBody>
+      </p:sp>
+      <p:sp>
+        <p:nvSpPr>
+          <p:cNvPr id="37" name="Rectangle 36">
+            <a:extLst>
+              <a:ext uri="{FF2B5EF4-FFF2-40B4-BE49-F238E27FC236}">
+                <a16:creationId xmlns:a16="http://schemas.microsoft.com/office/drawing/2014/main" id="{753C0E42-01EE-46B7-9FDB-5DB000E765C4}"/>
+              </a:ext>
+            </a:extLst>
+          </p:cNvPr>
+          <p:cNvSpPr/>
+          <p:nvPr/>
+        </p:nvSpPr>
+        <p:spPr>
+          <a:xfrm>
+            <a:off x="3839775" y="2947145"/>
+            <a:ext cx="628240" cy="249933"/>
+          </a:xfrm>
+          <a:prstGeom prst="rect">
+            <a:avLst/>
+          </a:prstGeom>
+          <a:effectLst>
+            <a:outerShdw blurRad="50800" dist="38100" dir="5400000" algn="t" rotWithShape="0">
+              <a:prstClr val="black">
+                <a:alpha val="40000"/>
+              </a:prstClr>
+            </a:outerShdw>
+          </a:effectLst>
+        </p:spPr>
+        <p:style>
+          <a:lnRef idx="2">
+            <a:schemeClr val="accent1">
+              <a:shade val="50000"/>
+            </a:schemeClr>
+          </a:lnRef>
+          <a:fillRef idx="1">
+            <a:schemeClr val="accent1"/>
+          </a:fillRef>
+          <a:effectRef idx="0">
+            <a:schemeClr val="accent1"/>
+          </a:effectRef>
+          <a:fontRef idx="minor">
+            <a:schemeClr val="lt1"/>
+          </a:fontRef>
+        </p:style>
+        <p:txBody>
+          <a:bodyPr rtlCol="0" anchor="ctr"/>
+          <a:lstStyle/>
+          <a:p>
+            <a:pPr algn="ctr"/>
+            <a:r>
+              <a:rPr lang="en-US" dirty="0" err="1"/>
+              <a:t>isu</a:t>
+            </a:r>
+            <a:endParaRPr lang="en-US" dirty="0"/>
+          </a:p>
+        </p:txBody>
+      </p:sp>
+      <p:sp>
+        <p:nvSpPr>
+          <p:cNvPr id="38" name="Rectangle 37">
+            <a:extLst>
+              <a:ext uri="{FF2B5EF4-FFF2-40B4-BE49-F238E27FC236}">
+                <a16:creationId xmlns:a16="http://schemas.microsoft.com/office/drawing/2014/main" id="{FCD0770B-4D44-4A61-B69A-7A1039E33D6D}"/>
+              </a:ext>
+            </a:extLst>
+          </p:cNvPr>
+          <p:cNvSpPr/>
+          <p:nvPr/>
+        </p:nvSpPr>
+        <p:spPr>
+          <a:xfrm>
+            <a:off x="4675985" y="2947144"/>
+            <a:ext cx="628240" cy="249933"/>
+          </a:xfrm>
+          <a:prstGeom prst="rect">
+            <a:avLst/>
+          </a:prstGeom>
+          <a:effectLst>
+            <a:outerShdw blurRad="50800" dist="38100" dir="5400000" algn="t" rotWithShape="0">
+              <a:prstClr val="black">
+                <a:alpha val="40000"/>
+              </a:prstClr>
+            </a:outerShdw>
+          </a:effectLst>
+        </p:spPr>
+        <p:style>
+          <a:lnRef idx="2">
+            <a:schemeClr val="accent1">
+              <a:shade val="50000"/>
+            </a:schemeClr>
+          </a:lnRef>
+          <a:fillRef idx="1">
+            <a:schemeClr val="accent1"/>
+          </a:fillRef>
+          <a:effectRef idx="0">
+            <a:schemeClr val="accent1"/>
+          </a:effectRef>
+          <a:fontRef idx="minor">
+            <a:schemeClr val="lt1"/>
+          </a:fontRef>
+        </p:style>
+        <p:txBody>
+          <a:bodyPr rtlCol="0" anchor="ctr"/>
+          <a:lstStyle/>
+          <a:p>
+            <a:pPr algn="ctr"/>
+            <a:r>
+              <a:rPr lang="en-US" dirty="0" err="1"/>
+              <a:t>sua</a:t>
+            </a:r>
+            <a:endParaRPr lang="en-US" dirty="0"/>
+          </a:p>
+        </p:txBody>
+      </p:sp>
+      <p:sp>
+        <p:nvSpPr>
+          <p:cNvPr id="33" name="Rectangle 32">
+            <a:extLst>
+              <a:ext uri="{FF2B5EF4-FFF2-40B4-BE49-F238E27FC236}">
+                <a16:creationId xmlns:a16="http://schemas.microsoft.com/office/drawing/2014/main" id="{D18EF8AF-2A15-4782-B553-60DE54EC43E1}"/>
+              </a:ext>
+            </a:extLst>
+          </p:cNvPr>
+          <p:cNvSpPr/>
+          <p:nvPr/>
+        </p:nvSpPr>
+        <p:spPr>
+          <a:xfrm>
+            <a:off x="2167355" y="3651177"/>
+            <a:ext cx="4809290" cy="655253"/>
+          </a:xfrm>
+          <a:prstGeom prst="rect">
+            <a:avLst/>
+          </a:prstGeom>
+          <a:effectLst>
+            <a:outerShdw blurRad="50800" dist="38100" dir="5400000" algn="t" rotWithShape="0">
+              <a:prstClr val="black">
+                <a:alpha val="40000"/>
+              </a:prstClr>
+            </a:outerShdw>
+          </a:effectLst>
+        </p:spPr>
+        <p:style>
+          <a:lnRef idx="2">
+            <a:schemeClr val="accent1">
+              <a:shade val="50000"/>
+            </a:schemeClr>
+          </a:lnRef>
+          <a:fillRef idx="1">
+            <a:schemeClr val="accent1"/>
+          </a:fillRef>
+          <a:effectRef idx="0">
+            <a:schemeClr val="accent1"/>
+          </a:effectRef>
+          <a:fontRef idx="minor">
+            <a:schemeClr val="lt1"/>
+          </a:fontRef>
+        </p:style>
+        <p:txBody>
+          <a:bodyPr rtlCol="0" anchor="ctr"/>
+          <a:lstStyle/>
+          <a:p>
+            <a:pPr algn="ctr"/>
+            <a:r>
+              <a:rPr lang="en-US" dirty="0"/>
+              <a:t>Generate one-hot encoded vectors for n-grams</a:t>
+            </a:r>
+          </a:p>
+        </p:txBody>
+      </p:sp>
+      <p:sp>
+        <p:nvSpPr>
+          <p:cNvPr id="34" name="Rectangle 33">
+            <a:extLst>
+              <a:ext uri="{FF2B5EF4-FFF2-40B4-BE49-F238E27FC236}">
+                <a16:creationId xmlns:a16="http://schemas.microsoft.com/office/drawing/2014/main" id="{5CD5FC06-0767-4429-86AE-05B78FD6413E}"/>
+              </a:ext>
+            </a:extLst>
+          </p:cNvPr>
+          <p:cNvSpPr/>
+          <p:nvPr/>
+        </p:nvSpPr>
+        <p:spPr>
+          <a:xfrm>
+            <a:off x="2640693" y="4786809"/>
+            <a:ext cx="3862612" cy="312968"/>
+          </a:xfrm>
+          <a:prstGeom prst="rect">
+            <a:avLst/>
+          </a:prstGeom>
+          <a:effectLst>
+            <a:outerShdw blurRad="50800" dist="38100" dir="5400000" algn="t" rotWithShape="0">
+              <a:prstClr val="black">
+                <a:alpha val="40000"/>
+              </a:prstClr>
+            </a:outerShdw>
+          </a:effectLst>
+        </p:spPr>
+        <p:style>
+          <a:lnRef idx="2">
+            <a:schemeClr val="accent1">
+              <a:shade val="50000"/>
+            </a:schemeClr>
+          </a:lnRef>
+          <a:fillRef idx="1">
+            <a:schemeClr val="accent1"/>
+          </a:fillRef>
+          <a:effectRef idx="0">
+            <a:schemeClr val="accent1"/>
+          </a:effectRef>
+          <a:fontRef idx="minor">
+            <a:schemeClr val="lt1"/>
+          </a:fontRef>
+        </p:style>
+        <p:txBody>
+          <a:bodyPr rtlCol="0" anchor="ctr"/>
+          <a:lstStyle/>
+          <a:p>
+            <a:pPr algn="ctr"/>
+            <a:r>
+              <a:rPr lang="en-US" dirty="0"/>
+              <a:t>Sum</a:t>
+            </a:r>
+          </a:p>
+        </p:txBody>
+      </p:sp>
+      <p:sp>
+        <p:nvSpPr>
+          <p:cNvPr id="40" name="Rectangle 39">
+            <a:extLst>
+              <a:ext uri="{FF2B5EF4-FFF2-40B4-BE49-F238E27FC236}">
+                <a16:creationId xmlns:a16="http://schemas.microsoft.com/office/drawing/2014/main" id="{7F203DCC-5CC3-4D3E-AAFD-869799274B24}"/>
+              </a:ext>
+            </a:extLst>
+          </p:cNvPr>
+          <p:cNvSpPr/>
+          <p:nvPr/>
+        </p:nvSpPr>
+        <p:spPr>
+          <a:xfrm>
+            <a:off x="3572512" y="1510785"/>
+            <a:ext cx="1998973" cy="298129"/>
+          </a:xfrm>
+          <a:prstGeom prst="rect">
+            <a:avLst/>
+          </a:prstGeom>
+        </p:spPr>
+        <p:style>
+          <a:lnRef idx="2">
+            <a:schemeClr val="accent1">
+              <a:shade val="50000"/>
+            </a:schemeClr>
+          </a:lnRef>
+          <a:fillRef idx="1">
+            <a:schemeClr val="accent1"/>
+          </a:fillRef>
+          <a:effectRef idx="0">
+            <a:schemeClr val="accent1"/>
+          </a:effectRef>
+          <a:fontRef idx="minor">
+            <a:schemeClr val="lt1"/>
+          </a:fontRef>
+        </p:style>
+        <p:txBody>
+          <a:bodyPr rtlCol="0" anchor="ctr"/>
+          <a:lstStyle/>
+          <a:p>
+            <a:pPr algn="ctr"/>
+            <a:r>
+              <a:rPr lang="en-US" dirty="0"/>
+              <a:t>visual</a:t>
+            </a:r>
+          </a:p>
+        </p:txBody>
+      </p:sp>
+      <p:cxnSp>
+        <p:nvCxnSpPr>
+          <p:cNvPr id="42" name="Straight Arrow Connector 41">
+            <a:extLst>
+              <a:ext uri="{FF2B5EF4-FFF2-40B4-BE49-F238E27FC236}">
+                <a16:creationId xmlns:a16="http://schemas.microsoft.com/office/drawing/2014/main" id="{54BDC582-9EB4-40E6-BA18-5D48A9643D0C}"/>
+              </a:ext>
+            </a:extLst>
+          </p:cNvPr>
+          <p:cNvCxnSpPr>
+            <a:cxnSpLocks/>
+            <a:stCxn id="40" idx="2"/>
+            <a:endCxn id="35" idx="0"/>
+          </p:cNvCxnSpPr>
+          <p:nvPr/>
+        </p:nvCxnSpPr>
+        <p:spPr>
+          <a:xfrm flipH="1">
+            <a:off x="2481475" y="1808914"/>
+            <a:ext cx="2090524" cy="1138233"/>
+          </a:xfrm>
+          <a:prstGeom prst="straightConnector1">
+            <a:avLst/>
+          </a:prstGeom>
+          <a:ln>
+            <a:tailEnd type="triangle"/>
+          </a:ln>
+        </p:spPr>
+        <p:style>
+          <a:lnRef idx="2">
+            <a:schemeClr val="accent2"/>
+          </a:lnRef>
+          <a:fillRef idx="0">
+            <a:schemeClr val="accent2"/>
+          </a:fillRef>
+          <a:effectRef idx="1">
+            <a:schemeClr val="accent2"/>
+          </a:effectRef>
+          <a:fontRef idx="minor">
+            <a:schemeClr val="tx1"/>
+          </a:fontRef>
+        </p:style>
+      </p:cxnSp>
+      <p:cxnSp>
+        <p:nvCxnSpPr>
+          <p:cNvPr id="43" name="Straight Arrow Connector 42">
+            <a:extLst>
+              <a:ext uri="{FF2B5EF4-FFF2-40B4-BE49-F238E27FC236}">
+                <a16:creationId xmlns:a16="http://schemas.microsoft.com/office/drawing/2014/main" id="{327FDAFC-8C81-4D5C-B692-05BEF8A6F404}"/>
+              </a:ext>
+            </a:extLst>
+          </p:cNvPr>
+          <p:cNvCxnSpPr>
+            <a:cxnSpLocks/>
+            <a:stCxn id="40" idx="2"/>
+            <a:endCxn id="36" idx="0"/>
+          </p:cNvCxnSpPr>
+          <p:nvPr/>
+        </p:nvCxnSpPr>
+        <p:spPr>
+          <a:xfrm flipH="1">
+            <a:off x="3317685" y="1808914"/>
+            <a:ext cx="1254314" cy="1138232"/>
+          </a:xfrm>
+          <a:prstGeom prst="straightConnector1">
+            <a:avLst/>
+          </a:prstGeom>
+          <a:ln>
+            <a:tailEnd type="triangle"/>
+          </a:ln>
+        </p:spPr>
+        <p:style>
+          <a:lnRef idx="2">
+            <a:schemeClr val="accent2"/>
+          </a:lnRef>
+          <a:fillRef idx="0">
+            <a:schemeClr val="accent2"/>
+          </a:fillRef>
+          <a:effectRef idx="1">
+            <a:schemeClr val="accent2"/>
+          </a:effectRef>
+          <a:fontRef idx="minor">
+            <a:schemeClr val="tx1"/>
+          </a:fontRef>
+        </p:style>
+      </p:cxnSp>
+      <p:cxnSp>
+        <p:nvCxnSpPr>
+          <p:cNvPr id="47" name="Straight Arrow Connector 46">
+            <a:extLst>
+              <a:ext uri="{FF2B5EF4-FFF2-40B4-BE49-F238E27FC236}">
+                <a16:creationId xmlns:a16="http://schemas.microsoft.com/office/drawing/2014/main" id="{49128FF8-982B-4C01-BC03-0D6D4053A1AC}"/>
+              </a:ext>
+            </a:extLst>
+          </p:cNvPr>
+          <p:cNvCxnSpPr>
+            <a:cxnSpLocks/>
+            <a:stCxn id="40" idx="2"/>
+            <a:endCxn id="37" idx="0"/>
+          </p:cNvCxnSpPr>
+          <p:nvPr/>
+        </p:nvCxnSpPr>
+        <p:spPr>
+          <a:xfrm flipH="1">
+            <a:off x="4153895" y="1808914"/>
+            <a:ext cx="418104" cy="1138231"/>
+          </a:xfrm>
+          <a:prstGeom prst="straightConnector1">
+            <a:avLst/>
+          </a:prstGeom>
+          <a:ln>
+            <a:tailEnd type="triangle"/>
+          </a:ln>
+        </p:spPr>
+        <p:style>
+          <a:lnRef idx="2">
+            <a:schemeClr val="accent2"/>
+          </a:lnRef>
+          <a:fillRef idx="0">
+            <a:schemeClr val="accent2"/>
+          </a:fillRef>
+          <a:effectRef idx="1">
+            <a:schemeClr val="accent2"/>
+          </a:effectRef>
+          <a:fontRef idx="minor">
+            <a:schemeClr val="tx1"/>
+          </a:fontRef>
+        </p:style>
+      </p:cxnSp>
+      <p:cxnSp>
+        <p:nvCxnSpPr>
+          <p:cNvPr id="53" name="Straight Arrow Connector 52">
+            <a:extLst>
+              <a:ext uri="{FF2B5EF4-FFF2-40B4-BE49-F238E27FC236}">
+                <a16:creationId xmlns:a16="http://schemas.microsoft.com/office/drawing/2014/main" id="{8D688CFB-942B-4D80-93F0-8190DAD3F519}"/>
+              </a:ext>
+            </a:extLst>
+          </p:cNvPr>
+          <p:cNvCxnSpPr>
+            <a:cxnSpLocks/>
+            <a:stCxn id="40" idx="2"/>
+            <a:endCxn id="38" idx="0"/>
+          </p:cNvCxnSpPr>
+          <p:nvPr/>
+        </p:nvCxnSpPr>
+        <p:spPr>
+          <a:xfrm>
+            <a:off x="4571999" y="1808914"/>
+            <a:ext cx="418106" cy="1138230"/>
+          </a:xfrm>
+          <a:prstGeom prst="straightConnector1">
+            <a:avLst/>
+          </a:prstGeom>
+          <a:ln>
+            <a:tailEnd type="triangle"/>
+          </a:ln>
+        </p:spPr>
+        <p:style>
+          <a:lnRef idx="2">
+            <a:schemeClr val="accent2"/>
+          </a:lnRef>
+          <a:fillRef idx="0">
+            <a:schemeClr val="accent2"/>
+          </a:fillRef>
+          <a:effectRef idx="1">
+            <a:schemeClr val="accent2"/>
+          </a:effectRef>
+          <a:fontRef idx="minor">
+            <a:schemeClr val="tx1"/>
+          </a:fontRef>
+        </p:style>
+      </p:cxnSp>
+      <p:cxnSp>
+        <p:nvCxnSpPr>
+          <p:cNvPr id="57" name="Straight Arrow Connector 56">
+            <a:extLst>
+              <a:ext uri="{FF2B5EF4-FFF2-40B4-BE49-F238E27FC236}">
+                <a16:creationId xmlns:a16="http://schemas.microsoft.com/office/drawing/2014/main" id="{8D140A95-BD10-4702-AD3A-41F99095272F}"/>
+              </a:ext>
+            </a:extLst>
+          </p:cNvPr>
+          <p:cNvCxnSpPr>
+            <a:cxnSpLocks/>
+            <a:stCxn id="40" idx="2"/>
+            <a:endCxn id="27" idx="0"/>
+          </p:cNvCxnSpPr>
+          <p:nvPr/>
+        </p:nvCxnSpPr>
+        <p:spPr>
+          <a:xfrm>
+            <a:off x="4571999" y="1808914"/>
+            <a:ext cx="1254316" cy="1139103"/>
+          </a:xfrm>
+          <a:prstGeom prst="straightConnector1">
+            <a:avLst/>
+          </a:prstGeom>
+          <a:ln>
+            <a:tailEnd type="triangle"/>
+          </a:ln>
+        </p:spPr>
+        <p:style>
+          <a:lnRef idx="2">
+            <a:schemeClr val="accent2"/>
+          </a:lnRef>
+          <a:fillRef idx="0">
+            <a:schemeClr val="accent2"/>
+          </a:fillRef>
+          <a:effectRef idx="1">
+            <a:schemeClr val="accent2"/>
+          </a:effectRef>
+          <a:fontRef idx="minor">
+            <a:schemeClr val="tx1"/>
+          </a:fontRef>
+        </p:style>
+      </p:cxnSp>
+      <p:cxnSp>
+        <p:nvCxnSpPr>
+          <p:cNvPr id="61" name="Straight Arrow Connector 60">
+            <a:extLst>
+              <a:ext uri="{FF2B5EF4-FFF2-40B4-BE49-F238E27FC236}">
+                <a16:creationId xmlns:a16="http://schemas.microsoft.com/office/drawing/2014/main" id="{C4E84F38-A3CA-4AB0-A412-13996E730711}"/>
+              </a:ext>
+            </a:extLst>
+          </p:cNvPr>
+          <p:cNvCxnSpPr>
+            <a:cxnSpLocks/>
+            <a:stCxn id="40" idx="2"/>
+            <a:endCxn id="29" idx="0"/>
+          </p:cNvCxnSpPr>
+          <p:nvPr/>
+        </p:nvCxnSpPr>
+        <p:spPr>
+          <a:xfrm>
+            <a:off x="4571999" y="1808914"/>
+            <a:ext cx="2090526" cy="1138230"/>
+          </a:xfrm>
+          <a:prstGeom prst="straightConnector1">
+            <a:avLst/>
+          </a:prstGeom>
+          <a:ln>
+            <a:tailEnd type="triangle"/>
+          </a:ln>
+        </p:spPr>
+        <p:style>
+          <a:lnRef idx="2">
+            <a:schemeClr val="accent2"/>
+          </a:lnRef>
+          <a:fillRef idx="0">
+            <a:schemeClr val="accent2"/>
+          </a:fillRef>
+          <a:effectRef idx="1">
+            <a:schemeClr val="accent2"/>
+          </a:effectRef>
+          <a:fontRef idx="minor">
+            <a:schemeClr val="tx1"/>
+          </a:fontRef>
+        </p:style>
+      </p:cxnSp>
+      <p:cxnSp>
+        <p:nvCxnSpPr>
+          <p:cNvPr id="259" name="Straight Arrow Connector 258">
+            <a:extLst>
+              <a:ext uri="{FF2B5EF4-FFF2-40B4-BE49-F238E27FC236}">
+                <a16:creationId xmlns:a16="http://schemas.microsoft.com/office/drawing/2014/main" id="{79DA1ADA-0A81-4AC1-B07A-92187AB1A026}"/>
+              </a:ext>
+            </a:extLst>
+          </p:cNvPr>
+          <p:cNvCxnSpPr>
+            <a:cxnSpLocks/>
+            <a:stCxn id="35" idx="2"/>
+          </p:cNvCxnSpPr>
+          <p:nvPr/>
+        </p:nvCxnSpPr>
+        <p:spPr>
+          <a:xfrm>
+            <a:off x="2481475" y="3197080"/>
+            <a:ext cx="12005" cy="472023"/>
+          </a:xfrm>
+          <a:prstGeom prst="straightConnector1">
+            <a:avLst/>
+          </a:prstGeom>
+          <a:ln>
+            <a:tailEnd type="triangle"/>
+          </a:ln>
+        </p:spPr>
+        <p:style>
+          <a:lnRef idx="2">
+            <a:schemeClr val="accent6"/>
+          </a:lnRef>
+          <a:fillRef idx="0">
+            <a:schemeClr val="accent6"/>
+          </a:fillRef>
+          <a:effectRef idx="1">
+            <a:schemeClr val="accent6"/>
+          </a:effectRef>
+          <a:fontRef idx="minor">
+            <a:schemeClr val="tx1"/>
+          </a:fontRef>
+        </p:style>
+      </p:cxnSp>
+      <p:cxnSp>
+        <p:nvCxnSpPr>
+          <p:cNvPr id="260" name="Straight Arrow Connector 259">
+            <a:extLst>
+              <a:ext uri="{FF2B5EF4-FFF2-40B4-BE49-F238E27FC236}">
+                <a16:creationId xmlns:a16="http://schemas.microsoft.com/office/drawing/2014/main" id="{55194994-0D33-4969-98C0-FCD4BCDA6096}"/>
+              </a:ext>
+            </a:extLst>
+          </p:cNvPr>
+          <p:cNvCxnSpPr>
+            <a:cxnSpLocks/>
+          </p:cNvCxnSpPr>
+          <p:nvPr/>
+        </p:nvCxnSpPr>
+        <p:spPr>
+          <a:xfrm>
+            <a:off x="3297805" y="3203552"/>
+            <a:ext cx="11468" cy="450895"/>
+          </a:xfrm>
+          <a:prstGeom prst="straightConnector1">
+            <a:avLst/>
+          </a:prstGeom>
+          <a:ln>
+            <a:tailEnd type="triangle"/>
+          </a:ln>
+        </p:spPr>
+        <p:style>
+          <a:lnRef idx="2">
+            <a:schemeClr val="accent6"/>
+          </a:lnRef>
+          <a:fillRef idx="0">
+            <a:schemeClr val="accent6"/>
+          </a:fillRef>
+          <a:effectRef idx="1">
+            <a:schemeClr val="accent6"/>
+          </a:effectRef>
+          <a:fontRef idx="minor">
+            <a:schemeClr val="tx1"/>
+          </a:fontRef>
+        </p:style>
+      </p:cxnSp>
+      <p:cxnSp>
+        <p:nvCxnSpPr>
+          <p:cNvPr id="261" name="Straight Arrow Connector 260">
+            <a:extLst>
+              <a:ext uri="{FF2B5EF4-FFF2-40B4-BE49-F238E27FC236}">
+                <a16:creationId xmlns:a16="http://schemas.microsoft.com/office/drawing/2014/main" id="{0E51B9A8-0000-496D-87B6-A149F5666024}"/>
+              </a:ext>
+            </a:extLst>
+          </p:cNvPr>
+          <p:cNvCxnSpPr>
+            <a:cxnSpLocks/>
+          </p:cNvCxnSpPr>
+          <p:nvPr/>
+        </p:nvCxnSpPr>
+        <p:spPr>
+          <a:xfrm>
+            <a:off x="4142427" y="3203552"/>
+            <a:ext cx="11468" cy="450895"/>
+          </a:xfrm>
+          <a:prstGeom prst="straightConnector1">
+            <a:avLst/>
+          </a:prstGeom>
+          <a:ln>
+            <a:tailEnd type="triangle"/>
+          </a:ln>
+        </p:spPr>
+        <p:style>
+          <a:lnRef idx="2">
+            <a:schemeClr val="accent6"/>
+          </a:lnRef>
+          <a:fillRef idx="0">
+            <a:schemeClr val="accent6"/>
+          </a:fillRef>
+          <a:effectRef idx="1">
+            <a:schemeClr val="accent6"/>
+          </a:effectRef>
+          <a:fontRef idx="minor">
+            <a:schemeClr val="tx1"/>
+          </a:fontRef>
+        </p:style>
+      </p:cxnSp>
+      <p:cxnSp>
+        <p:nvCxnSpPr>
+          <p:cNvPr id="262" name="Straight Arrow Connector 261">
+            <a:extLst>
+              <a:ext uri="{FF2B5EF4-FFF2-40B4-BE49-F238E27FC236}">
+                <a16:creationId xmlns:a16="http://schemas.microsoft.com/office/drawing/2014/main" id="{F74613EC-175E-4D3F-8F28-CD3D03A0936A}"/>
+              </a:ext>
+            </a:extLst>
+          </p:cNvPr>
+          <p:cNvCxnSpPr>
+            <a:cxnSpLocks/>
+          </p:cNvCxnSpPr>
+          <p:nvPr/>
+        </p:nvCxnSpPr>
+        <p:spPr>
+          <a:xfrm>
+            <a:off x="4981315" y="3211549"/>
+            <a:ext cx="11468" cy="450895"/>
+          </a:xfrm>
+          <a:prstGeom prst="straightConnector1">
+            <a:avLst/>
+          </a:prstGeom>
+          <a:ln>
+            <a:tailEnd type="triangle"/>
+          </a:ln>
+        </p:spPr>
+        <p:style>
+          <a:lnRef idx="2">
+            <a:schemeClr val="accent6"/>
+          </a:lnRef>
+          <a:fillRef idx="0">
+            <a:schemeClr val="accent6"/>
+          </a:fillRef>
+          <a:effectRef idx="1">
+            <a:schemeClr val="accent6"/>
+          </a:effectRef>
+          <a:fontRef idx="minor">
+            <a:schemeClr val="tx1"/>
+          </a:fontRef>
+        </p:style>
+      </p:cxnSp>
+      <p:cxnSp>
+        <p:nvCxnSpPr>
+          <p:cNvPr id="263" name="Straight Arrow Connector 262">
+            <a:extLst>
+              <a:ext uri="{FF2B5EF4-FFF2-40B4-BE49-F238E27FC236}">
+                <a16:creationId xmlns:a16="http://schemas.microsoft.com/office/drawing/2014/main" id="{B29E71F3-B33F-48CA-B154-D3BA3C49A173}"/>
+              </a:ext>
+            </a:extLst>
+          </p:cNvPr>
+          <p:cNvCxnSpPr>
+            <a:cxnSpLocks/>
+          </p:cNvCxnSpPr>
+          <p:nvPr/>
+        </p:nvCxnSpPr>
+        <p:spPr>
+          <a:xfrm>
+            <a:off x="5803379" y="3203552"/>
+            <a:ext cx="11468" cy="450895"/>
+          </a:xfrm>
+          <a:prstGeom prst="straightConnector1">
+            <a:avLst/>
+          </a:prstGeom>
+          <a:ln>
+            <a:tailEnd type="triangle"/>
+          </a:ln>
+        </p:spPr>
+        <p:style>
+          <a:lnRef idx="2">
+            <a:schemeClr val="accent6"/>
+          </a:lnRef>
+          <a:fillRef idx="0">
+            <a:schemeClr val="accent6"/>
+          </a:fillRef>
+          <a:effectRef idx="1">
+            <a:schemeClr val="accent6"/>
+          </a:effectRef>
+          <a:fontRef idx="minor">
+            <a:schemeClr val="tx1"/>
+          </a:fontRef>
+        </p:style>
+      </p:cxnSp>
+      <p:cxnSp>
+        <p:nvCxnSpPr>
+          <p:cNvPr id="264" name="Straight Arrow Connector 263">
+            <a:extLst>
+              <a:ext uri="{FF2B5EF4-FFF2-40B4-BE49-F238E27FC236}">
+                <a16:creationId xmlns:a16="http://schemas.microsoft.com/office/drawing/2014/main" id="{2FEEE5EC-A28C-477E-A7E2-60DA2484CB86}"/>
+              </a:ext>
+            </a:extLst>
+          </p:cNvPr>
+          <p:cNvCxnSpPr>
+            <a:cxnSpLocks/>
+          </p:cNvCxnSpPr>
+          <p:nvPr/>
+        </p:nvCxnSpPr>
+        <p:spPr>
+          <a:xfrm>
+            <a:off x="6647166" y="3218208"/>
+            <a:ext cx="11468" cy="450895"/>
+          </a:xfrm>
+          <a:prstGeom prst="straightConnector1">
+            <a:avLst/>
+          </a:prstGeom>
+          <a:ln>
+            <a:tailEnd type="triangle"/>
+          </a:ln>
+        </p:spPr>
+        <p:style>
+          <a:lnRef idx="2">
+            <a:schemeClr val="accent6"/>
+          </a:lnRef>
+          <a:fillRef idx="0">
+            <a:schemeClr val="accent6"/>
+          </a:fillRef>
+          <a:effectRef idx="1">
+            <a:schemeClr val="accent6"/>
+          </a:effectRef>
+          <a:fontRef idx="minor">
+            <a:schemeClr val="tx1"/>
+          </a:fontRef>
+        </p:style>
+      </p:cxnSp>
+      <p:cxnSp>
+        <p:nvCxnSpPr>
+          <p:cNvPr id="272" name="Straight Arrow Connector 271">
+            <a:extLst>
+              <a:ext uri="{FF2B5EF4-FFF2-40B4-BE49-F238E27FC236}">
+                <a16:creationId xmlns:a16="http://schemas.microsoft.com/office/drawing/2014/main" id="{520A60C2-3686-4050-97C2-5537C7B651F0}"/>
+              </a:ext>
+            </a:extLst>
+          </p:cNvPr>
+          <p:cNvCxnSpPr/>
+          <p:nvPr/>
+        </p:nvCxnSpPr>
+        <p:spPr>
+          <a:xfrm>
+            <a:off x="1424539" y="4475747"/>
+            <a:ext cx="0" cy="0"/>
+          </a:xfrm>
+          <a:prstGeom prst="straightConnector1">
+            <a:avLst/>
+          </a:prstGeom>
+          <a:ln>
+            <a:tailEnd type="triangle"/>
+          </a:ln>
+        </p:spPr>
+        <p:style>
+          <a:lnRef idx="1">
+            <a:schemeClr val="accent1"/>
+          </a:lnRef>
+          <a:fillRef idx="0">
+            <a:schemeClr val="accent1"/>
+          </a:fillRef>
+          <a:effectRef idx="0">
+            <a:schemeClr val="accent1"/>
+          </a:effectRef>
+          <a:fontRef idx="minor">
+            <a:schemeClr val="tx1"/>
+          </a:fontRef>
+        </p:style>
+      </p:cxnSp>
+      <p:cxnSp>
+        <p:nvCxnSpPr>
+          <p:cNvPr id="273" name="Straight Arrow Connector 272">
+            <a:extLst>
+              <a:ext uri="{FF2B5EF4-FFF2-40B4-BE49-F238E27FC236}">
+                <a16:creationId xmlns:a16="http://schemas.microsoft.com/office/drawing/2014/main" id="{D6615C19-7A7F-4C00-9EF0-7E6A5A596356}"/>
+              </a:ext>
+            </a:extLst>
+          </p:cNvPr>
+          <p:cNvCxnSpPr>
+            <a:cxnSpLocks/>
+          </p:cNvCxnSpPr>
+          <p:nvPr/>
+        </p:nvCxnSpPr>
+        <p:spPr>
+          <a:xfrm>
+            <a:off x="3131037" y="4314898"/>
+            <a:ext cx="11468" cy="450895"/>
+          </a:xfrm>
+          <a:prstGeom prst="straightConnector1">
+            <a:avLst/>
+          </a:prstGeom>
+          <a:ln>
+            <a:tailEnd type="triangle"/>
+          </a:ln>
+        </p:spPr>
+        <p:style>
+          <a:lnRef idx="2">
+            <a:schemeClr val="accent6"/>
+          </a:lnRef>
+          <a:fillRef idx="0">
+            <a:schemeClr val="accent6"/>
+          </a:fillRef>
+          <a:effectRef idx="1">
+            <a:schemeClr val="accent6"/>
+          </a:effectRef>
+          <a:fontRef idx="minor">
+            <a:schemeClr val="tx1"/>
+          </a:fontRef>
+        </p:style>
+      </p:cxnSp>
+      <p:cxnSp>
+        <p:nvCxnSpPr>
+          <p:cNvPr id="274" name="Straight Arrow Connector 273">
+            <a:extLst>
+              <a:ext uri="{FF2B5EF4-FFF2-40B4-BE49-F238E27FC236}">
+                <a16:creationId xmlns:a16="http://schemas.microsoft.com/office/drawing/2014/main" id="{E0A37FB7-03D1-4F06-BE09-7C10ED963457}"/>
+              </a:ext>
+            </a:extLst>
+          </p:cNvPr>
+          <p:cNvCxnSpPr>
+            <a:cxnSpLocks/>
+          </p:cNvCxnSpPr>
+          <p:nvPr/>
+        </p:nvCxnSpPr>
+        <p:spPr>
+          <a:xfrm>
+            <a:off x="3667966" y="4314897"/>
+            <a:ext cx="11468" cy="450895"/>
+          </a:xfrm>
+          <a:prstGeom prst="straightConnector1">
+            <a:avLst/>
+          </a:prstGeom>
+          <a:ln>
+            <a:tailEnd type="triangle"/>
+          </a:ln>
+        </p:spPr>
+        <p:style>
+          <a:lnRef idx="2">
+            <a:schemeClr val="accent6"/>
+          </a:lnRef>
+          <a:fillRef idx="0">
+            <a:schemeClr val="accent6"/>
+          </a:fillRef>
+          <a:effectRef idx="1">
+            <a:schemeClr val="accent6"/>
+          </a:effectRef>
+          <a:fontRef idx="minor">
+            <a:schemeClr val="tx1"/>
+          </a:fontRef>
+        </p:style>
+      </p:cxnSp>
+      <p:cxnSp>
+        <p:nvCxnSpPr>
+          <p:cNvPr id="275" name="Straight Arrow Connector 274">
+            <a:extLst>
+              <a:ext uri="{FF2B5EF4-FFF2-40B4-BE49-F238E27FC236}">
+                <a16:creationId xmlns:a16="http://schemas.microsoft.com/office/drawing/2014/main" id="{C22A6BFE-8102-4B30-A5F4-DC1A547E81A4}"/>
+              </a:ext>
+            </a:extLst>
+          </p:cNvPr>
+          <p:cNvCxnSpPr>
+            <a:cxnSpLocks/>
+          </p:cNvCxnSpPr>
+          <p:nvPr/>
+        </p:nvCxnSpPr>
+        <p:spPr>
+          <a:xfrm>
+            <a:off x="4208266" y="4314896"/>
+            <a:ext cx="11468" cy="450895"/>
+          </a:xfrm>
+          <a:prstGeom prst="straightConnector1">
+            <a:avLst/>
+          </a:prstGeom>
+          <a:ln>
+            <a:tailEnd type="triangle"/>
+          </a:ln>
+        </p:spPr>
+        <p:style>
+          <a:lnRef idx="2">
+            <a:schemeClr val="accent6"/>
+          </a:lnRef>
+          <a:fillRef idx="0">
+            <a:schemeClr val="accent6"/>
+          </a:fillRef>
+          <a:effectRef idx="1">
+            <a:schemeClr val="accent6"/>
+          </a:effectRef>
+          <a:fontRef idx="minor">
+            <a:schemeClr val="tx1"/>
+          </a:fontRef>
+        </p:style>
+      </p:cxnSp>
+      <p:cxnSp>
+        <p:nvCxnSpPr>
+          <p:cNvPr id="276" name="Straight Arrow Connector 275">
+            <a:extLst>
+              <a:ext uri="{FF2B5EF4-FFF2-40B4-BE49-F238E27FC236}">
+                <a16:creationId xmlns:a16="http://schemas.microsoft.com/office/drawing/2014/main" id="{C555D77B-5BC2-4D4F-B711-6882FC6E6972}"/>
+              </a:ext>
+            </a:extLst>
+          </p:cNvPr>
+          <p:cNvCxnSpPr>
+            <a:cxnSpLocks/>
+          </p:cNvCxnSpPr>
+          <p:nvPr/>
+        </p:nvCxnSpPr>
+        <p:spPr>
+          <a:xfrm>
+            <a:off x="4746723" y="4314895"/>
+            <a:ext cx="11468" cy="450895"/>
+          </a:xfrm>
+          <a:prstGeom prst="straightConnector1">
+            <a:avLst/>
+          </a:prstGeom>
+          <a:ln>
+            <a:tailEnd type="triangle"/>
+          </a:ln>
+        </p:spPr>
+        <p:style>
+          <a:lnRef idx="2">
+            <a:schemeClr val="accent6"/>
+          </a:lnRef>
+          <a:fillRef idx="0">
+            <a:schemeClr val="accent6"/>
+          </a:fillRef>
+          <a:effectRef idx="1">
+            <a:schemeClr val="accent6"/>
+          </a:effectRef>
+          <a:fontRef idx="minor">
+            <a:schemeClr val="tx1"/>
+          </a:fontRef>
+        </p:style>
+      </p:cxnSp>
+      <p:cxnSp>
+        <p:nvCxnSpPr>
+          <p:cNvPr id="277" name="Straight Arrow Connector 276">
+            <a:extLst>
+              <a:ext uri="{FF2B5EF4-FFF2-40B4-BE49-F238E27FC236}">
+                <a16:creationId xmlns:a16="http://schemas.microsoft.com/office/drawing/2014/main" id="{FFB022C1-3ACE-4585-A749-5B5B44C8BF6C}"/>
+              </a:ext>
+            </a:extLst>
+          </p:cNvPr>
+          <p:cNvCxnSpPr>
+            <a:cxnSpLocks/>
+          </p:cNvCxnSpPr>
+          <p:nvPr/>
+        </p:nvCxnSpPr>
+        <p:spPr>
+          <a:xfrm>
+            <a:off x="5283652" y="4314894"/>
+            <a:ext cx="11468" cy="450895"/>
+          </a:xfrm>
+          <a:prstGeom prst="straightConnector1">
+            <a:avLst/>
+          </a:prstGeom>
+          <a:ln>
+            <a:tailEnd type="triangle"/>
+          </a:ln>
+        </p:spPr>
+        <p:style>
+          <a:lnRef idx="2">
+            <a:schemeClr val="accent6"/>
+          </a:lnRef>
+          <a:fillRef idx="0">
+            <a:schemeClr val="accent6"/>
+          </a:fillRef>
+          <a:effectRef idx="1">
+            <a:schemeClr val="accent6"/>
+          </a:effectRef>
+          <a:fontRef idx="minor">
+            <a:schemeClr val="tx1"/>
+          </a:fontRef>
+        </p:style>
+      </p:cxnSp>
+      <p:cxnSp>
+        <p:nvCxnSpPr>
+          <p:cNvPr id="279" name="Straight Arrow Connector 278">
+            <a:extLst>
+              <a:ext uri="{FF2B5EF4-FFF2-40B4-BE49-F238E27FC236}">
+                <a16:creationId xmlns:a16="http://schemas.microsoft.com/office/drawing/2014/main" id="{BE431524-72F3-43B5-89FF-218AF5213A01}"/>
+              </a:ext>
+            </a:extLst>
+          </p:cNvPr>
+          <p:cNvCxnSpPr>
+            <a:cxnSpLocks/>
+          </p:cNvCxnSpPr>
+          <p:nvPr/>
+        </p:nvCxnSpPr>
+        <p:spPr>
+          <a:xfrm>
+            <a:off x="5820581" y="4314893"/>
+            <a:ext cx="11468" cy="450895"/>
+          </a:xfrm>
+          <a:prstGeom prst="straightConnector1">
+            <a:avLst/>
+          </a:prstGeom>
+          <a:ln>
+            <a:tailEnd type="triangle"/>
+          </a:ln>
+        </p:spPr>
+        <p:style>
+          <a:lnRef idx="2">
+            <a:schemeClr val="accent6"/>
+          </a:lnRef>
+          <a:fillRef idx="0">
+            <a:schemeClr val="accent6"/>
+          </a:fillRef>
+          <a:effectRef idx="1">
+            <a:schemeClr val="accent6"/>
+          </a:effectRef>
+          <a:fontRef idx="minor">
+            <a:schemeClr val="tx1"/>
+          </a:fontRef>
+        </p:style>
+      </p:cxnSp>
+      <p:cxnSp>
+        <p:nvCxnSpPr>
+          <p:cNvPr id="282" name="Straight Arrow Connector 281">
+            <a:extLst>
+              <a:ext uri="{FF2B5EF4-FFF2-40B4-BE49-F238E27FC236}">
+                <a16:creationId xmlns:a16="http://schemas.microsoft.com/office/drawing/2014/main" id="{E837F073-C655-449A-B0B4-2314A89A4303}"/>
+              </a:ext>
+            </a:extLst>
+          </p:cNvPr>
+          <p:cNvCxnSpPr>
+            <a:stCxn id="34" idx="2"/>
+          </p:cNvCxnSpPr>
+          <p:nvPr/>
+        </p:nvCxnSpPr>
+        <p:spPr>
+          <a:xfrm flipH="1">
+            <a:off x="4571998" y="5099777"/>
+            <a:ext cx="1" cy="405874"/>
+          </a:xfrm>
+          <a:prstGeom prst="straightConnector1">
+            <a:avLst/>
+          </a:prstGeom>
+          <a:ln>
+            <a:tailEnd type="triangle"/>
+          </a:ln>
+        </p:spPr>
+        <p:style>
+          <a:lnRef idx="2">
+            <a:schemeClr val="accent2"/>
+          </a:lnRef>
+          <a:fillRef idx="0">
+            <a:schemeClr val="accent2"/>
+          </a:fillRef>
+          <a:effectRef idx="1">
+            <a:schemeClr val="accent2"/>
+          </a:effectRef>
+          <a:fontRef idx="minor">
+            <a:schemeClr val="tx1"/>
+          </a:fontRef>
+        </p:style>
+      </p:cxnSp>
+      <p:sp>
+        <p:nvSpPr>
+          <p:cNvPr id="283" name="Rectangle 282">
+            <a:extLst>
+              <a:ext uri="{FF2B5EF4-FFF2-40B4-BE49-F238E27FC236}">
+                <a16:creationId xmlns:a16="http://schemas.microsoft.com/office/drawing/2014/main" id="{EFD38C7C-31ED-465A-A0D8-94E86225EA0E}"/>
+              </a:ext>
+            </a:extLst>
+          </p:cNvPr>
+          <p:cNvSpPr/>
+          <p:nvPr/>
+        </p:nvSpPr>
+        <p:spPr>
+          <a:xfrm>
+            <a:off x="2314876" y="5515277"/>
+            <a:ext cx="4514243" cy="582599"/>
+          </a:xfrm>
+          <a:prstGeom prst="rect">
+            <a:avLst/>
+          </a:prstGeom>
+        </p:spPr>
+        <p:style>
+          <a:lnRef idx="2">
+            <a:schemeClr val="accent2">
+              <a:shade val="50000"/>
+            </a:schemeClr>
+          </a:lnRef>
+          <a:fillRef idx="1">
+            <a:schemeClr val="accent2"/>
+          </a:fillRef>
+          <a:effectRef idx="0">
+            <a:schemeClr val="accent2"/>
+          </a:effectRef>
+          <a:fontRef idx="minor">
+            <a:schemeClr val="lt1"/>
+          </a:fontRef>
+        </p:style>
+        <p:txBody>
+          <a:bodyPr rtlCol="0" anchor="ctr"/>
+          <a:lstStyle/>
+          <a:p>
+            <a:pPr algn="ctr"/>
+            <a:r>
+              <a:rPr lang="en-US" dirty="0"/>
+              <a:t>Feature Vector for input to Skip-gram model</a:t>
+            </a:r>
+          </a:p>
+        </p:txBody>
+      </p:sp>
     </p:spTree>
     <p:extLst>
       <p:ext uri="{BB962C8B-B14F-4D97-AF65-F5344CB8AC3E}">

</xml_diff>

<commit_message>
more changes to ppt
</commit_message>
<xml_diff>
--- a/Presentation_Subword.pptx
+++ b/Presentation_Subword.pptx
@@ -649,6 +649,32 @@
           <a:p>
             <a:endParaRPr lang="en-CO" dirty="0"/>
           </a:p>
+          <a:p>
+            <a:pPr marL="0" marR="0" lvl="0" indent="0" algn="l" defTabSz="914400" rtl="0" eaLnBrk="1" fontAlgn="auto" latinLnBrk="0" hangingPunct="1">
+              <a:lnSpc>
+                <a:spcPct val="100000"/>
+              </a:lnSpc>
+              <a:spcBef>
+                <a:spcPts val="0"/>
+              </a:spcBef>
+              <a:spcAft>
+                <a:spcPts val="0"/>
+              </a:spcAft>
+              <a:buClrTx/>
+              <a:buSzTx/>
+              <a:buFontTx/>
+              <a:buNone/>
+              <a:tabLst/>
+              <a:defRPr/>
+            </a:pPr>
+            <a:r>
+              <a:rPr lang="en-US" dirty="0"/>
+              <a:t>Most of popular  techniques represent each word of the vocabulary by a distinct vector, without parameter sharing. In particular, they ignore the internal structure of words, which is an important limitation for morphologically rich languages, such as Turkish or Finnish. </a:t>
+            </a:r>
+          </a:p>
+          <a:p>
+            <a:endParaRPr lang="en-CO" dirty="0"/>
+          </a:p>
         </p:txBody>
       </p:sp>
       <p:sp>
@@ -741,28 +767,25 @@
           <a:bodyPr/>
           <a:lstStyle/>
           <a:p>
-            <a:endParaRPr lang="en-US" dirty="0"/>
-          </a:p>
-          <a:p>
-            <a:r>
-              <a:rPr lang="en-US" dirty="0"/>
-              <a:t>[Potentially download and run some simple </a:t>
-            </a:r>
-            <a:r>
-              <a:rPr lang="en-US" dirty="0" err="1"/>
-              <a:t>fasttext</a:t>
-            </a:r>
-            <a:r>
-              <a:rPr lang="en-US" dirty="0"/>
-              <a:t> code and show the results]</a:t>
-            </a:r>
-          </a:p>
-          <a:p>
-            <a:endParaRPr lang="en-US" dirty="0"/>
-          </a:p>
-          <a:p>
-            <a:r>
-              <a:rPr lang="en-US" sz="1200" b="0" i="0" kern="1200" dirty="0">
+            <a:pPr marL="0" marR="0" lvl="0" indent="0" algn="l" defTabSz="914400" rtl="0" eaLnBrk="1" fontAlgn="auto" latinLnBrk="0" hangingPunct="1">
+              <a:lnSpc>
+                <a:spcPct val="100000"/>
+              </a:lnSpc>
+              <a:spcBef>
+                <a:spcPts val="0"/>
+              </a:spcBef>
+              <a:spcAft>
+                <a:spcPts val="0"/>
+              </a:spcAft>
+              <a:buClrTx/>
+              <a:buSzTx/>
+              <a:buFontTx/>
+              <a:buNone/>
+              <a:tabLst/>
+              <a:defRPr/>
+            </a:pPr>
+            <a:r>
+              <a:rPr lang="en-US" sz="1200" kern="1200" dirty="0">
                 <a:solidFill>
                   <a:schemeClr val="tx1"/>
                 </a:solidFill>
@@ -771,156 +794,9 @@
                 <a:ea typeface="+mn-ea"/>
                 <a:cs typeface="+mn-cs"/>
               </a:rPr>
-              <a:t>The </a:t>
-            </a:r>
-            <a:r>
-              <a:rPr lang="en-US" dirty="0" err="1"/>
-              <a:t>window_size</a:t>
-            </a:r>
-            <a:r>
-              <a:rPr lang="en-US" sz="1200" b="0" i="0" kern="1200" dirty="0">
-                <a:solidFill>
-                  <a:schemeClr val="tx1"/>
-                </a:solidFill>
-                <a:effectLst/>
-                <a:latin typeface="+mn-lt"/>
-                <a:ea typeface="+mn-ea"/>
-                <a:cs typeface="+mn-cs"/>
-              </a:rPr>
-              <a:t> is the size of the number of words occurring before and after the word based on which the word representations will be learned for the word. </a:t>
-            </a:r>
-          </a:p>
-          <a:p>
-            <a:endParaRPr lang="en-US" sz="1200" b="0" i="0" kern="1200" dirty="0">
-              <a:solidFill>
-                <a:schemeClr val="tx1"/>
-              </a:solidFill>
-              <a:effectLst/>
-              <a:latin typeface="+mn-lt"/>
-              <a:ea typeface="+mn-ea"/>
-              <a:cs typeface="+mn-cs"/>
-            </a:endParaRPr>
-          </a:p>
-          <a:p>
-            <a:r>
-              <a:rPr lang="en-US" sz="1200" b="0" i="0" kern="1200" dirty="0">
-                <a:solidFill>
-                  <a:schemeClr val="tx1"/>
-                </a:solidFill>
-                <a:effectLst/>
-                <a:latin typeface="+mn-lt"/>
-                <a:ea typeface="+mn-ea"/>
-                <a:cs typeface="+mn-cs"/>
-              </a:rPr>
-              <a:t>The next hyper-parameter is the </a:t>
-            </a:r>
-            <a:r>
-              <a:rPr lang="en-US" dirty="0" err="1"/>
-              <a:t>min_word</a:t>
-            </a:r>
-            <a:r>
-              <a:rPr lang="en-US" sz="1200" b="0" i="0" kern="1200" dirty="0">
-                <a:solidFill>
-                  <a:schemeClr val="tx1"/>
-                </a:solidFill>
-                <a:effectLst/>
-                <a:latin typeface="+mn-lt"/>
-                <a:ea typeface="+mn-ea"/>
-                <a:cs typeface="+mn-cs"/>
-              </a:rPr>
-              <a:t>, which specifies the minimum frequency of a word in the corpus for which the word representations will be generated. Finally, the most frequently occurring word will be down-sampled by a number specified by the </a:t>
-            </a:r>
-            <a:r>
-              <a:rPr lang="en-US" dirty="0" err="1"/>
-              <a:t>down_sampling</a:t>
-            </a:r>
-            <a:r>
-              <a:rPr lang="en-US" sz="1200" b="0" i="0" kern="1200" dirty="0">
-                <a:solidFill>
-                  <a:schemeClr val="tx1"/>
-                </a:solidFill>
-                <a:effectLst/>
-                <a:latin typeface="+mn-lt"/>
-                <a:ea typeface="+mn-ea"/>
-                <a:cs typeface="+mn-cs"/>
-              </a:rPr>
-              <a:t> attribute.</a:t>
-            </a:r>
-          </a:p>
-          <a:p>
-            <a:endParaRPr lang="en-US" sz="1200" b="0" i="0" kern="1200" dirty="0">
-              <a:solidFill>
-                <a:schemeClr val="tx1"/>
-              </a:solidFill>
-              <a:effectLst/>
-              <a:latin typeface="+mn-lt"/>
-              <a:ea typeface="+mn-ea"/>
-              <a:cs typeface="+mn-cs"/>
-            </a:endParaRPr>
-          </a:p>
-          <a:p>
-            <a:r>
-              <a:rPr lang="en-US" dirty="0"/>
-              <a:t>Preprocessing:</a:t>
-            </a:r>
-          </a:p>
-          <a:p>
-            <a:pPr marL="285750" indent="-285750">
-              <a:buFontTx/>
-              <a:buChar char="-"/>
-            </a:pPr>
-            <a:r>
-              <a:rPr lang="en-US" dirty="0"/>
-              <a:t>All to lower case</a:t>
-            </a:r>
-          </a:p>
-          <a:p>
-            <a:pPr marL="285750" indent="-285750">
-              <a:buFontTx/>
-              <a:buChar char="-"/>
-            </a:pPr>
-            <a:r>
-              <a:rPr lang="en-US" dirty="0"/>
-              <a:t>All to root form</a:t>
-            </a:r>
-          </a:p>
-          <a:p>
-            <a:pPr marL="285750" indent="-285750">
-              <a:buFontTx/>
-              <a:buChar char="-"/>
-            </a:pPr>
-            <a:r>
-              <a:rPr lang="en-US" dirty="0"/>
-              <a:t>Remove stop words</a:t>
-            </a:r>
-          </a:p>
-          <a:p>
+              <a:t>Figure 2: Illustration of the similarity between character n-grams in out-of-vocabulary words. For each pair, only one word is OOV, and is shown on the x axis. Red indicates positive cosine, while blue negative. </a:t>
+            </a:r>
             <a:endParaRPr lang="en-US" dirty="0"/>
-          </a:p>
-          <a:p>
-            <a:endParaRPr lang="en-US" dirty="0"/>
-          </a:p>
-          <a:p>
-            <a:r>
-              <a:rPr lang="en-US" dirty="0" err="1"/>
-              <a:t>Embedding_size</a:t>
-            </a:r>
-            <a:r>
-              <a:rPr lang="en-US" dirty="0"/>
-              <a:t> is the size of the embedding vector.</a:t>
-            </a:r>
-          </a:p>
-          <a:p>
-            <a:endParaRPr lang="en-US" dirty="0"/>
-          </a:p>
-          <a:p>
-            <a:r>
-              <a:rPr lang="en-US" dirty="0"/>
-              <a:t>In other words, each word in our corpus will be represented as a 60-dimensional vector.</a:t>
-            </a:r>
-          </a:p>
-          <a:p>
-            <a:endParaRPr lang="en-CO" dirty="0"/>
           </a:p>
           <a:p>
             <a:endParaRPr lang="en-CO" dirty="0"/>
@@ -947,7 +823,7 @@
               <a:rPr lang="en-GB" sz="1400" b="0" strike="noStrike" spc="-1" smtClean="0">
                 <a:latin typeface="Times New Roman"/>
               </a:rPr>
-              <a:t>17</a:t>
+              <a:t>14</a:t>
             </a:fld>
             <a:endParaRPr lang="en-GB" sz="1400" b="0" strike="noStrike" spc="-1">
               <a:latin typeface="Times New Roman"/>
@@ -958,7 +834,7 @@
     </p:spTree>
     <p:extLst>
       <p:ext uri="{BB962C8B-B14F-4D97-AF65-F5344CB8AC3E}">
-        <p14:creationId xmlns:p14="http://schemas.microsoft.com/office/powerpoint/2010/main" val="2738393251"/>
+        <p14:creationId xmlns:p14="http://schemas.microsoft.com/office/powerpoint/2010/main" val="1945990812"/>
       </p:ext>
     </p:extLst>
   </p:cSld>
@@ -1017,6 +893,660 @@
           <a:bodyPr/>
           <a:lstStyle/>
           <a:p>
+            <a:r>
+              <a:rPr lang="en-US" dirty="0">
+                <a:solidFill>
+                  <a:srgbClr val="000000"/>
+                </a:solidFill>
+                <a:latin typeface="Arial" panose="020B0604020202020204" pitchFamily="34" charset="0"/>
+              </a:rPr>
+              <a:t>[Introduce </a:t>
+            </a:r>
+            <a:r>
+              <a:rPr lang="en-US" dirty="0" err="1">
+                <a:solidFill>
+                  <a:srgbClr val="000000"/>
+                </a:solidFill>
+                <a:latin typeface="Arial" panose="020B0604020202020204" pitchFamily="34" charset="0"/>
+              </a:rPr>
+              <a:t>FastText</a:t>
+            </a:r>
+            <a:r>
+              <a:rPr lang="en-US" dirty="0">
+                <a:solidFill>
+                  <a:srgbClr val="000000"/>
+                </a:solidFill>
+                <a:latin typeface="Arial" panose="020B0604020202020204" pitchFamily="34" charset="0"/>
+              </a:rPr>
+              <a:t> (and other papers which fed into this, see </a:t>
+            </a:r>
+            <a:r>
+              <a:rPr lang="en-US" dirty="0" err="1">
+                <a:solidFill>
+                  <a:srgbClr val="000000"/>
+                </a:solidFill>
+                <a:latin typeface="Arial" panose="020B0604020202020204" pitchFamily="34" charset="0"/>
+              </a:rPr>
+              <a:t>github</a:t>
+            </a:r>
+            <a:r>
+              <a:rPr lang="en-US" dirty="0">
+                <a:solidFill>
+                  <a:srgbClr val="000000"/>
+                </a:solidFill>
+                <a:latin typeface="Arial" panose="020B0604020202020204" pitchFamily="34" charset="0"/>
+              </a:rPr>
+              <a:t>)]</a:t>
+            </a:r>
+          </a:p>
+          <a:p>
+            <a:r>
+              <a:rPr lang="en-US" dirty="0">
+                <a:solidFill>
+                  <a:srgbClr val="000000"/>
+                </a:solidFill>
+                <a:latin typeface="Arial" panose="020B0604020202020204" pitchFamily="34" charset="0"/>
+              </a:rPr>
+              <a:t>	</a:t>
+            </a:r>
+            <a:r>
+              <a:rPr lang="en-US" dirty="0">
+                <a:hlinkClick r:id="rId3"/>
+              </a:rPr>
+              <a:t>https://pypi.org/project/fasttext/</a:t>
+            </a:r>
+            <a:endParaRPr lang="en-US" dirty="0"/>
+          </a:p>
+          <a:p>
+            <a:r>
+              <a:rPr lang="en-US" dirty="0"/>
+              <a:t>	[Add discussion of text classification task here]</a:t>
+            </a:r>
+            <a:endParaRPr lang="en-CO" dirty="0"/>
+          </a:p>
+          <a:p>
+            <a:endParaRPr lang="en-US" dirty="0">
+              <a:solidFill>
+                <a:srgbClr val="000000"/>
+              </a:solidFill>
+              <a:latin typeface="Arial" panose="020B0604020202020204" pitchFamily="34" charset="0"/>
+            </a:endParaRPr>
+          </a:p>
+          <a:p>
+            <a:r>
+              <a:rPr lang="en-US" dirty="0"/>
+              <a:t>[ELMO]</a:t>
+            </a:r>
+          </a:p>
+          <a:p>
+            <a:endParaRPr lang="en-US" dirty="0"/>
+          </a:p>
+          <a:p>
+            <a:r>
+              <a:rPr lang="en-US" dirty="0"/>
+              <a:t>[BERT]</a:t>
+            </a:r>
+          </a:p>
+          <a:p>
+            <a:endParaRPr lang="en-CO" dirty="0"/>
+          </a:p>
+        </p:txBody>
+      </p:sp>
+      <p:sp>
+        <p:nvSpPr>
+          <p:cNvPr id="4" name="Slide Number Placeholder 3"/>
+          <p:cNvSpPr>
+            <a:spLocks noGrp="1"/>
+          </p:cNvSpPr>
+          <p:nvPr>
+            <p:ph type="sldNum"/>
+          </p:nvPr>
+        </p:nvSpPr>
+        <p:spPr/>
+        <p:txBody>
+          <a:bodyPr/>
+          <a:lstStyle/>
+          <a:p>
+            <a:pPr algn="r"/>
+            <a:fld id="{D10B2105-225F-4FE3-849A-7975E719A850}" type="slidenum">
+              <a:rPr lang="en-GB" sz="1400" b="0" strike="noStrike" spc="-1" smtClean="0">
+                <a:latin typeface="Times New Roman"/>
+              </a:rPr>
+              <a:t>15</a:t>
+            </a:fld>
+            <a:endParaRPr lang="en-GB" sz="1400" b="0" strike="noStrike" spc="-1">
+              <a:latin typeface="Times New Roman"/>
+            </a:endParaRPr>
+          </a:p>
+        </p:txBody>
+      </p:sp>
+    </p:spTree>
+    <p:extLst>
+      <p:ext uri="{BB962C8B-B14F-4D97-AF65-F5344CB8AC3E}">
+        <p14:creationId xmlns:p14="http://schemas.microsoft.com/office/powerpoint/2010/main" val="2769906750"/>
+      </p:ext>
+    </p:extLst>
+  </p:cSld>
+  <p:clrMapOvr>
+    <a:masterClrMapping/>
+  </p:clrMapOvr>
+</p:notes>
+</file>
+
+<file path=ppt/notesSlides/notesSlide12.xml><?xml version="1.0" encoding="utf-8"?>
+<p:notes xmlns:a="http://schemas.openxmlformats.org/drawingml/2006/main" xmlns:r="http://schemas.openxmlformats.org/officeDocument/2006/relationships" xmlns:p="http://schemas.openxmlformats.org/presentationml/2006/main">
+  <p:cSld>
+    <p:spTree>
+      <p:nvGrpSpPr>
+        <p:cNvPr id="1" name=""/>
+        <p:cNvGrpSpPr/>
+        <p:nvPr/>
+      </p:nvGrpSpPr>
+      <p:grpSpPr>
+        <a:xfrm>
+          <a:off x="0" y="0"/>
+          <a:ext cx="0" cy="0"/>
+          <a:chOff x="0" y="0"/>
+          <a:chExt cx="0" cy="0"/>
+        </a:xfrm>
+      </p:grpSpPr>
+      <p:sp>
+        <p:nvSpPr>
+          <p:cNvPr id="2" name="Slide Image Placeholder 1"/>
+          <p:cNvSpPr>
+            <a:spLocks noGrp="1" noRot="1" noChangeAspect="1"/>
+          </p:cNvSpPr>
+          <p:nvPr>
+            <p:ph type="sldImg"/>
+          </p:nvPr>
+        </p:nvSpPr>
+        <p:spPr>
+          <a:xfrm>
+            <a:off x="1370013" y="763588"/>
+            <a:ext cx="5030787" cy="3771900"/>
+          </a:xfrm>
+        </p:spPr>
+      </p:sp>
+      <p:sp>
+        <p:nvSpPr>
+          <p:cNvPr id="3" name="Notes Placeholder 2"/>
+          <p:cNvSpPr>
+            <a:spLocks noGrp="1"/>
+          </p:cNvSpPr>
+          <p:nvPr>
+            <p:ph type="body" idx="1"/>
+          </p:nvPr>
+        </p:nvSpPr>
+        <p:spPr/>
+        <p:txBody>
+          <a:bodyPr/>
+          <a:lstStyle/>
+          <a:p>
+            <a:endParaRPr lang="en-US" dirty="0"/>
+          </a:p>
+          <a:p>
+            <a:r>
+              <a:rPr lang="en-US" dirty="0"/>
+              <a:t>[Potentially download and run some simple </a:t>
+            </a:r>
+            <a:r>
+              <a:rPr lang="en-US" dirty="0" err="1"/>
+              <a:t>fasttext</a:t>
+            </a:r>
+            <a:r>
+              <a:rPr lang="en-US" dirty="0"/>
+              <a:t> code and show the results]</a:t>
+            </a:r>
+          </a:p>
+          <a:p>
+            <a:endParaRPr lang="en-US" dirty="0"/>
+          </a:p>
+          <a:p>
+            <a:r>
+              <a:rPr lang="en-US" dirty="0"/>
+              <a:t>G</a:t>
+            </a:r>
+            <a:r>
+              <a:rPr lang="en-CO" dirty="0"/>
+              <a:t>ensim.models.fastext </a:t>
+            </a:r>
+          </a:p>
+          <a:p>
+            <a:r>
+              <a:rPr lang="en-US" dirty="0"/>
+              <a:t>N</a:t>
+            </a:r>
+            <a:r>
+              <a:rPr lang="en-CO" dirty="0"/>
+              <a:t>ltk </a:t>
+            </a:r>
+            <a:r>
+              <a:rPr lang="en-CO" dirty="0">
+                <a:sym typeface="Wingdings" pitchFamily="2" charset="2"/>
+              </a:rPr>
+              <a:t> natural language toolkit</a:t>
+            </a:r>
+          </a:p>
+          <a:p>
+            <a:r>
+              <a:rPr lang="en-US" dirty="0"/>
+              <a:t>W</a:t>
+            </a:r>
+            <a:r>
+              <a:rPr lang="en-CO" dirty="0"/>
+              <a:t>ikipedia</a:t>
+            </a:r>
+          </a:p>
+          <a:p>
+            <a:endParaRPr lang="en-US" dirty="0"/>
+          </a:p>
+          <a:p>
+            <a:endParaRPr lang="en-US" dirty="0"/>
+          </a:p>
+          <a:p>
+            <a:pPr marL="285750" indent="-285750">
+              <a:lnSpc>
+                <a:spcPct val="90000"/>
+              </a:lnSpc>
+              <a:spcBef>
+                <a:spcPts val="1000"/>
+              </a:spcBef>
+              <a:buFont typeface="Arial" panose="020B0604020202020204" pitchFamily="34" charset="0"/>
+              <a:buChar char="•"/>
+            </a:pPr>
+            <a:r>
+              <a:rPr lang="en-US" dirty="0"/>
+              <a:t>Text Classification (hate speech detection, etc.)</a:t>
+            </a:r>
+          </a:p>
+          <a:p>
+            <a:pPr marL="0" lvl="1">
+              <a:lnSpc>
+                <a:spcPct val="90000"/>
+              </a:lnSpc>
+              <a:spcBef>
+                <a:spcPts val="1000"/>
+              </a:spcBef>
+            </a:pPr>
+            <a:r>
+              <a:rPr lang="en-US" dirty="0"/>
+              <a:t>	Assigning a set of predefined categories to free-text. Text classifiers can 	be used to organize, structure, and categorize</a:t>
+            </a:r>
+          </a:p>
+          <a:p>
+            <a:endParaRPr lang="en-CO" dirty="0"/>
+          </a:p>
+          <a:p>
+            <a:endParaRPr lang="en-CO" dirty="0"/>
+          </a:p>
+        </p:txBody>
+      </p:sp>
+      <p:sp>
+        <p:nvSpPr>
+          <p:cNvPr id="4" name="Slide Number Placeholder 3"/>
+          <p:cNvSpPr>
+            <a:spLocks noGrp="1"/>
+          </p:cNvSpPr>
+          <p:nvPr>
+            <p:ph type="sldNum"/>
+          </p:nvPr>
+        </p:nvSpPr>
+        <p:spPr/>
+        <p:txBody>
+          <a:bodyPr/>
+          <a:lstStyle/>
+          <a:p>
+            <a:pPr algn="r"/>
+            <a:fld id="{D10B2105-225F-4FE3-849A-7975E719A850}" type="slidenum">
+              <a:rPr lang="en-GB" sz="1400" b="0" strike="noStrike" spc="-1" smtClean="0">
+                <a:latin typeface="Times New Roman"/>
+              </a:rPr>
+              <a:t>16</a:t>
+            </a:fld>
+            <a:endParaRPr lang="en-GB" sz="1400" b="0" strike="noStrike" spc="-1">
+              <a:latin typeface="Times New Roman"/>
+            </a:endParaRPr>
+          </a:p>
+        </p:txBody>
+      </p:sp>
+    </p:spTree>
+    <p:extLst>
+      <p:ext uri="{BB962C8B-B14F-4D97-AF65-F5344CB8AC3E}">
+        <p14:creationId xmlns:p14="http://schemas.microsoft.com/office/powerpoint/2010/main" val="970338645"/>
+      </p:ext>
+    </p:extLst>
+  </p:cSld>
+  <p:clrMapOvr>
+    <a:masterClrMapping/>
+  </p:clrMapOvr>
+</p:notes>
+</file>
+
+<file path=ppt/notesSlides/notesSlide13.xml><?xml version="1.0" encoding="utf-8"?>
+<p:notes xmlns:a="http://schemas.openxmlformats.org/drawingml/2006/main" xmlns:r="http://schemas.openxmlformats.org/officeDocument/2006/relationships" xmlns:p="http://schemas.openxmlformats.org/presentationml/2006/main">
+  <p:cSld>
+    <p:spTree>
+      <p:nvGrpSpPr>
+        <p:cNvPr id="1" name=""/>
+        <p:cNvGrpSpPr/>
+        <p:nvPr/>
+      </p:nvGrpSpPr>
+      <p:grpSpPr>
+        <a:xfrm>
+          <a:off x="0" y="0"/>
+          <a:ext cx="0" cy="0"/>
+          <a:chOff x="0" y="0"/>
+          <a:chExt cx="0" cy="0"/>
+        </a:xfrm>
+      </p:grpSpPr>
+      <p:sp>
+        <p:nvSpPr>
+          <p:cNvPr id="2" name="Slide Image Placeholder 1"/>
+          <p:cNvSpPr>
+            <a:spLocks noGrp="1" noRot="1" noChangeAspect="1"/>
+          </p:cNvSpPr>
+          <p:nvPr>
+            <p:ph type="sldImg"/>
+          </p:nvPr>
+        </p:nvSpPr>
+        <p:spPr>
+          <a:xfrm>
+            <a:off x="1370013" y="763588"/>
+            <a:ext cx="5030787" cy="3771900"/>
+          </a:xfrm>
+        </p:spPr>
+      </p:sp>
+      <p:sp>
+        <p:nvSpPr>
+          <p:cNvPr id="3" name="Notes Placeholder 2"/>
+          <p:cNvSpPr>
+            <a:spLocks noGrp="1"/>
+          </p:cNvSpPr>
+          <p:nvPr>
+            <p:ph type="body" idx="1"/>
+          </p:nvPr>
+        </p:nvSpPr>
+        <p:spPr/>
+        <p:txBody>
+          <a:bodyPr/>
+          <a:lstStyle/>
+          <a:p>
+            <a:endParaRPr lang="en-US" dirty="0"/>
+          </a:p>
+          <a:p>
+            <a:r>
+              <a:rPr lang="en-US" dirty="0"/>
+              <a:t>[Potentially download and run some simple </a:t>
+            </a:r>
+            <a:r>
+              <a:rPr lang="en-US" dirty="0" err="1"/>
+              <a:t>fasttext</a:t>
+            </a:r>
+            <a:r>
+              <a:rPr lang="en-US" dirty="0"/>
+              <a:t> code and show the results]</a:t>
+            </a:r>
+          </a:p>
+          <a:p>
+            <a:endParaRPr lang="en-US" dirty="0"/>
+          </a:p>
+          <a:p>
+            <a:r>
+              <a:rPr lang="en-US" sz="1200" b="0" i="0" kern="1200" dirty="0">
+                <a:solidFill>
+                  <a:schemeClr val="tx1"/>
+                </a:solidFill>
+                <a:effectLst/>
+                <a:latin typeface="+mn-lt"/>
+                <a:ea typeface="+mn-ea"/>
+                <a:cs typeface="+mn-cs"/>
+              </a:rPr>
+              <a:t>The </a:t>
+            </a:r>
+            <a:r>
+              <a:rPr lang="en-US" dirty="0" err="1"/>
+              <a:t>window_size</a:t>
+            </a:r>
+            <a:r>
+              <a:rPr lang="en-US" sz="1200" b="0" i="0" kern="1200" dirty="0">
+                <a:solidFill>
+                  <a:schemeClr val="tx1"/>
+                </a:solidFill>
+                <a:effectLst/>
+                <a:latin typeface="+mn-lt"/>
+                <a:ea typeface="+mn-ea"/>
+                <a:cs typeface="+mn-cs"/>
+              </a:rPr>
+              <a:t> is the size of the number of words occurring before and after the word based on which the word representations will be learned for the word. </a:t>
+            </a:r>
+          </a:p>
+          <a:p>
+            <a:endParaRPr lang="en-US" sz="1200" b="0" i="0" kern="1200" dirty="0">
+              <a:solidFill>
+                <a:schemeClr val="tx1"/>
+              </a:solidFill>
+              <a:effectLst/>
+              <a:latin typeface="+mn-lt"/>
+              <a:ea typeface="+mn-ea"/>
+              <a:cs typeface="+mn-cs"/>
+            </a:endParaRPr>
+          </a:p>
+          <a:p>
+            <a:r>
+              <a:rPr lang="en-US" sz="1200" b="0" i="0" kern="1200" dirty="0">
+                <a:solidFill>
+                  <a:schemeClr val="tx1"/>
+                </a:solidFill>
+                <a:effectLst/>
+                <a:latin typeface="+mn-lt"/>
+                <a:ea typeface="+mn-ea"/>
+                <a:cs typeface="+mn-cs"/>
+              </a:rPr>
+              <a:t>The next hyper-parameter is the </a:t>
+            </a:r>
+            <a:r>
+              <a:rPr lang="en-US" dirty="0" err="1"/>
+              <a:t>min_word</a:t>
+            </a:r>
+            <a:r>
+              <a:rPr lang="en-US" sz="1200" b="0" i="0" kern="1200" dirty="0">
+                <a:solidFill>
+                  <a:schemeClr val="tx1"/>
+                </a:solidFill>
+                <a:effectLst/>
+                <a:latin typeface="+mn-lt"/>
+                <a:ea typeface="+mn-ea"/>
+                <a:cs typeface="+mn-cs"/>
+              </a:rPr>
+              <a:t>, which specifies the minimum frequency of a word in the corpus for which the word representations will be generated. Finally, the most frequently occurring word will be down-sampled by a number specified by the </a:t>
+            </a:r>
+            <a:r>
+              <a:rPr lang="en-US" dirty="0" err="1"/>
+              <a:t>down_sampling</a:t>
+            </a:r>
+            <a:r>
+              <a:rPr lang="en-US" sz="1200" b="0" i="0" kern="1200" dirty="0">
+                <a:solidFill>
+                  <a:schemeClr val="tx1"/>
+                </a:solidFill>
+                <a:effectLst/>
+                <a:latin typeface="+mn-lt"/>
+                <a:ea typeface="+mn-ea"/>
+                <a:cs typeface="+mn-cs"/>
+              </a:rPr>
+              <a:t> attribute.</a:t>
+            </a:r>
+          </a:p>
+          <a:p>
+            <a:endParaRPr lang="en-US" sz="1200" b="0" i="0" kern="1200" dirty="0">
+              <a:solidFill>
+                <a:schemeClr val="tx1"/>
+              </a:solidFill>
+              <a:effectLst/>
+              <a:latin typeface="+mn-lt"/>
+              <a:ea typeface="+mn-ea"/>
+              <a:cs typeface="+mn-cs"/>
+            </a:endParaRPr>
+          </a:p>
+          <a:p>
+            <a:r>
+              <a:rPr lang="en-US" dirty="0"/>
+              <a:t>Preprocessing:</a:t>
+            </a:r>
+          </a:p>
+          <a:p>
+            <a:pPr marL="285750" indent="-285750">
+              <a:buFontTx/>
+              <a:buChar char="-"/>
+            </a:pPr>
+            <a:r>
+              <a:rPr lang="en-US" dirty="0"/>
+              <a:t>All to lower case</a:t>
+            </a:r>
+          </a:p>
+          <a:p>
+            <a:pPr marL="285750" indent="-285750">
+              <a:buFontTx/>
+              <a:buChar char="-"/>
+            </a:pPr>
+            <a:r>
+              <a:rPr lang="en-US" dirty="0"/>
+              <a:t>All to root form</a:t>
+            </a:r>
+          </a:p>
+          <a:p>
+            <a:pPr marL="285750" indent="-285750">
+              <a:buFontTx/>
+              <a:buChar char="-"/>
+            </a:pPr>
+            <a:r>
+              <a:rPr lang="en-US" dirty="0"/>
+              <a:t>Remove stop words</a:t>
+            </a:r>
+          </a:p>
+          <a:p>
+            <a:endParaRPr lang="en-US" dirty="0"/>
+          </a:p>
+          <a:p>
+            <a:endParaRPr lang="en-US" dirty="0"/>
+          </a:p>
+          <a:p>
+            <a:r>
+              <a:rPr lang="en-US" dirty="0" err="1"/>
+              <a:t>Embedding_size</a:t>
+            </a:r>
+            <a:r>
+              <a:rPr lang="en-US" dirty="0"/>
+              <a:t> is the size of the embedding vector.</a:t>
+            </a:r>
+          </a:p>
+          <a:p>
+            <a:endParaRPr lang="en-US" dirty="0"/>
+          </a:p>
+          <a:p>
+            <a:r>
+              <a:rPr lang="en-US" dirty="0"/>
+              <a:t>In other words, each word in our corpus will be represented as a 60-dimensional vector.</a:t>
+            </a:r>
+          </a:p>
+          <a:p>
+            <a:endParaRPr lang="en-CO" dirty="0"/>
+          </a:p>
+          <a:p>
+            <a:endParaRPr lang="en-CO" dirty="0"/>
+          </a:p>
+        </p:txBody>
+      </p:sp>
+      <p:sp>
+        <p:nvSpPr>
+          <p:cNvPr id="4" name="Slide Number Placeholder 3"/>
+          <p:cNvSpPr>
+            <a:spLocks noGrp="1"/>
+          </p:cNvSpPr>
+          <p:nvPr>
+            <p:ph type="sldNum"/>
+          </p:nvPr>
+        </p:nvSpPr>
+        <p:spPr/>
+        <p:txBody>
+          <a:bodyPr/>
+          <a:lstStyle/>
+          <a:p>
+            <a:pPr algn="r"/>
+            <a:fld id="{D10B2105-225F-4FE3-849A-7975E719A850}" type="slidenum">
+              <a:rPr lang="en-GB" sz="1400" b="0" strike="noStrike" spc="-1" smtClean="0">
+                <a:latin typeface="Times New Roman"/>
+              </a:rPr>
+              <a:t>17</a:t>
+            </a:fld>
+            <a:endParaRPr lang="en-GB" sz="1400" b="0" strike="noStrike" spc="-1">
+              <a:latin typeface="Times New Roman"/>
+            </a:endParaRPr>
+          </a:p>
+        </p:txBody>
+      </p:sp>
+    </p:spTree>
+    <p:extLst>
+      <p:ext uri="{BB962C8B-B14F-4D97-AF65-F5344CB8AC3E}">
+        <p14:creationId xmlns:p14="http://schemas.microsoft.com/office/powerpoint/2010/main" val="2738393251"/>
+      </p:ext>
+    </p:extLst>
+  </p:cSld>
+  <p:clrMapOvr>
+    <a:masterClrMapping/>
+  </p:clrMapOvr>
+</p:notes>
+</file>
+
+<file path=ppt/notesSlides/notesSlide14.xml><?xml version="1.0" encoding="utf-8"?>
+<p:notes xmlns:a="http://schemas.openxmlformats.org/drawingml/2006/main" xmlns:r="http://schemas.openxmlformats.org/officeDocument/2006/relationships" xmlns:p="http://schemas.openxmlformats.org/presentationml/2006/main">
+  <p:cSld>
+    <p:spTree>
+      <p:nvGrpSpPr>
+        <p:cNvPr id="1" name=""/>
+        <p:cNvGrpSpPr/>
+        <p:nvPr/>
+      </p:nvGrpSpPr>
+      <p:grpSpPr>
+        <a:xfrm>
+          <a:off x="0" y="0"/>
+          <a:ext cx="0" cy="0"/>
+          <a:chOff x="0" y="0"/>
+          <a:chExt cx="0" cy="0"/>
+        </a:xfrm>
+      </p:grpSpPr>
+      <p:sp>
+        <p:nvSpPr>
+          <p:cNvPr id="2" name="Slide Image Placeholder 1"/>
+          <p:cNvSpPr>
+            <a:spLocks noGrp="1" noRot="1" noChangeAspect="1"/>
+          </p:cNvSpPr>
+          <p:nvPr>
+            <p:ph type="sldImg"/>
+          </p:nvPr>
+        </p:nvSpPr>
+        <p:spPr>
+          <a:xfrm>
+            <a:off x="1370013" y="763588"/>
+            <a:ext cx="5030787" cy="3771900"/>
+          </a:xfrm>
+        </p:spPr>
+      </p:sp>
+      <p:sp>
+        <p:nvSpPr>
+          <p:cNvPr id="3" name="Notes Placeholder 2"/>
+          <p:cNvSpPr>
+            <a:spLocks noGrp="1"/>
+          </p:cNvSpPr>
+          <p:nvPr>
+            <p:ph type="body" idx="1"/>
+          </p:nvPr>
+        </p:nvSpPr>
+        <p:spPr/>
+        <p:txBody>
+          <a:bodyPr/>
+          <a:lstStyle/>
+          <a:p>
             <a:endParaRPr lang="en-US" dirty="0"/>
           </a:p>
           <a:p>
@@ -1080,7 +1610,7 @@
 </p:notes>
 </file>
 
-<file path=ppt/notesSlides/notesSlide12.xml><?xml version="1.0" encoding="utf-8"?>
+<file path=ppt/notesSlides/notesSlide15.xml><?xml version="1.0" encoding="utf-8"?>
 <p:notes xmlns:a="http://schemas.openxmlformats.org/drawingml/2006/main" xmlns:r="http://schemas.openxmlformats.org/officeDocument/2006/relationships" xmlns:p="http://schemas.openxmlformats.org/presentationml/2006/main">
   <p:cSld>
     <p:spTree>
@@ -2722,99 +3252,117 @@
           <a:bodyPr/>
           <a:lstStyle/>
           <a:p>
-            <a:endParaRPr lang="en-US" dirty="0"/>
-          </a:p>
-          <a:p>
-            <a:r>
-              <a:rPr lang="en-US" dirty="0"/>
-              <a:t>[Potentially download and run some simple </a:t>
-            </a:r>
-            <a:r>
-              <a:rPr lang="en-US" dirty="0" err="1"/>
-              <a:t>fasttext</a:t>
-            </a:r>
-            <a:r>
-              <a:rPr lang="en-US" dirty="0"/>
-              <a:t> code and show the results]</a:t>
-            </a:r>
-          </a:p>
-          <a:p>
-            <a:endParaRPr lang="en-US" dirty="0"/>
-          </a:p>
-          <a:p>
-            <a:r>
-              <a:rPr lang="en-US" dirty="0"/>
-              <a:t>G</a:t>
-            </a:r>
-            <a:r>
-              <a:rPr lang="en-CO" dirty="0"/>
-              <a:t>ensim.models.fastext </a:t>
-            </a:r>
-          </a:p>
-          <a:p>
-            <a:r>
-              <a:rPr lang="en-US" dirty="0"/>
-              <a:t>N</a:t>
-            </a:r>
-            <a:r>
-              <a:rPr lang="en-CO" dirty="0"/>
-              <a:t>ltk </a:t>
-            </a:r>
-            <a:r>
-              <a:rPr lang="en-CO" dirty="0">
-                <a:sym typeface="Wingdings" pitchFamily="2" charset="2"/>
-              </a:rPr>
-              <a:t> natural language toolkit</a:t>
-            </a:r>
-          </a:p>
-          <a:p>
-            <a:r>
-              <a:rPr lang="en-US" dirty="0"/>
-              <a:t>W</a:t>
-            </a:r>
-            <a:r>
-              <a:rPr lang="en-CO" dirty="0"/>
-              <a:t>ikipedia</a:t>
-            </a:r>
-          </a:p>
-          <a:p>
-            <a:endParaRPr lang="en-US" dirty="0"/>
-          </a:p>
-          <a:p>
-            <a:endParaRPr lang="en-US" dirty="0"/>
-          </a:p>
-          <a:p>
-            <a:pPr marL="285750" indent="-285750">
+            <a:pPr marL="0" marR="0" lvl="0" indent="0" algn="l" defTabSz="914400" rtl="0" eaLnBrk="1" fontAlgn="auto" latinLnBrk="0" hangingPunct="1">
               <a:lnSpc>
-                <a:spcPct val="90000"/>
+                <a:spcPct val="100000"/>
               </a:lnSpc>
               <a:spcBef>
-                <a:spcPts val="1000"/>
+                <a:spcPts val="0"/>
               </a:spcBef>
-              <a:buFont typeface="Arial" panose="020B0604020202020204" pitchFamily="34" charset="0"/>
-              <a:buChar char="•"/>
+              <a:spcAft>
+                <a:spcPts val="0"/>
+              </a:spcAft>
+              <a:buClrTx/>
+              <a:buSzTx/>
+              <a:buFontTx/>
+              <a:buNone/>
+              <a:tabLst/>
+              <a:defRPr/>
             </a:pPr>
             <a:r>
-              <a:rPr lang="en-US" dirty="0"/>
-              <a:t>Text Classification (hate speech detection, etc.)</a:t>
-            </a:r>
-          </a:p>
-          <a:p>
-            <a:pPr marL="0" lvl="1">
-              <a:lnSpc>
-                <a:spcPct val="90000"/>
-              </a:lnSpc>
-              <a:spcBef>
-                <a:spcPts val="1000"/>
-              </a:spcBef>
-            </a:pPr>
-            <a:r>
-              <a:rPr lang="en-US" dirty="0"/>
-              <a:t>	Assigning a set of predefined categories to free-text. Text classifiers can 	be used to organize, structure, and categorize</a:t>
-            </a:r>
+              <a:rPr lang="en-US" sz="1200" kern="1200" dirty="0">
+                <a:solidFill>
+                  <a:schemeClr val="tx1"/>
+                </a:solidFill>
+                <a:effectLst/>
+                <a:latin typeface="+mn-lt"/>
+                <a:ea typeface="+mn-ea"/>
+                <a:cs typeface="+mn-cs"/>
+              </a:rPr>
+              <a:t>First, we notice that for all datasets, and all sizes, the proposed approach (</a:t>
+            </a:r>
+            <a:r>
+              <a:rPr lang="en-US" sz="1200" kern="1200" dirty="0" err="1">
+                <a:solidFill>
+                  <a:schemeClr val="tx1"/>
+                </a:solidFill>
+                <a:effectLst/>
+                <a:latin typeface="+mn-lt"/>
+                <a:ea typeface="+mn-ea"/>
+                <a:cs typeface="+mn-cs"/>
+              </a:rPr>
+              <a:t>sisg</a:t>
+            </a:r>
+            <a:r>
+              <a:rPr lang="en-US" sz="1200" kern="1200" dirty="0">
+                <a:solidFill>
+                  <a:schemeClr val="tx1"/>
+                </a:solidFill>
+                <a:effectLst/>
+                <a:latin typeface="+mn-lt"/>
+                <a:ea typeface="+mn-ea"/>
+                <a:cs typeface="+mn-cs"/>
+              </a:rPr>
+              <a:t>) performs better than </a:t>
+            </a:r>
+            <a:endParaRPr lang="en-US" dirty="0"/>
           </a:p>
           <a:p>
             <a:endParaRPr lang="en-CO" dirty="0"/>
+          </a:p>
+          <a:p>
+            <a:r>
+              <a:rPr lang="en-US" sz="1200" kern="1200" dirty="0">
+                <a:solidFill>
+                  <a:schemeClr val="tx1"/>
+                </a:solidFill>
+                <a:effectLst/>
+                <a:latin typeface="+mn-lt"/>
+                <a:ea typeface="+mn-ea"/>
+                <a:cs typeface="+mn-cs"/>
+              </a:rPr>
+              <a:t>the baseline. However, the performance of the base- line </a:t>
+            </a:r>
+            <a:r>
+              <a:rPr lang="en-US" sz="1200" kern="1200" dirty="0" err="1">
+                <a:solidFill>
+                  <a:schemeClr val="tx1"/>
+                </a:solidFill>
+                <a:effectLst/>
+                <a:latin typeface="+mn-lt"/>
+                <a:ea typeface="+mn-ea"/>
+                <a:cs typeface="+mn-cs"/>
+              </a:rPr>
+              <a:t>cbow</a:t>
+            </a:r>
+            <a:r>
+              <a:rPr lang="en-US" sz="1200" kern="1200" dirty="0">
+                <a:solidFill>
+                  <a:schemeClr val="tx1"/>
+                </a:solidFill>
+                <a:effectLst/>
+                <a:latin typeface="+mn-lt"/>
+                <a:ea typeface="+mn-ea"/>
+                <a:cs typeface="+mn-cs"/>
+              </a:rPr>
+              <a:t> model gets better as more and more data is available. Our model, on the other hand, seems to quickly saturate and adding more data does not always lead to improved results. </a:t>
+            </a:r>
+            <a:endParaRPr lang="en-US" dirty="0"/>
+          </a:p>
+          <a:p>
+            <a:r>
+              <a:rPr lang="en-US" sz="1200" kern="1200" dirty="0">
+                <a:solidFill>
+                  <a:schemeClr val="tx1"/>
+                </a:solidFill>
+                <a:effectLst/>
+                <a:latin typeface="+mn-lt"/>
+                <a:ea typeface="+mn-ea"/>
+                <a:cs typeface="+mn-cs"/>
+              </a:rPr>
+              <a:t>Second, and most importantly, we notice that the proposed approach provides very good word vectors even when using very small training datasets </a:t>
+            </a:r>
+            <a:endParaRPr lang="en-US" dirty="0"/>
           </a:p>
           <a:p>
             <a:endParaRPr lang="en-CO" dirty="0"/>
@@ -2841,7 +3389,7 @@
               <a:rPr lang="en-GB" sz="1400" b="0" strike="noStrike" spc="-1" smtClean="0">
                 <a:latin typeface="Times New Roman"/>
               </a:rPr>
-              <a:t>16</a:t>
+              <a:t>12</a:t>
             </a:fld>
             <a:endParaRPr lang="en-GB" sz="1400" b="0" strike="noStrike" spc="-1">
               <a:latin typeface="Times New Roman"/>
@@ -2852,7 +3400,7 @@
     </p:spTree>
     <p:extLst>
       <p:ext uri="{BB962C8B-B14F-4D97-AF65-F5344CB8AC3E}">
-        <p14:creationId xmlns:p14="http://schemas.microsoft.com/office/powerpoint/2010/main" val="970338645"/>
+        <p14:creationId xmlns:p14="http://schemas.microsoft.com/office/powerpoint/2010/main" val="1750913434"/>
       </p:ext>
     </p:extLst>
   </p:cSld>
@@ -9398,7 +9946,7 @@
           <p:nvPr/>
         </p:nvPicPr>
         <p:blipFill>
-          <a:blip r:embed="rId2"/>
+          <a:blip r:embed="rId3"/>
           <a:stretch>
             <a:fillRect/>
           </a:stretch>
@@ -9846,7 +10394,7 @@
         <p:spPr>
           <a:xfrm>
             <a:off x="480960" y="1838611"/>
-            <a:ext cx="8466671" cy="2308324"/>
+            <a:ext cx="8466671" cy="3416320"/>
           </a:xfrm>
           <a:prstGeom prst="rect">
             <a:avLst/>
@@ -9866,25 +10414,6 @@
             <a:r>
               <a:rPr lang="en-US" dirty="0"/>
               <a:t>In the paper there is no error analysis.</a:t>
-            </a:r>
-          </a:p>
-          <a:p>
-            <a:pPr marL="285750" indent="-285750">
-              <a:buFont typeface="Arial" panose="020B0604020202020204" pitchFamily="34" charset="0"/>
-              <a:buChar char="•"/>
-            </a:pPr>
-            <a:r>
-              <a:rPr lang="en-US" dirty="0"/>
-              <a:t>[N-gram heat maps at end of paper are cherry-picked]</a:t>
-            </a:r>
-          </a:p>
-          <a:p>
-            <a:endParaRPr lang="en-US" dirty="0"/>
-          </a:p>
-          <a:p>
-            <a:r>
-              <a:rPr lang="en-US" dirty="0"/>
-              <a:t> </a:t>
             </a:r>
           </a:p>
           <a:p>
@@ -9895,7 +10424,14 @@
             <a:endParaRPr lang="en-US" dirty="0"/>
           </a:p>
           <a:p>
-            <a:endParaRPr lang="en-US" dirty="0"/>
+            <a:pPr marL="285750" indent="-285750">
+              <a:buFont typeface="Arial" panose="020B0604020202020204" pitchFamily="34" charset="0"/>
+              <a:buChar char="•"/>
+            </a:pPr>
+            <a:r>
+              <a:rPr lang="en-US" dirty="0"/>
+              <a:t>They did a hand pick selection of the OOV words. </a:t>
+            </a:r>
           </a:p>
           <a:p>
             <a:pPr marL="285750" indent="-285750">
@@ -9911,8 +10447,87 @@
             </a:pPr>
             <a:endParaRPr lang="en-US" dirty="0"/>
           </a:p>
-        </p:txBody>
-      </p:sp>
+          <a:p>
+            <a:pPr marL="285750" indent="-285750">
+              <a:buFont typeface="Arial" panose="020B0604020202020204" pitchFamily="34" charset="0"/>
+              <a:buChar char="•"/>
+            </a:pPr>
+            <a:endParaRPr lang="en-US" dirty="0"/>
+          </a:p>
+          <a:p>
+            <a:pPr marL="285750" indent="-285750">
+              <a:buFont typeface="Arial" panose="020B0604020202020204" pitchFamily="34" charset="0"/>
+              <a:buChar char="•"/>
+            </a:pPr>
+            <a:endParaRPr lang="en-US" dirty="0"/>
+          </a:p>
+          <a:p>
+            <a:pPr marL="285750" indent="-285750">
+              <a:buFont typeface="Arial" panose="020B0604020202020204" pitchFamily="34" charset="0"/>
+              <a:buChar char="•"/>
+            </a:pPr>
+            <a:endParaRPr lang="en-US" dirty="0"/>
+          </a:p>
+          <a:p>
+            <a:pPr marL="285750" indent="-285750">
+              <a:buFont typeface="Arial" panose="020B0604020202020204" pitchFamily="34" charset="0"/>
+              <a:buChar char="•"/>
+            </a:pPr>
+            <a:endParaRPr lang="en-US" dirty="0"/>
+          </a:p>
+          <a:p>
+            <a:pPr marL="285750" indent="-285750">
+              <a:buFont typeface="Arial" panose="020B0604020202020204" pitchFamily="34" charset="0"/>
+              <a:buChar char="•"/>
+            </a:pPr>
+            <a:endParaRPr lang="en-US" dirty="0"/>
+          </a:p>
+          <a:p>
+            <a:pPr marL="285750" indent="-285750">
+              <a:buFont typeface="Arial" panose="020B0604020202020204" pitchFamily="34" charset="0"/>
+              <a:buChar char="•"/>
+            </a:pPr>
+            <a:endParaRPr lang="en-US" dirty="0"/>
+          </a:p>
+          <a:p>
+            <a:pPr marL="285750" indent="-285750">
+              <a:buFont typeface="Arial" panose="020B0604020202020204" pitchFamily="34" charset="0"/>
+              <a:buChar char="•"/>
+            </a:pPr>
+            <a:endParaRPr lang="en-US" dirty="0"/>
+          </a:p>
+        </p:txBody>
+      </p:sp>
+      <p:pic>
+        <p:nvPicPr>
+          <p:cNvPr id="2" name="Picture 1">
+            <a:extLst>
+              <a:ext uri="{FF2B5EF4-FFF2-40B4-BE49-F238E27FC236}">
+                <a16:creationId xmlns:a16="http://schemas.microsoft.com/office/drawing/2014/main" id="{40FD741A-6EBD-C142-B0BB-BC271EE7DD2F}"/>
+              </a:ext>
+            </a:extLst>
+          </p:cNvPr>
+          <p:cNvPicPr>
+            <a:picLocks noChangeAspect="1"/>
+          </p:cNvPicPr>
+          <p:nvPr/>
+        </p:nvPicPr>
+        <p:blipFill>
+          <a:blip r:embed="rId3"/>
+          <a:stretch>
+            <a:fillRect/>
+          </a:stretch>
+        </p:blipFill>
+        <p:spPr>
+          <a:xfrm>
+            <a:off x="1360639" y="2843407"/>
+            <a:ext cx="5691513" cy="2276605"/>
+          </a:xfrm>
+          <a:prstGeom prst="rect">
+            <a:avLst/>
+          </a:prstGeom>
+        </p:spPr>
+      </p:pic>
     </p:spTree>
     <p:extLst>
       <p:ext uri="{BB962C8B-B14F-4D97-AF65-F5344CB8AC3E}">
@@ -10031,7 +10646,7 @@
         <p:spPr>
           <a:xfrm>
             <a:off x="610503" y="1507371"/>
-            <a:ext cx="7474718" cy="2031325"/>
+            <a:ext cx="7474718" cy="4524315"/>
           </a:xfrm>
           <a:prstGeom prst="rect">
             <a:avLst/>
@@ -10043,98 +10658,106 @@
           </a:bodyPr>
           <a:lstStyle/>
           <a:p>
+            <a:pPr marL="285750" indent="-285750" algn="just">
+              <a:buFont typeface="Wingdings" pitchFamily="2" charset="2"/>
+              <a:buChar char="Ø"/>
+            </a:pPr>
+            <a:r>
+              <a:rPr lang="en-US" dirty="0"/>
+              <a:t>They unified all the research in one library called </a:t>
+            </a:r>
+            <a:r>
+              <a:rPr lang="en-US" dirty="0" err="1"/>
+              <a:t>FastText</a:t>
+            </a:r>
+            <a:r>
+              <a:rPr lang="en-US" dirty="0"/>
+              <a:t>, this is an unified framework for:</a:t>
+            </a:r>
+          </a:p>
+          <a:p>
+            <a:pPr marL="742950" lvl="1" indent="-285750" algn="just">
+              <a:buFont typeface="Arial" panose="020B0604020202020204" pitchFamily="34" charset="0"/>
+              <a:buChar char="•"/>
+            </a:pPr>
+            <a:r>
+              <a:rPr lang="en-US" dirty="0"/>
+              <a:t>Text representation</a:t>
+            </a:r>
+          </a:p>
+          <a:p>
+            <a:pPr marL="742950" lvl="1" indent="-285750" algn="just">
+              <a:buFont typeface="Arial" panose="020B0604020202020204" pitchFamily="34" charset="0"/>
+              <a:buChar char="•"/>
+            </a:pPr>
+            <a:r>
+              <a:rPr lang="en-US" dirty="0"/>
+              <a:t>Text classification</a:t>
+            </a:r>
+          </a:p>
+          <a:p>
+            <a:pPr algn="just"/>
+            <a:endParaRPr lang="en-US" dirty="0"/>
+          </a:p>
+          <a:p>
+            <a:pPr marL="285750" indent="-285750" algn="just">
+              <a:buFont typeface="Wingdings" pitchFamily="2" charset="2"/>
+              <a:buChar char="Ø"/>
+            </a:pPr>
+            <a:r>
+              <a:rPr lang="en-US" dirty="0"/>
+              <a:t>Text Classification is the process of categorizing text into organized groups first automatically analyzing the text and then assigning a set of pre-defined tags or categories based on its content.</a:t>
+            </a:r>
+          </a:p>
+          <a:p>
+            <a:pPr algn="just"/>
+            <a:endParaRPr lang="en-US" dirty="0"/>
+          </a:p>
+          <a:p>
+            <a:pPr algn="just"/>
+            <a:endParaRPr lang="en-US" dirty="0"/>
+          </a:p>
+          <a:p>
+            <a:pPr marL="285750" indent="-285750" algn="just">
+              <a:buFont typeface="Wingdings" pitchFamily="2" charset="2"/>
+              <a:buChar char="Ø"/>
+            </a:pPr>
+            <a:r>
+              <a:rPr lang="en-US" dirty="0"/>
+              <a:t>BERT </a:t>
+            </a:r>
+          </a:p>
+          <a:p>
+            <a:pPr algn="just"/>
             <a:r>
               <a:rPr lang="en-US" dirty="0">
-                <a:solidFill>
-                  <a:srgbClr val="000000"/>
-                </a:solidFill>
-                <a:latin typeface="Arial" panose="020B0604020202020204" pitchFamily="34" charset="0"/>
+                <a:hlinkClick r:id="rId3"/>
               </a:rPr>
-              <a:t>[Introduce </a:t>
-            </a:r>
-            <a:r>
-              <a:rPr lang="en-US" dirty="0" err="1">
-                <a:solidFill>
-                  <a:srgbClr val="000000"/>
-                </a:solidFill>
-                <a:latin typeface="Arial" panose="020B0604020202020204" pitchFamily="34" charset="0"/>
+              <a:t>https://www.analyticsvidhya.com/blog/2019/09/demystifying-bert-groundbreaking-nlp-framework/</a:t>
+            </a:r>
+            <a:endParaRPr lang="en-US" dirty="0"/>
+          </a:p>
+          <a:p>
+            <a:pPr algn="just"/>
+            <a:endParaRPr lang="en-US" dirty="0"/>
+          </a:p>
+          <a:p>
+            <a:pPr marL="285750" indent="-285750" algn="just">
+              <a:buFont typeface="Wingdings" pitchFamily="2" charset="2"/>
+              <a:buChar char="Ø"/>
+            </a:pPr>
+            <a:r>
+              <a:rPr lang="en-US" dirty="0"/>
+              <a:t>ELMO </a:t>
+            </a:r>
+          </a:p>
+          <a:p>
+            <a:pPr algn="just"/>
+            <a:r>
+              <a:rPr lang="en-US" dirty="0">
+                <a:hlinkClick r:id="rId4"/>
               </a:rPr>
-              <a:t>FastText</a:t>
-            </a:r>
-            <a:r>
-              <a:rPr lang="en-US" dirty="0">
-                <a:solidFill>
-                  <a:srgbClr val="000000"/>
-                </a:solidFill>
-                <a:latin typeface="Arial" panose="020B0604020202020204" pitchFamily="34" charset="0"/>
-              </a:rPr>
-              <a:t> (and other papers which fed into this, see </a:t>
-            </a:r>
-            <a:r>
-              <a:rPr lang="en-US" dirty="0" err="1">
-                <a:solidFill>
-                  <a:srgbClr val="000000"/>
-                </a:solidFill>
-                <a:latin typeface="Arial" panose="020B0604020202020204" pitchFamily="34" charset="0"/>
-              </a:rPr>
-              <a:t>github</a:t>
-            </a:r>
-            <a:r>
-              <a:rPr lang="en-US" dirty="0">
-                <a:solidFill>
-                  <a:srgbClr val="000000"/>
-                </a:solidFill>
-                <a:latin typeface="Arial" panose="020B0604020202020204" pitchFamily="34" charset="0"/>
-              </a:rPr>
-              <a:t>)]</a:t>
-            </a:r>
-          </a:p>
-          <a:p>
-            <a:r>
-              <a:rPr lang="en-US" dirty="0">
-                <a:solidFill>
-                  <a:srgbClr val="000000"/>
-                </a:solidFill>
-                <a:latin typeface="Arial" panose="020B0604020202020204" pitchFamily="34" charset="0"/>
-              </a:rPr>
-              <a:t>	</a:t>
-            </a:r>
-            <a:r>
-              <a:rPr lang="en-US" dirty="0">
-                <a:hlinkClick r:id="rId2"/>
-              </a:rPr>
-              <a:t>https://pypi.org/project/fasttext/</a:t>
-            </a:r>
-            <a:endParaRPr lang="en-US" dirty="0"/>
-          </a:p>
-          <a:p>
-            <a:r>
-              <a:rPr lang="en-US" dirty="0"/>
-              <a:t>	[Add discussion of text classification task here]</a:t>
-            </a:r>
-            <a:endParaRPr lang="en-CO" dirty="0"/>
-          </a:p>
-          <a:p>
-            <a:endParaRPr lang="en-US" dirty="0">
-              <a:solidFill>
-                <a:srgbClr val="000000"/>
-              </a:solidFill>
-              <a:latin typeface="Arial" panose="020B0604020202020204" pitchFamily="34" charset="0"/>
-            </a:endParaRPr>
-          </a:p>
-          <a:p>
-            <a:r>
-              <a:rPr lang="en-US" dirty="0"/>
-              <a:t>[ELMO]</a:t>
-            </a:r>
-          </a:p>
-          <a:p>
-            <a:endParaRPr lang="en-US" dirty="0"/>
-          </a:p>
-          <a:p>
-            <a:r>
-              <a:rPr lang="en-US" dirty="0"/>
-              <a:t>[BERT]</a:t>
+              <a:t>https://allennlp.org/elmo</a:t>
             </a:r>
             <a:endParaRPr lang="en-CO" dirty="0"/>
           </a:p>
@@ -12099,7 +12722,7 @@
                   <a:srgbClr val="0098A1"/>
                 </a:solidFill>
               </a:rPr>
-              <a:t>Conclusion</a:t>
+              <a:t>Main Contribution</a:t>
             </a:r>
           </a:p>
           <a:p>
@@ -12113,7 +12736,21 @@
                   <a:srgbClr val="0098A1"/>
                 </a:solidFill>
               </a:rPr>
-              <a:t>Main Contribution</a:t>
+              <a:t>Shortcomings / Cheats</a:t>
+            </a:r>
+          </a:p>
+          <a:p>
+            <a:pPr marL="342900" indent="-342900">
+              <a:buFont typeface="+mj-lt"/>
+              <a:buAutoNum type="arabicPeriod"/>
+            </a:pPr>
+            <a:r>
+              <a:rPr lang="en-US" sz="1600" b="1" spc="-1" dirty="0">
+                <a:solidFill>
+                  <a:srgbClr val="0098A1"/>
+                </a:solidFill>
+              </a:rPr>
+              <a:t>Next Steps</a:t>
             </a:r>
           </a:p>
           <a:p>
@@ -12625,7 +13262,7 @@
         <p:spPr>
           <a:xfrm>
             <a:off x="338664" y="1997839"/>
-            <a:ext cx="8466671" cy="1799467"/>
+            <a:ext cx="8466671" cy="3077702"/>
           </a:xfrm>
           <a:prstGeom prst="rect">
             <a:avLst/>
@@ -12638,25 +13275,9 @@
           </a:bodyPr>
           <a:lstStyle/>
           <a:p>
-            <a:pPr marL="342900" indent="-342900">
+            <a:pPr algn="just">
               <a:lnSpc>
-                <a:spcPct val="90000"/>
-              </a:lnSpc>
-              <a:spcBef>
-                <a:spcPts val="1000"/>
-              </a:spcBef>
-              <a:buFont typeface="Arial" panose="020B0604020202020204" pitchFamily="34" charset="0"/>
-              <a:buChar char="•"/>
-            </a:pPr>
-            <a:r>
-              <a:rPr lang="en-US" dirty="0"/>
-              <a:t>Word Representation</a:t>
-            </a:r>
-          </a:p>
-          <a:p>
-            <a:pPr marL="0" lvl="1">
-              <a:lnSpc>
-                <a:spcPct val="90000"/>
+                <a:spcPct val="150000"/>
               </a:lnSpc>
               <a:spcBef>
                 <a:spcPts val="1000"/>
@@ -12664,21 +13285,51 @@
             </a:pPr>
             <a:r>
               <a:rPr lang="en-US" dirty="0"/>
-              <a:t>	Transforming words into a vector format which can be more easily 	processed by computers.</a:t>
-            </a:r>
-          </a:p>
-          <a:p>
-            <a:pPr lvl="1"/>
-            <a:endParaRPr lang="en-CO" dirty="0"/>
-          </a:p>
-          <a:p>
+              <a:t>In the paper “Enriching Word vectors with </a:t>
+            </a:r>
+            <a:r>
+              <a:rPr lang="en-US" dirty="0" err="1"/>
+              <a:t>subword</a:t>
+            </a:r>
+            <a:r>
+              <a:rPr lang="en-US" dirty="0"/>
+              <a:t> information” presented by Piotr Bojanowski , Edouard Grave , Armand </a:t>
+            </a:r>
+            <a:r>
+              <a:rPr lang="en-US" dirty="0" err="1"/>
+              <a:t>Joulin</a:t>
+            </a:r>
+            <a:r>
+              <a:rPr lang="en-US" dirty="0"/>
+              <a:t> and Tomas </a:t>
+            </a:r>
+            <a:r>
+              <a:rPr lang="en-US" dirty="0" err="1"/>
+              <a:t>Mikolov</a:t>
+            </a:r>
+            <a:r>
+              <a:rPr lang="en-US" dirty="0"/>
+              <a:t> publish on 2017, propose a new approach based on the </a:t>
+            </a:r>
+            <a:r>
+              <a:rPr lang="en-US" dirty="0" err="1"/>
+              <a:t>skipgram</a:t>
+            </a:r>
+            <a:r>
+              <a:rPr lang="en-US" dirty="0"/>
+              <a:t> model, where each word is represented as a bag of character n-grams. A vector representation is associated to each character n-gram; words being represented as the sum of these representations. </a:t>
+            </a:r>
+          </a:p>
+          <a:p>
+            <a:pPr algn="just">
+              <a:lnSpc>
+                <a:spcPct val="150000"/>
+              </a:lnSpc>
+              <a:spcBef>
+                <a:spcPts val="1000"/>
+              </a:spcBef>
+            </a:pPr>
             <a:endParaRPr lang="en-US" dirty="0"/>
-          </a:p>
-          <a:p>
-            <a:r>
-              <a:rPr lang="en-US" dirty="0"/>
-              <a:t>[NEED MORE INTRODUCTION TO THIS TASK]</a:t>
-            </a:r>
           </a:p>
         </p:txBody>
       </p:sp>

</xml_diff>

<commit_message>
removed last fasttext slide
</commit_message>
<xml_diff>
--- a/Presentation_Subword.pptx
+++ b/Presentation_Subword.pptx
@@ -147,48 +147,6 @@
 </p:cmAuthorLst>
 </file>
 
-<file path=ppt/comments/comment1.xml><?xml version="1.0" encoding="utf-8"?>
-<p:cmLst xmlns:a="http://schemas.openxmlformats.org/drawingml/2006/main" xmlns:r="http://schemas.openxmlformats.org/officeDocument/2006/relationships" xmlns:p="http://schemas.openxmlformats.org/presentationml/2006/main">
-  <p:cm authorId="1" dt="2020-06-29T10:49:40.519" idx="9">
-    <p:pos x="10" y="10"/>
-    <p:text>Need notes on this model</p:text>
-    <p:extLst>
-      <p:ext uri="{C676402C-5697-4E1C-873F-D02D1690AC5C}">
-        <p15:threadingInfo xmlns:p15="http://schemas.microsoft.com/office/powerpoint/2012/main" timeZoneBias="-120"/>
-      </p:ext>
-    </p:extLst>
-  </p:cm>
-</p:cmLst>
-</file>
-
-<file path=ppt/comments/comment2.xml><?xml version="1.0" encoding="utf-8"?>
-<p:cmLst xmlns:a="http://schemas.openxmlformats.org/drawingml/2006/main" xmlns:r="http://schemas.openxmlformats.org/officeDocument/2006/relationships" xmlns:p="http://schemas.openxmlformats.org/presentationml/2006/main">
-  <p:cm authorId="1" dt="2020-06-29T10:19:38.586" idx="2">
-    <p:pos x="10" y="10"/>
-    <p:text>Need to add either discussion of Spearman Rank to notes, or put eqn on slide?</p:text>
-    <p:extLst>
-      <p:ext uri="{C676402C-5697-4E1C-873F-D02D1690AC5C}">
-        <p15:threadingInfo xmlns:p15="http://schemas.microsoft.com/office/powerpoint/2012/main" timeZoneBias="-120"/>
-      </p:ext>
-    </p:extLst>
-  </p:cm>
-</p:cmLst>
-</file>
-
-<file path=ppt/comments/comment3.xml><?xml version="1.0" encoding="utf-8"?>
-<p:cmLst xmlns:a="http://schemas.openxmlformats.org/drawingml/2006/main" xmlns:r="http://schemas.openxmlformats.org/officeDocument/2006/relationships" xmlns:p="http://schemas.openxmlformats.org/presentationml/2006/main">
-  <p:cm authorId="1" dt="2020-06-29T10:24:53.529" idx="5">
-    <p:pos x="10" y="10"/>
-    <p:text>Add notes about what these numbers mean</p:text>
-    <p:extLst>
-      <p:ext uri="{C676402C-5697-4E1C-873F-D02D1690AC5C}">
-        <p15:threadingInfo xmlns:p15="http://schemas.microsoft.com/office/powerpoint/2012/main" timeZoneBias="-120"/>
-      </p:ext>
-    </p:extLst>
-  </p:cm>
-</p:cmLst>
-</file>
-
 <file path=ppt/notesMasters/notesMaster1.xml><?xml version="1.0" encoding="utf-8"?>
 <p:notesMaster xmlns:a="http://schemas.openxmlformats.org/drawingml/2006/main" xmlns:r="http://schemas.openxmlformats.org/officeDocument/2006/relationships" xmlns:p="http://schemas.openxmlformats.org/presentationml/2006/main">
   <p:cSld>
@@ -917,26 +875,21 @@
             </a:r>
           </a:p>
           <a:p>
-            <a:endParaRPr lang="en-US" dirty="0">
-              <a:solidFill>
-                <a:srgbClr val="000000"/>
-              </a:solidFill>
-              <a:latin typeface="Arial" panose="020B0604020202020204" pitchFamily="34" charset="0"/>
-            </a:endParaRPr>
-          </a:p>
-          <a:p>
             <a:r>
               <a:rPr lang="en-US" dirty="0"/>
               <a:t>[ELMO]</a:t>
             </a:r>
           </a:p>
           <a:p>
-            <a:endParaRPr lang="en-US" dirty="0"/>
-          </a:p>
-          <a:p>
             <a:r>
               <a:rPr lang="en-US" dirty="0"/>
               <a:t>[BERT]</a:t>
+            </a:r>
+          </a:p>
+          <a:p>
+            <a:r>
+              <a:rPr lang="en-US" dirty="0"/>
+              <a:t>This method uses Subword information for its own tokenization. </a:t>
             </a:r>
           </a:p>
           <a:p>
@@ -1756,7 +1709,7 @@
           <a:p>
             <a:r>
               <a:rPr lang="en-US" dirty="0"/>
-              <a:t>Introduced a model to predict the next word based on ‘n’ previous words.  </a:t>
+              <a:t>Introduced a model to predict the next word based on ‘n’ previous words.  This seems to be the first half of the CBOW type model.</a:t>
             </a:r>
             <a:endParaRPr lang="en-CO" dirty="0"/>
           </a:p>
@@ -1934,7 +1887,38 @@
                 <a:ea typeface="+mn-ea"/>
                 <a:cs typeface="+mn-cs"/>
               </a:rPr>
-              <a:t> model architecture predict the target word (the center word) based on the source context words (surrounding words).</a:t>
+              <a:t> model architecture predict the target word (the center word) based on the source context words (surrounding words). </a:t>
+            </a:r>
+          </a:p>
+          <a:p>
+            <a:pPr marL="0" marR="0" lvl="0" indent="0" algn="l" defTabSz="914400" rtl="0" eaLnBrk="1" fontAlgn="auto" latinLnBrk="0" hangingPunct="1">
+              <a:lnSpc>
+                <a:spcPct val="100000"/>
+              </a:lnSpc>
+              <a:spcBef>
+                <a:spcPts val="0"/>
+              </a:spcBef>
+              <a:spcAft>
+                <a:spcPts val="0"/>
+              </a:spcAft>
+              <a:buClrTx/>
+              <a:buSzTx/>
+              <a:buFontTx/>
+              <a:buNone/>
+              <a:tabLst/>
+              <a:defRPr/>
+            </a:pPr>
+            <a:r>
+              <a:rPr lang="en-US" sz="1200" b="0" i="0" kern="1200" dirty="0">
+                <a:solidFill>
+                  <a:schemeClr val="tx1"/>
+                </a:solidFill>
+                <a:effectLst/>
+                <a:latin typeface="+mn-lt"/>
+                <a:ea typeface="+mn-ea"/>
+                <a:cs typeface="+mn-cs"/>
+              </a:rPr>
+              <a:t>Quicker to train, better accuracy on frequent words.</a:t>
             </a:r>
           </a:p>
           <a:p>
@@ -2185,7 +2169,7 @@
             </a:r>
             <a:r>
               <a:rPr lang="en-US" dirty="0"/>
-              <a:t> model the context is predicted based on the source word</a:t>
+              <a:t> model the context is predicted based on the source word. This method performs better on rare words, but is slower to train than CBOW.</a:t>
             </a:r>
           </a:p>
           <a:p>
@@ -2812,29 +2796,8 @@
               <a:rPr lang="en-US" sz="1800" b="0" i="0" u="none" strike="noStrike" baseline="0" dirty="0">
                 <a:latin typeface="NimbusRomNo9L-Regu"/>
               </a:rPr>
-              <a:t>Poorer performance on WS353: This is due to the fact that words in the English</a:t>
-            </a:r>
-          </a:p>
-          <a:p>
-            <a:pPr algn="l"/>
-            <a:r>
-              <a:rPr lang="en-US" sz="1800" b="0" i="0" u="none" strike="noStrike" baseline="0" dirty="0">
-                <a:latin typeface="NimbusRomNo9L-Regu"/>
-              </a:rPr>
-              <a:t>WS353 dataset are common words for which</a:t>
-            </a:r>
-          </a:p>
-          <a:p>
-            <a:pPr algn="l"/>
-            <a:r>
-              <a:rPr lang="en-US" sz="1800" b="0" i="0" u="none" strike="noStrike" baseline="0" dirty="0">
-                <a:latin typeface="NimbusRomNo9L-Regu"/>
-              </a:rPr>
-              <a:t>good vectors can be obtained without exploiting</a:t>
-            </a:r>
-          </a:p>
-          <a:p>
-            <a:pPr algn="l"/>
+              <a:t>Poorer performance on WS353: This is due to the fact that words in the English WS353 dataset are common words for which good vectors can be obtained without exploiting </a:t>
+            </a:r>
             <a:r>
               <a:rPr lang="en-US" sz="1800" b="0" i="0" u="none" strike="noStrike" baseline="0" dirty="0" err="1">
                 <a:latin typeface="NimbusRomNo9L-Regu"/>
@@ -11906,7 +11869,7 @@
 </file>
 
 <file path=ppt/slides/slide19.xml><?xml version="1.0" encoding="utf-8"?>
-<p:sld xmlns:a="http://schemas.openxmlformats.org/drawingml/2006/main" xmlns:r="http://schemas.openxmlformats.org/officeDocument/2006/relationships" xmlns:p="http://schemas.openxmlformats.org/presentationml/2006/main">
+<p:sld xmlns:a="http://schemas.openxmlformats.org/drawingml/2006/main" xmlns:r="http://schemas.openxmlformats.org/officeDocument/2006/relationships" xmlns:p="http://schemas.openxmlformats.org/presentationml/2006/main" show="0">
   <p:cSld>
     <p:spTree>
       <p:nvGrpSpPr>
@@ -16957,7 +16920,7 @@
             </a:pPr>
             <a:r>
               <a:rPr lang="en-US" dirty="0"/>
-              <a:t>Out-of-Vocabulary Word feature</a:t>
+              <a:t>Out-of-Vocabulary Word features</a:t>
             </a:r>
           </a:p>
           <a:p>

</xml_diff>